<commit_message>
database - complete restaurant serving time categories
</commit_message>
<xml_diff>
--- a/Documentations/Supervisor Meeting PowerPoints/8._Supervisor_Meeting_8Jan21.pptx
+++ b/Documentations/Supervisor Meeting PowerPoints/8._Supervisor_Meeting_8Jan21.pptx
@@ -5,17 +5,18 @@
     <p:sldMasterId id="2147483648" r:id="rId1"/>
   </p:sldMasterIdLst>
   <p:notesMasterIdLst>
-    <p:notesMasterId r:id="rId10"/>
+    <p:notesMasterId r:id="rId11"/>
   </p:notesMasterIdLst>
   <p:sldIdLst>
     <p:sldId id="256" r:id="rId2"/>
     <p:sldId id="257" r:id="rId3"/>
     <p:sldId id="343" r:id="rId4"/>
     <p:sldId id="394" r:id="rId5"/>
-    <p:sldId id="395" r:id="rId6"/>
-    <p:sldId id="396" r:id="rId7"/>
-    <p:sldId id="398" r:id="rId8"/>
-    <p:sldId id="331" r:id="rId9"/>
+    <p:sldId id="399" r:id="rId6"/>
+    <p:sldId id="395" r:id="rId7"/>
+    <p:sldId id="396" r:id="rId8"/>
+    <p:sldId id="398" r:id="rId9"/>
+    <p:sldId id="331" r:id="rId10"/>
   </p:sldIdLst>
   <p:sldSz cx="18288000" cy="10287000"/>
   <p:notesSz cx="18288000" cy="10287000"/>
@@ -3494,20 +3495,120 @@
     </pc:docChg>
   </pc:docChgLst>
   <pc:docChgLst>
-    <pc:chgData name="Andrew Ming Ho Wu" userId="620d876fccae6a25" providerId="LiveId" clId="{B8CC6B97-FBEB-4E84-A973-1D8D00A51797}"/>
-    <pc:docChg chg="undo redo custSel addSld delSld modSld">
-      <pc:chgData name="Andrew Ming Ho Wu" userId="620d876fccae6a25" providerId="LiveId" clId="{B8CC6B97-FBEB-4E84-A973-1D8D00A51797}" dt="2020-12-09T20:21:14.831" v="3322" actId="1076"/>
+    <pc:chgData name="Andrew Ming Ho Wu" userId="620d876fccae6a25" providerId="LiveId" clId="{301D553B-ED1B-4DD0-8B60-0326FA0FE40D}"/>
+    <pc:docChg chg="undo custSel modSld sldOrd">
+      <pc:chgData name="Andrew Ming Ho Wu" userId="620d876fccae6a25" providerId="LiveId" clId="{301D553B-ED1B-4DD0-8B60-0326FA0FE40D}" dt="2020-12-04T09:57:29.774" v="2192" actId="20577"/>
       <pc:docMkLst>
         <pc:docMk/>
       </pc:docMkLst>
       <pc:sldChg chg="modSp mod">
-        <pc:chgData name="Andrew Ming Ho Wu" userId="620d876fccae6a25" providerId="LiveId" clId="{B8CC6B97-FBEB-4E84-A973-1D8D00A51797}" dt="2020-12-07T23:20:20.434" v="2391" actId="20577"/>
+        <pc:chgData name="Andrew Ming Ho Wu" userId="620d876fccae6a25" providerId="LiveId" clId="{301D553B-ED1B-4DD0-8B60-0326FA0FE40D}" dt="2020-12-04T09:23:30.694" v="1648" actId="20577"/>
         <pc:sldMkLst>
           <pc:docMk/>
           <pc:sldMk cId="0" sldId="256"/>
         </pc:sldMkLst>
         <pc:spChg chg="mod">
-          <ac:chgData name="Andrew Ming Ho Wu" userId="620d876fccae6a25" providerId="LiveId" clId="{B8CC6B97-FBEB-4E84-A973-1D8D00A51797}" dt="2020-12-07T23:20:20.434" v="2391" actId="20577"/>
+          <ac:chgData name="Andrew Ming Ho Wu" userId="620d876fccae6a25" providerId="LiveId" clId="{301D553B-ED1B-4DD0-8B60-0326FA0FE40D}" dt="2020-12-04T09:23:30.694" v="1648" actId="20577"/>
+          <ac:spMkLst>
+            <pc:docMk/>
+            <pc:sldMk cId="0" sldId="256"/>
+            <ac:spMk id="12" creationId="{9A5C5996-C506-42D4-8B45-0190C0F5159A}"/>
+          </ac:spMkLst>
+        </pc:spChg>
+      </pc:sldChg>
+      <pc:sldChg chg="modSp mod ord">
+        <pc:chgData name="Andrew Ming Ho Wu" userId="620d876fccae6a25" providerId="LiveId" clId="{301D553B-ED1B-4DD0-8B60-0326FA0FE40D}" dt="2020-12-04T09:37:15.202" v="1818" actId="1076"/>
+        <pc:sldMkLst>
+          <pc:docMk/>
+          <pc:sldMk cId="3627176467" sldId="330"/>
+        </pc:sldMkLst>
+        <pc:spChg chg="mod">
+          <ac:chgData name="Andrew Ming Ho Wu" userId="620d876fccae6a25" providerId="LiveId" clId="{301D553B-ED1B-4DD0-8B60-0326FA0FE40D}" dt="2020-12-04T09:37:15.202" v="1818" actId="1076"/>
+          <ac:spMkLst>
+            <pc:docMk/>
+            <pc:sldMk cId="3627176467" sldId="330"/>
+            <ac:spMk id="11" creationId="{51D20990-98D9-4852-A91C-AEF4EC3755F8}"/>
+          </ac:spMkLst>
+        </pc:spChg>
+      </pc:sldChg>
+      <pc:sldChg chg="addSp delSp modSp mod">
+        <pc:chgData name="Andrew Ming Ho Wu" userId="620d876fccae6a25" providerId="LiveId" clId="{301D553B-ED1B-4DD0-8B60-0326FA0FE40D}" dt="2020-12-04T09:57:29.774" v="2192" actId="20577"/>
+        <pc:sldMkLst>
+          <pc:docMk/>
+          <pc:sldMk cId="2206058006" sldId="333"/>
+        </pc:sldMkLst>
+        <pc:spChg chg="mod">
+          <ac:chgData name="Andrew Ming Ho Wu" userId="620d876fccae6a25" providerId="LiveId" clId="{301D553B-ED1B-4DD0-8B60-0326FA0FE40D}" dt="2020-12-04T09:54:08.146" v="2088" actId="1076"/>
+          <ac:spMkLst>
+            <pc:docMk/>
+            <pc:sldMk cId="2206058006" sldId="333"/>
+            <ac:spMk id="5" creationId="{00000000-0000-0000-0000-000000000000}"/>
+          </ac:spMkLst>
+        </pc:spChg>
+        <pc:spChg chg="add del mod">
+          <ac:chgData name="Andrew Ming Ho Wu" userId="620d876fccae6a25" providerId="LiveId" clId="{301D553B-ED1B-4DD0-8B60-0326FA0FE40D}" dt="2020-12-04T09:57:29.774" v="2192" actId="20577"/>
+          <ac:spMkLst>
+            <pc:docMk/>
+            <pc:sldMk cId="2206058006" sldId="333"/>
+            <ac:spMk id="11" creationId="{3E2506E2-B67A-4B0D-BA61-6B13AC56BACF}"/>
+          </ac:spMkLst>
+        </pc:spChg>
+      </pc:sldChg>
+      <pc:sldChg chg="modSp mod">
+        <pc:chgData name="Andrew Ming Ho Wu" userId="620d876fccae6a25" providerId="LiveId" clId="{301D553B-ED1B-4DD0-8B60-0326FA0FE40D}" dt="2020-12-03T19:29:39.167" v="656" actId="20577"/>
+        <pc:sldMkLst>
+          <pc:docMk/>
+          <pc:sldMk cId="2818220858" sldId="343"/>
+        </pc:sldMkLst>
+        <pc:spChg chg="mod">
+          <ac:chgData name="Andrew Ming Ho Wu" userId="620d876fccae6a25" providerId="LiveId" clId="{301D553B-ED1B-4DD0-8B60-0326FA0FE40D}" dt="2020-12-03T19:29:34.248" v="655" actId="20577"/>
+          <ac:spMkLst>
+            <pc:docMk/>
+            <pc:sldMk cId="2818220858" sldId="343"/>
+            <ac:spMk id="8" creationId="{9D42ABF8-029E-4F29-B608-8C118D28ABA1}"/>
+          </ac:spMkLst>
+        </pc:spChg>
+        <pc:spChg chg="mod">
+          <ac:chgData name="Andrew Ming Ho Wu" userId="620d876fccae6a25" providerId="LiveId" clId="{301D553B-ED1B-4DD0-8B60-0326FA0FE40D}" dt="2020-12-03T19:29:39.167" v="656" actId="20577"/>
+          <ac:spMkLst>
+            <pc:docMk/>
+            <pc:sldMk cId="2818220858" sldId="343"/>
+            <ac:spMk id="15" creationId="{5FC8DCBF-4CCE-4C22-8B9F-CC50B4D8446D}"/>
+          </ac:spMkLst>
+        </pc:spChg>
+      </pc:sldChg>
+      <pc:sldChg chg="addSp delSp modSp mod">
+        <pc:chgData name="Andrew Ming Ho Wu" userId="620d876fccae6a25" providerId="LiveId" clId="{301D553B-ED1B-4DD0-8B60-0326FA0FE40D}" dt="2020-12-03T19:23:50.731" v="4"/>
+        <pc:sldMkLst>
+          <pc:docMk/>
+          <pc:sldMk cId="1002563172" sldId="387"/>
+        </pc:sldMkLst>
+        <pc:spChg chg="add del mod">
+          <ac:chgData name="Andrew Ming Ho Wu" userId="620d876fccae6a25" providerId="LiveId" clId="{301D553B-ED1B-4DD0-8B60-0326FA0FE40D}" dt="2020-12-03T19:23:50.731" v="4"/>
+          <ac:spMkLst>
+            <pc:docMk/>
+            <pc:sldMk cId="1002563172" sldId="387"/>
+            <ac:spMk id="11" creationId="{BA618F6F-1997-4079-B11E-BC24229FBCC5}"/>
+          </ac:spMkLst>
+        </pc:spChg>
+      </pc:sldChg>
+    </pc:docChg>
+  </pc:docChgLst>
+  <pc:docChgLst>
+    <pc:chgData name="Andrew Ming Ho Wu" userId="620d876fccae6a25" providerId="LiveId" clId="{70051DB0-1E4A-4F76-B9FF-8FCA6C4B0B08}"/>
+    <pc:docChg chg="undo custSel addSld delSld modSld">
+      <pc:chgData name="Andrew Ming Ho Wu" userId="620d876fccae6a25" providerId="LiveId" clId="{70051DB0-1E4A-4F76-B9FF-8FCA6C4B0B08}" dt="2020-10-16T08:50:56.802" v="1997" actId="5793"/>
+      <pc:docMkLst>
+        <pc:docMk/>
+      </pc:docMkLst>
+      <pc:sldChg chg="modSp mod">
+        <pc:chgData name="Andrew Ming Ho Wu" userId="620d876fccae6a25" providerId="LiveId" clId="{70051DB0-1E4A-4F76-B9FF-8FCA6C4B0B08}" dt="2020-10-16T08:13:04.374" v="1601" actId="255"/>
+        <pc:sldMkLst>
+          <pc:docMk/>
+          <pc:sldMk cId="0" sldId="256"/>
+        </pc:sldMkLst>
+        <pc:spChg chg="mod">
+          <ac:chgData name="Andrew Ming Ho Wu" userId="620d876fccae6a25" providerId="LiveId" clId="{70051DB0-1E4A-4F76-B9FF-8FCA6C4B0B08}" dt="2020-10-16T08:13:04.374" v="1601" actId="255"/>
           <ac:spMkLst>
             <pc:docMk/>
             <pc:sldMk cId="0" sldId="256"/>
@@ -3515,7 +3616,7 @@
           </ac:spMkLst>
         </pc:spChg>
         <pc:spChg chg="mod">
-          <ac:chgData name="Andrew Ming Ho Wu" userId="620d876fccae6a25" providerId="LiveId" clId="{B8CC6B97-FBEB-4E84-A973-1D8D00A51797}" dt="2020-12-07T11:47:32.514" v="4" actId="20577"/>
+          <ac:chgData name="Andrew Ming Ho Wu" userId="620d876fccae6a25" providerId="LiveId" clId="{70051DB0-1E4A-4F76-B9FF-8FCA6C4B0B08}" dt="2020-10-14T11:03:10.696" v="1511" actId="20577"/>
           <ac:spMkLst>
             <pc:docMk/>
             <pc:sldMk cId="0" sldId="256"/>
@@ -3523,116 +3624,263 @@
           </ac:spMkLst>
         </pc:spChg>
       </pc:sldChg>
+      <pc:sldChg chg="addSp delSp modSp mod">
+        <pc:chgData name="Andrew Ming Ho Wu" userId="620d876fccae6a25" providerId="LiveId" clId="{70051DB0-1E4A-4F76-B9FF-8FCA6C4B0B08}" dt="2020-10-16T08:14:10.986" v="1623" actId="1076"/>
+        <pc:sldMkLst>
+          <pc:docMk/>
+          <pc:sldMk cId="0" sldId="259"/>
+        </pc:sldMkLst>
+        <pc:spChg chg="mod">
+          <ac:chgData name="Andrew Ming Ho Wu" userId="620d876fccae6a25" providerId="LiveId" clId="{70051DB0-1E4A-4F76-B9FF-8FCA6C4B0B08}" dt="2020-10-16T08:14:10.986" v="1623" actId="1076"/>
+          <ac:spMkLst>
+            <pc:docMk/>
+            <pc:sldMk cId="0" sldId="259"/>
+            <ac:spMk id="5" creationId="{00000000-0000-0000-0000-000000000000}"/>
+          </ac:spMkLst>
+        </pc:spChg>
+        <pc:spChg chg="del mod">
+          <ac:chgData name="Andrew Ming Ho Wu" userId="620d876fccae6a25" providerId="LiveId" clId="{70051DB0-1E4A-4F76-B9FF-8FCA6C4B0B08}" dt="2020-10-14T10:56:16.263" v="803"/>
+          <ac:spMkLst>
+            <pc:docMk/>
+            <pc:sldMk cId="0" sldId="259"/>
+            <ac:spMk id="12" creationId="{7E70BACB-1CF0-4DEE-923B-205A7D88BC2B}"/>
+          </ac:spMkLst>
+        </pc:spChg>
+        <pc:graphicFrameChg chg="add del mod modGraphic">
+          <ac:chgData name="Andrew Ming Ho Wu" userId="620d876fccae6a25" providerId="LiveId" clId="{70051DB0-1E4A-4F76-B9FF-8FCA6C4B0B08}" dt="2020-10-16T08:13:58.412" v="1603" actId="478"/>
+          <ac:graphicFrameMkLst>
+            <pc:docMk/>
+            <pc:sldMk cId="0" sldId="259"/>
+            <ac:graphicFrameMk id="6" creationId="{F9FF6ED5-1599-4BAE-B1B8-E9E0AA0B54BA}"/>
+          </ac:graphicFrameMkLst>
+        </pc:graphicFrameChg>
+      </pc:sldChg>
       <pc:sldChg chg="modSp del mod">
-        <pc:chgData name="Andrew Ming Ho Wu" userId="620d876fccae6a25" providerId="LiveId" clId="{B8CC6B97-FBEB-4E84-A973-1D8D00A51797}" dt="2020-12-07T14:43:22.840" v="2386" actId="47"/>
+        <pc:chgData name="Andrew Ming Ho Wu" userId="620d876fccae6a25" providerId="LiveId" clId="{70051DB0-1E4A-4F76-B9FF-8FCA6C4B0B08}" dt="2020-10-16T08:14:23.170" v="1624" actId="2696"/>
+        <pc:sldMkLst>
+          <pc:docMk/>
+          <pc:sldMk cId="4141595128" sldId="301"/>
+        </pc:sldMkLst>
+        <pc:spChg chg="mod">
+          <ac:chgData name="Andrew Ming Ho Wu" userId="620d876fccae6a25" providerId="LiveId" clId="{70051DB0-1E4A-4F76-B9FF-8FCA6C4B0B08}" dt="2020-10-14T10:57:15.205" v="832" actId="20577"/>
+          <ac:spMkLst>
+            <pc:docMk/>
+            <pc:sldMk cId="4141595128" sldId="301"/>
+            <ac:spMk id="5" creationId="{00000000-0000-0000-0000-000000000000}"/>
+          </ac:spMkLst>
+        </pc:spChg>
+        <pc:spChg chg="mod">
+          <ac:chgData name="Andrew Ming Ho Wu" userId="620d876fccae6a25" providerId="LiveId" clId="{70051DB0-1E4A-4F76-B9FF-8FCA6C4B0B08}" dt="2020-10-14T10:57:56.133" v="1014" actId="1076"/>
+          <ac:spMkLst>
+            <pc:docMk/>
+            <pc:sldMk cId="4141595128" sldId="301"/>
+            <ac:spMk id="12" creationId="{7E70BACB-1CF0-4DEE-923B-205A7D88BC2B}"/>
+          </ac:spMkLst>
+        </pc:spChg>
+      </pc:sldChg>
+      <pc:sldChg chg="modSp mod">
+        <pc:chgData name="Andrew Ming Ho Wu" userId="620d876fccae6a25" providerId="LiveId" clId="{70051DB0-1E4A-4F76-B9FF-8FCA6C4B0B08}" dt="2020-10-16T08:50:56.802" v="1997" actId="5793"/>
+        <pc:sldMkLst>
+          <pc:docMk/>
+          <pc:sldMk cId="428898620" sldId="329"/>
+        </pc:sldMkLst>
+        <pc:spChg chg="mod">
+          <ac:chgData name="Andrew Ming Ho Wu" userId="620d876fccae6a25" providerId="LiveId" clId="{70051DB0-1E4A-4F76-B9FF-8FCA6C4B0B08}" dt="2020-10-14T10:58:08.788" v="1025" actId="20577"/>
+          <ac:spMkLst>
+            <pc:docMk/>
+            <pc:sldMk cId="428898620" sldId="329"/>
+            <ac:spMk id="5" creationId="{00000000-0000-0000-0000-000000000000}"/>
+          </ac:spMkLst>
+        </pc:spChg>
+        <pc:spChg chg="mod">
+          <ac:chgData name="Andrew Ming Ho Wu" userId="620d876fccae6a25" providerId="LiveId" clId="{70051DB0-1E4A-4F76-B9FF-8FCA6C4B0B08}" dt="2020-10-16T08:50:56.802" v="1997" actId="5793"/>
+          <ac:spMkLst>
+            <pc:docMk/>
+            <pc:sldMk cId="428898620" sldId="329"/>
+            <ac:spMk id="12" creationId="{7E70BACB-1CF0-4DEE-923B-205A7D88BC2B}"/>
+          </ac:spMkLst>
+        </pc:spChg>
+      </pc:sldChg>
+      <pc:sldChg chg="addSp delSp modSp mod">
+        <pc:chgData name="Andrew Ming Ho Wu" userId="620d876fccae6a25" providerId="LiveId" clId="{70051DB0-1E4A-4F76-B9FF-8FCA6C4B0B08}" dt="2020-10-14T11:04:43.468" v="1595" actId="1076"/>
         <pc:sldMkLst>
           <pc:docMk/>
           <pc:sldMk cId="3627176467" sldId="330"/>
         </pc:sldMkLst>
         <pc:spChg chg="mod">
-          <ac:chgData name="Andrew Ming Ho Wu" userId="620d876fccae6a25" providerId="LiveId" clId="{B8CC6B97-FBEB-4E84-A973-1D8D00A51797}" dt="2020-12-07T11:49:36.385" v="427" actId="115"/>
+          <ac:chgData name="Andrew Ming Ho Wu" userId="620d876fccae6a25" providerId="LiveId" clId="{70051DB0-1E4A-4F76-B9FF-8FCA6C4B0B08}" dt="2020-10-14T11:04:43.468" v="1595" actId="1076"/>
           <ac:spMkLst>
             <pc:docMk/>
             <pc:sldMk cId="3627176467" sldId="330"/>
-            <ac:spMk id="11" creationId="{51D20990-98D9-4852-A91C-AEF4EC3755F8}"/>
-          </ac:spMkLst>
-        </pc:spChg>
-      </pc:sldChg>
-      <pc:sldChg chg="addSp delSp modSp mod">
-        <pc:chgData name="Andrew Ming Ho Wu" userId="620d876fccae6a25" providerId="LiveId" clId="{B8CC6B97-FBEB-4E84-A973-1D8D00A51797}" dt="2020-12-09T20:19:32.434" v="3257" actId="20577"/>
-        <pc:sldMkLst>
-          <pc:docMk/>
-          <pc:sldMk cId="2206058006" sldId="333"/>
-        </pc:sldMkLst>
-        <pc:spChg chg="mod">
-          <ac:chgData name="Andrew Ming Ho Wu" userId="620d876fccae6a25" providerId="LiveId" clId="{B8CC6B97-FBEB-4E84-A973-1D8D00A51797}" dt="2020-12-08T20:51:48.995" v="2411" actId="20577"/>
-          <ac:spMkLst>
-            <pc:docMk/>
-            <pc:sldMk cId="2206058006" sldId="333"/>
             <ac:spMk id="5" creationId="{00000000-0000-0000-0000-000000000000}"/>
           </ac:spMkLst>
         </pc:spChg>
+        <pc:spChg chg="add del mod">
+          <ac:chgData name="Andrew Ming Ho Wu" userId="620d876fccae6a25" providerId="LiveId" clId="{70051DB0-1E4A-4F76-B9FF-8FCA6C4B0B08}" dt="2020-10-14T11:02:05.801" v="1498" actId="20577"/>
+          <ac:spMkLst>
+            <pc:docMk/>
+            <pc:sldMk cId="3627176467" sldId="330"/>
+            <ac:spMk id="12" creationId="{7E70BACB-1CF0-4DEE-923B-205A7D88BC2B}"/>
+          </ac:spMkLst>
+        </pc:spChg>
+      </pc:sldChg>
+      <pc:sldChg chg="delSp modSp mod">
+        <pc:chgData name="Andrew Ming Ho Wu" userId="620d876fccae6a25" providerId="LiveId" clId="{70051DB0-1E4A-4F76-B9FF-8FCA6C4B0B08}" dt="2020-10-14T11:02:51.398" v="1506" actId="1076"/>
+        <pc:sldMkLst>
+          <pc:docMk/>
+          <pc:sldMk cId="311588258" sldId="331"/>
+        </pc:sldMkLst>
+        <pc:spChg chg="mod">
+          <ac:chgData name="Andrew Ming Ho Wu" userId="620d876fccae6a25" providerId="LiveId" clId="{70051DB0-1E4A-4F76-B9FF-8FCA6C4B0B08}" dt="2020-10-14T11:02:51.398" v="1506" actId="1076"/>
+          <ac:spMkLst>
+            <pc:docMk/>
+            <pc:sldMk cId="311588258" sldId="331"/>
+            <ac:spMk id="5" creationId="{00000000-0000-0000-0000-000000000000}"/>
+          </ac:spMkLst>
+        </pc:spChg>
         <pc:spChg chg="del">
-          <ac:chgData name="Andrew Ming Ho Wu" userId="620d876fccae6a25" providerId="LiveId" clId="{B8CC6B97-FBEB-4E84-A973-1D8D00A51797}" dt="2020-12-07T11:49:40.438" v="428" actId="478"/>
-          <ac:spMkLst>
-            <pc:docMk/>
-            <pc:sldMk cId="2206058006" sldId="333"/>
-            <ac:spMk id="11" creationId="{3E2506E2-B67A-4B0D-BA61-6B13AC56BACF}"/>
-          </ac:spMkLst>
-        </pc:spChg>
-        <pc:spChg chg="add del mod">
-          <ac:chgData name="Andrew Ming Ho Wu" userId="620d876fccae6a25" providerId="LiveId" clId="{B8CC6B97-FBEB-4E84-A973-1D8D00A51797}" dt="2020-12-09T20:19:32.434" v="3257" actId="20577"/>
-          <ac:spMkLst>
-            <pc:docMk/>
-            <pc:sldMk cId="2206058006" sldId="333"/>
-            <ac:spMk id="12" creationId="{11F2B6B6-0466-4FF3-9677-694F0F61AE7C}"/>
+          <ac:chgData name="Andrew Ming Ho Wu" userId="620d876fccae6a25" providerId="LiveId" clId="{70051DB0-1E4A-4F76-B9FF-8FCA6C4B0B08}" dt="2020-10-14T11:02:34.036" v="1502" actId="478"/>
+          <ac:spMkLst>
+            <pc:docMk/>
+            <pc:sldMk cId="311588258" sldId="331"/>
+            <ac:spMk id="12" creationId="{7E70BACB-1CF0-4DEE-923B-205A7D88BC2B}"/>
           </ac:spMkLst>
         </pc:spChg>
         <pc:grpChg chg="mod">
-          <ac:chgData name="Andrew Ming Ho Wu" userId="620d876fccae6a25" providerId="LiveId" clId="{B8CC6B97-FBEB-4E84-A973-1D8D00A51797}" dt="2020-12-07T11:50:20.258" v="465" actId="1076"/>
+          <ac:chgData name="Andrew Ming Ho Wu" userId="620d876fccae6a25" providerId="LiveId" clId="{70051DB0-1E4A-4F76-B9FF-8FCA6C4B0B08}" dt="2020-10-14T11:02:46.399" v="1505" actId="1076"/>
           <ac:grpSpMkLst>
             <pc:docMk/>
-            <pc:sldMk cId="2206058006" sldId="333"/>
+            <pc:sldMk cId="311588258" sldId="331"/>
             <ac:grpSpMk id="2" creationId="{00000000-0000-0000-0000-000000000000}"/>
           </ac:grpSpMkLst>
         </pc:grpChg>
-        <pc:grpChg chg="mod">
-          <ac:chgData name="Andrew Ming Ho Wu" userId="620d876fccae6a25" providerId="LiveId" clId="{B8CC6B97-FBEB-4E84-A973-1D8D00A51797}" dt="2020-12-07T11:50:22.733" v="466" actId="1076"/>
-          <ac:grpSpMkLst>
+      </pc:sldChg>
+      <pc:sldChg chg="del">
+        <pc:chgData name="Andrew Ming Ho Wu" userId="620d876fccae6a25" providerId="LiveId" clId="{70051DB0-1E4A-4F76-B9FF-8FCA6C4B0B08}" dt="2020-10-14T11:02:58.709" v="1507" actId="2696"/>
+        <pc:sldMkLst>
+          <pc:docMk/>
+          <pc:sldMk cId="1678336179" sldId="332"/>
+        </pc:sldMkLst>
+      </pc:sldChg>
+      <pc:sldChg chg="modSp mod">
+        <pc:chgData name="Andrew Ming Ho Wu" userId="620d876fccae6a25" providerId="LiveId" clId="{70051DB0-1E4A-4F76-B9FF-8FCA6C4B0B08}" dt="2020-10-16T08:31:21.227" v="1924" actId="20577"/>
+        <pc:sldMkLst>
+          <pc:docMk/>
+          <pc:sldMk cId="2206058006" sldId="333"/>
+        </pc:sldMkLst>
+        <pc:spChg chg="mod">
+          <ac:chgData name="Andrew Ming Ho Wu" userId="620d876fccae6a25" providerId="LiveId" clId="{70051DB0-1E4A-4F76-B9FF-8FCA6C4B0B08}" dt="2020-10-16T08:17:59.360" v="1712" actId="20577"/>
+          <ac:spMkLst>
             <pc:docMk/>
             <pc:sldMk cId="2206058006" sldId="333"/>
-            <ac:grpSpMk id="8" creationId="{00000000-0000-0000-0000-000000000000}"/>
-          </ac:grpSpMkLst>
-        </pc:grpChg>
-      </pc:sldChg>
-      <pc:sldChg chg="addSp delSp modSp mod">
-        <pc:chgData name="Andrew Ming Ho Wu" userId="620d876fccae6a25" providerId="LiveId" clId="{B8CC6B97-FBEB-4E84-A973-1D8D00A51797}" dt="2020-12-07T12:17:11.563" v="2385" actId="20577"/>
+            <ac:spMk id="5" creationId="{00000000-0000-0000-0000-000000000000}"/>
+          </ac:spMkLst>
+        </pc:spChg>
+        <pc:spChg chg="mod">
+          <ac:chgData name="Andrew Ming Ho Wu" userId="620d876fccae6a25" providerId="LiveId" clId="{70051DB0-1E4A-4F76-B9FF-8FCA6C4B0B08}" dt="2020-10-16T08:31:21.227" v="1924" actId="20577"/>
+          <ac:spMkLst>
+            <pc:docMk/>
+            <pc:sldMk cId="2206058006" sldId="333"/>
+            <ac:spMk id="12" creationId="{7E70BACB-1CF0-4DEE-923B-205A7D88BC2B}"/>
+          </ac:spMkLst>
+        </pc:spChg>
+      </pc:sldChg>
+      <pc:sldChg chg="del">
+        <pc:chgData name="Andrew Ming Ho Wu" userId="620d876fccae6a25" providerId="LiveId" clId="{70051DB0-1E4A-4F76-B9FF-8FCA6C4B0B08}" dt="2020-10-14T10:49:02.566" v="132" actId="2696"/>
+        <pc:sldMkLst>
+          <pc:docMk/>
+          <pc:sldMk cId="1994449026" sldId="335"/>
+        </pc:sldMkLst>
+      </pc:sldChg>
+      <pc:sldChg chg="del">
+        <pc:chgData name="Andrew Ming Ho Wu" userId="620d876fccae6a25" providerId="LiveId" clId="{70051DB0-1E4A-4F76-B9FF-8FCA6C4B0B08}" dt="2020-10-14T11:02:58.709" v="1507" actId="2696"/>
+        <pc:sldMkLst>
+          <pc:docMk/>
+          <pc:sldMk cId="491446009" sldId="336"/>
+        </pc:sldMkLst>
+      </pc:sldChg>
+      <pc:sldChg chg="del">
+        <pc:chgData name="Andrew Ming Ho Wu" userId="620d876fccae6a25" providerId="LiveId" clId="{70051DB0-1E4A-4F76-B9FF-8FCA6C4B0B08}" dt="2020-10-14T11:02:58.709" v="1507" actId="2696"/>
+        <pc:sldMkLst>
+          <pc:docMk/>
+          <pc:sldMk cId="3153837584" sldId="337"/>
+        </pc:sldMkLst>
+      </pc:sldChg>
+      <pc:sldChg chg="del">
+        <pc:chgData name="Andrew Ming Ho Wu" userId="620d876fccae6a25" providerId="LiveId" clId="{70051DB0-1E4A-4F76-B9FF-8FCA6C4B0B08}" dt="2020-10-14T11:02:58.709" v="1507" actId="2696"/>
+        <pc:sldMkLst>
+          <pc:docMk/>
+          <pc:sldMk cId="1064973513" sldId="338"/>
+        </pc:sldMkLst>
+      </pc:sldChg>
+      <pc:sldChg chg="del">
+        <pc:chgData name="Andrew Ming Ho Wu" userId="620d876fccae6a25" providerId="LiveId" clId="{70051DB0-1E4A-4F76-B9FF-8FCA6C4B0B08}" dt="2020-10-14T11:02:58.709" v="1507" actId="2696"/>
+        <pc:sldMkLst>
+          <pc:docMk/>
+          <pc:sldMk cId="3865668538" sldId="339"/>
+        </pc:sldMkLst>
+      </pc:sldChg>
+      <pc:sldChg chg="del">
+        <pc:chgData name="Andrew Ming Ho Wu" userId="620d876fccae6a25" providerId="LiveId" clId="{70051DB0-1E4A-4F76-B9FF-8FCA6C4B0B08}" dt="2020-10-14T11:02:58.709" v="1507" actId="2696"/>
+        <pc:sldMkLst>
+          <pc:docMk/>
+          <pc:sldMk cId="1140042678" sldId="340"/>
+        </pc:sldMkLst>
+      </pc:sldChg>
+      <pc:sldChg chg="del">
+        <pc:chgData name="Andrew Ming Ho Wu" userId="620d876fccae6a25" providerId="LiveId" clId="{70051DB0-1E4A-4F76-B9FF-8FCA6C4B0B08}" dt="2020-10-14T11:02:58.709" v="1507" actId="2696"/>
+        <pc:sldMkLst>
+          <pc:docMk/>
+          <pc:sldMk cId="2792681432" sldId="341"/>
+        </pc:sldMkLst>
+      </pc:sldChg>
+      <pc:sldChg chg="del">
+        <pc:chgData name="Andrew Ming Ho Wu" userId="620d876fccae6a25" providerId="LiveId" clId="{70051DB0-1E4A-4F76-B9FF-8FCA6C4B0B08}" dt="2020-10-14T11:02:58.709" v="1507" actId="2696"/>
+        <pc:sldMkLst>
+          <pc:docMk/>
+          <pc:sldMk cId="3458398597" sldId="342"/>
+        </pc:sldMkLst>
+      </pc:sldChg>
+      <pc:sldChg chg="delSp modSp mod">
+        <pc:chgData name="Andrew Ming Ho Wu" userId="620d876fccae6a25" providerId="LiveId" clId="{70051DB0-1E4A-4F76-B9FF-8FCA6C4B0B08}" dt="2020-10-16T08:17:39.434" v="1697" actId="20577"/>
         <pc:sldMkLst>
           <pc:docMk/>
           <pc:sldMk cId="2818220858" sldId="343"/>
         </pc:sldMkLst>
         <pc:spChg chg="mod">
-          <ac:chgData name="Andrew Ming Ho Wu" userId="620d876fccae6a25" providerId="LiveId" clId="{B8CC6B97-FBEB-4E84-A973-1D8D00A51797}" dt="2020-12-07T12:16:53.205" v="2364" actId="1076"/>
+          <ac:chgData name="Andrew Ming Ho Wu" userId="620d876fccae6a25" providerId="LiveId" clId="{70051DB0-1E4A-4F76-B9FF-8FCA6C4B0B08}" dt="2020-10-16T08:17:39.434" v="1697" actId="20577"/>
           <ac:spMkLst>
             <pc:docMk/>
             <pc:sldMk cId="2818220858" sldId="343"/>
             <ac:spMk id="5" creationId="{81D7F47C-B22C-46A9-BD87-E2FA064EC20F}"/>
           </ac:spMkLst>
         </pc:spChg>
-        <pc:spChg chg="mod">
-          <ac:chgData name="Andrew Ming Ho Wu" userId="620d876fccae6a25" providerId="LiveId" clId="{B8CC6B97-FBEB-4E84-A973-1D8D00A51797}" dt="2020-12-07T12:16:25.853" v="2338" actId="20577"/>
+        <pc:spChg chg="del">
+          <ac:chgData name="Andrew Ming Ho Wu" userId="620d876fccae6a25" providerId="LiveId" clId="{70051DB0-1E4A-4F76-B9FF-8FCA6C4B0B08}" dt="2020-10-14T10:48:34.682" v="129" actId="478"/>
           <ac:spMkLst>
             <pc:docMk/>
             <pc:sldMk cId="2818220858" sldId="343"/>
-            <ac:spMk id="8" creationId="{9D42ABF8-029E-4F29-B608-8C118D28ABA1}"/>
-          </ac:spMkLst>
-        </pc:spChg>
-        <pc:spChg chg="add del mod">
-          <ac:chgData name="Andrew Ming Ho Wu" userId="620d876fccae6a25" providerId="LiveId" clId="{B8CC6B97-FBEB-4E84-A973-1D8D00A51797}" dt="2020-12-07T12:17:00.094" v="2366"/>
-          <ac:spMkLst>
-            <pc:docMk/>
-            <pc:sldMk cId="2818220858" sldId="343"/>
-            <ac:spMk id="14" creationId="{4008C9F8-7034-4640-926C-69C20356432C}"/>
-          </ac:spMkLst>
-        </pc:spChg>
-        <pc:spChg chg="mod">
-          <ac:chgData name="Andrew Ming Ho Wu" userId="620d876fccae6a25" providerId="LiveId" clId="{B8CC6B97-FBEB-4E84-A973-1D8D00A51797}" dt="2020-12-07T11:47:46.566" v="35" actId="20577"/>
+            <ac:spMk id="7" creationId="{8F1A7018-DAB3-4DD6-9851-CCE349574926}"/>
+          </ac:spMkLst>
+        </pc:spChg>
+        <pc:spChg chg="mod">
+          <ac:chgData name="Andrew Ming Ho Wu" userId="620d876fccae6a25" providerId="LiveId" clId="{70051DB0-1E4A-4F76-B9FF-8FCA6C4B0B08}" dt="2020-10-16T08:17:36.046" v="1691" actId="20577"/>
           <ac:spMkLst>
             <pc:docMk/>
             <pc:sldMk cId="2818220858" sldId="343"/>
             <ac:spMk id="15" creationId="{5FC8DCBF-4CCE-4C22-8B9F-CC50B4D8446D}"/>
           </ac:spMkLst>
         </pc:spChg>
-        <pc:spChg chg="add mod">
-          <ac:chgData name="Andrew Ming Ho Wu" userId="620d876fccae6a25" providerId="LiveId" clId="{B8CC6B97-FBEB-4E84-A973-1D8D00A51797}" dt="2020-12-07T12:17:11.563" v="2385" actId="20577"/>
+        <pc:spChg chg="del">
+          <ac:chgData name="Andrew Ming Ho Wu" userId="620d876fccae6a25" providerId="LiveId" clId="{70051DB0-1E4A-4F76-B9FF-8FCA6C4B0B08}" dt="2020-10-14T10:48:41.238" v="130" actId="478"/>
           <ac:spMkLst>
             <pc:docMk/>
             <pc:sldMk cId="2818220858" sldId="343"/>
-            <ac:spMk id="16" creationId="{9776CE46-BCD9-4FBA-A83A-BE5C5D29A965}"/>
+            <ac:spMk id="20" creationId="{A6F76399-04DE-46A8-BF2C-99ED8D141BD3}"/>
           </ac:spMkLst>
         </pc:spChg>
         <pc:grpChg chg="mod">
-          <ac:chgData name="Andrew Ming Ho Wu" userId="620d876fccae6a25" providerId="LiveId" clId="{B8CC6B97-FBEB-4E84-A973-1D8D00A51797}" dt="2020-12-07T12:16:48.563" v="2363" actId="1076"/>
+          <ac:chgData name="Andrew Ming Ho Wu" userId="620d876fccae6a25" providerId="LiveId" clId="{70051DB0-1E4A-4F76-B9FF-8FCA6C4B0B08}" dt="2020-10-14T11:03:31.434" v="1538" actId="1076"/>
           <ac:grpSpMkLst>
             <pc:docMk/>
             <pc:sldMk cId="2818220858" sldId="343"/>
@@ -3640,124 +3888,18 @@
           </ac:grpSpMkLst>
         </pc:grpChg>
       </pc:sldChg>
-      <pc:sldChg chg="modSp mod">
-        <pc:chgData name="Andrew Ming Ho Wu" userId="620d876fccae6a25" providerId="LiveId" clId="{B8CC6B97-FBEB-4E84-A973-1D8D00A51797}" dt="2020-12-07T12:12:01.475" v="2130" actId="20577"/>
-        <pc:sldMkLst>
-          <pc:docMk/>
-          <pc:sldMk cId="1002563172" sldId="387"/>
-        </pc:sldMkLst>
-        <pc:spChg chg="mod">
-          <ac:chgData name="Andrew Ming Ho Wu" userId="620d876fccae6a25" providerId="LiveId" clId="{B8CC6B97-FBEB-4E84-A973-1D8D00A51797}" dt="2020-12-07T12:12:01.475" v="2130" actId="20577"/>
-          <ac:spMkLst>
-            <pc:docMk/>
-            <pc:sldMk cId="1002563172" sldId="387"/>
-            <ac:spMk id="5" creationId="{00000000-0000-0000-0000-000000000000}"/>
-          </ac:spMkLst>
-        </pc:spChg>
-      </pc:sldChg>
-      <pc:sldChg chg="modSp add mod">
-        <pc:chgData name="Andrew Ming Ho Wu" userId="620d876fccae6a25" providerId="LiveId" clId="{B8CC6B97-FBEB-4E84-A973-1D8D00A51797}" dt="2020-12-09T20:21:14.831" v="3322" actId="1076"/>
-        <pc:sldMkLst>
-          <pc:docMk/>
-          <pc:sldMk cId="2049264590" sldId="388"/>
-        </pc:sldMkLst>
-        <pc:spChg chg="mod">
-          <ac:chgData name="Andrew Ming Ho Wu" userId="620d876fccae6a25" providerId="LiveId" clId="{B8CC6B97-FBEB-4E84-A973-1D8D00A51797}" dt="2020-12-09T20:21:14.831" v="3322" actId="1076"/>
-          <ac:spMkLst>
-            <pc:docMk/>
-            <pc:sldMk cId="2049264590" sldId="388"/>
-            <ac:spMk id="12" creationId="{11F2B6B6-0466-4FF3-9677-694F0F61AE7C}"/>
-          </ac:spMkLst>
-        </pc:spChg>
+      <pc:sldChg chg="add del">
+        <pc:chgData name="Andrew Ming Ho Wu" userId="620d876fccae6a25" providerId="LiveId" clId="{70051DB0-1E4A-4F76-B9FF-8FCA6C4B0B08}" dt="2020-10-16T08:17:51.506" v="1699" actId="2890"/>
+        <pc:sldMkLst>
+          <pc:docMk/>
+          <pc:sldMk cId="882795893" sldId="344"/>
+        </pc:sldMkLst>
       </pc:sldChg>
       <pc:sldChg chg="add">
-        <pc:chgData name="Andrew Ming Ho Wu" userId="620d876fccae6a25" providerId="LiveId" clId="{B8CC6B97-FBEB-4E84-A973-1D8D00A51797}" dt="2020-12-07T12:11:57.600" v="2129" actId="2890"/>
-        <pc:sldMkLst>
-          <pc:docMk/>
-          <pc:sldMk cId="1012779811" sldId="389"/>
-        </pc:sldMkLst>
-      </pc:sldChg>
-      <pc:sldChg chg="modSp add mod">
-        <pc:chgData name="Andrew Ming Ho Wu" userId="620d876fccae6a25" providerId="LiveId" clId="{B8CC6B97-FBEB-4E84-A973-1D8D00A51797}" dt="2020-12-07T12:13:16.646" v="2234" actId="255"/>
-        <pc:sldMkLst>
-          <pc:docMk/>
-          <pc:sldMk cId="2782934202" sldId="390"/>
-        </pc:sldMkLst>
-        <pc:spChg chg="mod">
-          <ac:chgData name="Andrew Ming Ho Wu" userId="620d876fccae6a25" providerId="LiveId" clId="{B8CC6B97-FBEB-4E84-A973-1D8D00A51797}" dt="2020-12-07T12:12:22.476" v="2139" actId="20577"/>
-          <ac:spMkLst>
-            <pc:docMk/>
-            <pc:sldMk cId="2782934202" sldId="390"/>
-            <ac:spMk id="5" creationId="{00000000-0000-0000-0000-000000000000}"/>
-          </ac:spMkLst>
-        </pc:spChg>
-        <pc:spChg chg="mod">
-          <ac:chgData name="Andrew Ming Ho Wu" userId="620d876fccae6a25" providerId="LiveId" clId="{B8CC6B97-FBEB-4E84-A973-1D8D00A51797}" dt="2020-12-07T12:13:16.646" v="2234" actId="255"/>
-          <ac:spMkLst>
-            <pc:docMk/>
-            <pc:sldMk cId="2782934202" sldId="390"/>
-            <ac:spMk id="12" creationId="{11F2B6B6-0466-4FF3-9677-694F0F61AE7C}"/>
-          </ac:spMkLst>
-        </pc:spChg>
-      </pc:sldChg>
-      <pc:sldChg chg="modSp add mod">
-        <pc:chgData name="Andrew Ming Ho Wu" userId="620d876fccae6a25" providerId="LiveId" clId="{B8CC6B97-FBEB-4E84-A973-1D8D00A51797}" dt="2020-12-07T12:14:09.189" v="2268" actId="20577"/>
-        <pc:sldMkLst>
-          <pc:docMk/>
-          <pc:sldMk cId="2582986712" sldId="391"/>
-        </pc:sldMkLst>
-        <pc:spChg chg="mod">
-          <ac:chgData name="Andrew Ming Ho Wu" userId="620d876fccae6a25" providerId="LiveId" clId="{B8CC6B97-FBEB-4E84-A973-1D8D00A51797}" dt="2020-12-07T12:14:09.189" v="2268" actId="20577"/>
-          <ac:spMkLst>
-            <pc:docMk/>
-            <pc:sldMk cId="2582986712" sldId="391"/>
-            <ac:spMk id="12" creationId="{11F2B6B6-0466-4FF3-9677-694F0F61AE7C}"/>
-          </ac:spMkLst>
-        </pc:spChg>
-      </pc:sldChg>
-      <pc:sldChg chg="modSp add mod">
-        <pc:chgData name="Andrew Ming Ho Wu" userId="620d876fccae6a25" providerId="LiveId" clId="{B8CC6B97-FBEB-4E84-A973-1D8D00A51797}" dt="2020-12-07T12:15:51.208" v="2307" actId="255"/>
-        <pc:sldMkLst>
-          <pc:docMk/>
-          <pc:sldMk cId="161672857" sldId="392"/>
-        </pc:sldMkLst>
-        <pc:spChg chg="mod">
-          <ac:chgData name="Andrew Ming Ho Wu" userId="620d876fccae6a25" providerId="LiveId" clId="{B8CC6B97-FBEB-4E84-A973-1D8D00A51797}" dt="2020-12-07T12:15:14.773" v="2298" actId="20577"/>
-          <ac:spMkLst>
-            <pc:docMk/>
-            <pc:sldMk cId="161672857" sldId="392"/>
-            <ac:spMk id="5" creationId="{00000000-0000-0000-0000-000000000000}"/>
-          </ac:spMkLst>
-        </pc:spChg>
-        <pc:spChg chg="mod">
-          <ac:chgData name="Andrew Ming Ho Wu" userId="620d876fccae6a25" providerId="LiveId" clId="{B8CC6B97-FBEB-4E84-A973-1D8D00A51797}" dt="2020-12-07T12:15:51.208" v="2307" actId="255"/>
-          <ac:spMkLst>
-            <pc:docMk/>
-            <pc:sldMk cId="161672857" sldId="392"/>
-            <ac:spMk id="12" creationId="{11F2B6B6-0466-4FF3-9677-694F0F61AE7C}"/>
-          </ac:spMkLst>
-        </pc:spChg>
-      </pc:sldChg>
-      <pc:sldChg chg="modSp add mod">
-        <pc:chgData name="Andrew Ming Ho Wu" userId="620d876fccae6a25" providerId="LiveId" clId="{B8CC6B97-FBEB-4E84-A973-1D8D00A51797}" dt="2020-12-09T20:20:31.079" v="3296" actId="20577"/>
-        <pc:sldMkLst>
-          <pc:docMk/>
-          <pc:sldMk cId="226674003" sldId="393"/>
-        </pc:sldMkLst>
-        <pc:spChg chg="mod">
-          <ac:chgData name="Andrew Ming Ho Wu" userId="620d876fccae6a25" providerId="LiveId" clId="{B8CC6B97-FBEB-4E84-A973-1D8D00A51797}" dt="2020-12-09T20:20:31.079" v="3296" actId="20577"/>
-          <ac:spMkLst>
-            <pc:docMk/>
-            <pc:sldMk cId="226674003" sldId="393"/>
-            <ac:spMk id="12" creationId="{11F2B6B6-0466-4FF3-9677-694F0F61AE7C}"/>
-          </ac:spMkLst>
-        </pc:spChg>
-      </pc:sldChg>
-      <pc:sldChg chg="add del">
-        <pc:chgData name="Andrew Ming Ho Wu" userId="620d876fccae6a25" providerId="LiveId" clId="{B8CC6B97-FBEB-4E84-A973-1D8D00A51797}" dt="2020-12-08T20:51:41.486" v="2393"/>
-        <pc:sldMkLst>
-          <pc:docMk/>
-          <pc:sldMk cId="1879883029" sldId="393"/>
+        <pc:chgData name="Andrew Ming Ho Wu" userId="620d876fccae6a25" providerId="LiveId" clId="{70051DB0-1E4A-4F76-B9FF-8FCA6C4B0B08}" dt="2020-10-16T08:17:54.089" v="1700" actId="2890"/>
+        <pc:sldMkLst>
+          <pc:docMk/>
+          <pc:sldMk cId="3427335621" sldId="344"/>
         </pc:sldMkLst>
       </pc:sldChg>
     </pc:docChg>
@@ -4749,20 +4891,20 @@
     </pc:docChg>
   </pc:docChgLst>
   <pc:docChgLst>
-    <pc:chgData name="Andrew Ming Ho Wu" userId="620d876fccae6a25" providerId="LiveId" clId="{70051DB0-1E4A-4F76-B9FF-8FCA6C4B0B08}"/>
-    <pc:docChg chg="undo custSel addSld delSld modSld">
-      <pc:chgData name="Andrew Ming Ho Wu" userId="620d876fccae6a25" providerId="LiveId" clId="{70051DB0-1E4A-4F76-B9FF-8FCA6C4B0B08}" dt="2020-10-16T08:50:56.802" v="1997" actId="5793"/>
+    <pc:chgData name="Andrew Ming Ho Wu" userId="620d876fccae6a25" providerId="LiveId" clId="{B8CC6B97-FBEB-4E84-A973-1D8D00A51797}"/>
+    <pc:docChg chg="undo redo custSel addSld delSld modSld">
+      <pc:chgData name="Andrew Ming Ho Wu" userId="620d876fccae6a25" providerId="LiveId" clId="{B8CC6B97-FBEB-4E84-A973-1D8D00A51797}" dt="2020-12-09T20:21:14.831" v="3322" actId="1076"/>
       <pc:docMkLst>
         <pc:docMk/>
       </pc:docMkLst>
       <pc:sldChg chg="modSp mod">
-        <pc:chgData name="Andrew Ming Ho Wu" userId="620d876fccae6a25" providerId="LiveId" clId="{70051DB0-1E4A-4F76-B9FF-8FCA6C4B0B08}" dt="2020-10-16T08:13:04.374" v="1601" actId="255"/>
+        <pc:chgData name="Andrew Ming Ho Wu" userId="620d876fccae6a25" providerId="LiveId" clId="{B8CC6B97-FBEB-4E84-A973-1D8D00A51797}" dt="2020-12-07T23:20:20.434" v="2391" actId="20577"/>
         <pc:sldMkLst>
           <pc:docMk/>
           <pc:sldMk cId="0" sldId="256"/>
         </pc:sldMkLst>
         <pc:spChg chg="mod">
-          <ac:chgData name="Andrew Ming Ho Wu" userId="620d876fccae6a25" providerId="LiveId" clId="{70051DB0-1E4A-4F76-B9FF-8FCA6C4B0B08}" dt="2020-10-16T08:13:04.374" v="1601" actId="255"/>
+          <ac:chgData name="Andrew Ming Ho Wu" userId="620d876fccae6a25" providerId="LiveId" clId="{B8CC6B97-FBEB-4E84-A973-1D8D00A51797}" dt="2020-12-07T23:20:20.434" v="2391" actId="20577"/>
           <ac:spMkLst>
             <pc:docMk/>
             <pc:sldMk cId="0" sldId="256"/>
@@ -4770,7 +4912,7 @@
           </ac:spMkLst>
         </pc:spChg>
         <pc:spChg chg="mod">
-          <ac:chgData name="Andrew Ming Ho Wu" userId="620d876fccae6a25" providerId="LiveId" clId="{70051DB0-1E4A-4F76-B9FF-8FCA6C4B0B08}" dt="2020-10-14T11:03:10.696" v="1511" actId="20577"/>
+          <ac:chgData name="Andrew Ming Ho Wu" userId="620d876fccae6a25" providerId="LiveId" clId="{B8CC6B97-FBEB-4E84-A973-1D8D00A51797}" dt="2020-12-07T11:47:32.514" v="4" actId="20577"/>
           <ac:spMkLst>
             <pc:docMk/>
             <pc:sldMk cId="0" sldId="256"/>
@@ -4778,263 +4920,116 @@
           </ac:spMkLst>
         </pc:spChg>
       </pc:sldChg>
+      <pc:sldChg chg="modSp del mod">
+        <pc:chgData name="Andrew Ming Ho Wu" userId="620d876fccae6a25" providerId="LiveId" clId="{B8CC6B97-FBEB-4E84-A973-1D8D00A51797}" dt="2020-12-07T14:43:22.840" v="2386" actId="47"/>
+        <pc:sldMkLst>
+          <pc:docMk/>
+          <pc:sldMk cId="3627176467" sldId="330"/>
+        </pc:sldMkLst>
+        <pc:spChg chg="mod">
+          <ac:chgData name="Andrew Ming Ho Wu" userId="620d876fccae6a25" providerId="LiveId" clId="{B8CC6B97-FBEB-4E84-A973-1D8D00A51797}" dt="2020-12-07T11:49:36.385" v="427" actId="115"/>
+          <ac:spMkLst>
+            <pc:docMk/>
+            <pc:sldMk cId="3627176467" sldId="330"/>
+            <ac:spMk id="11" creationId="{51D20990-98D9-4852-A91C-AEF4EC3755F8}"/>
+          </ac:spMkLst>
+        </pc:spChg>
+      </pc:sldChg>
       <pc:sldChg chg="addSp delSp modSp mod">
-        <pc:chgData name="Andrew Ming Ho Wu" userId="620d876fccae6a25" providerId="LiveId" clId="{70051DB0-1E4A-4F76-B9FF-8FCA6C4B0B08}" dt="2020-10-16T08:14:10.986" v="1623" actId="1076"/>
-        <pc:sldMkLst>
-          <pc:docMk/>
-          <pc:sldMk cId="0" sldId="259"/>
-        </pc:sldMkLst>
-        <pc:spChg chg="mod">
-          <ac:chgData name="Andrew Ming Ho Wu" userId="620d876fccae6a25" providerId="LiveId" clId="{70051DB0-1E4A-4F76-B9FF-8FCA6C4B0B08}" dt="2020-10-16T08:14:10.986" v="1623" actId="1076"/>
-          <ac:spMkLst>
-            <pc:docMk/>
-            <pc:sldMk cId="0" sldId="259"/>
+        <pc:chgData name="Andrew Ming Ho Wu" userId="620d876fccae6a25" providerId="LiveId" clId="{B8CC6B97-FBEB-4E84-A973-1D8D00A51797}" dt="2020-12-09T20:19:32.434" v="3257" actId="20577"/>
+        <pc:sldMkLst>
+          <pc:docMk/>
+          <pc:sldMk cId="2206058006" sldId="333"/>
+        </pc:sldMkLst>
+        <pc:spChg chg="mod">
+          <ac:chgData name="Andrew Ming Ho Wu" userId="620d876fccae6a25" providerId="LiveId" clId="{B8CC6B97-FBEB-4E84-A973-1D8D00A51797}" dt="2020-12-08T20:51:48.995" v="2411" actId="20577"/>
+          <ac:spMkLst>
+            <pc:docMk/>
+            <pc:sldMk cId="2206058006" sldId="333"/>
             <ac:spMk id="5" creationId="{00000000-0000-0000-0000-000000000000}"/>
           </ac:spMkLst>
         </pc:spChg>
-        <pc:spChg chg="del mod">
-          <ac:chgData name="Andrew Ming Ho Wu" userId="620d876fccae6a25" providerId="LiveId" clId="{70051DB0-1E4A-4F76-B9FF-8FCA6C4B0B08}" dt="2020-10-14T10:56:16.263" v="803"/>
-          <ac:spMkLst>
-            <pc:docMk/>
-            <pc:sldMk cId="0" sldId="259"/>
-            <ac:spMk id="12" creationId="{7E70BACB-1CF0-4DEE-923B-205A7D88BC2B}"/>
-          </ac:spMkLst>
-        </pc:spChg>
-        <pc:graphicFrameChg chg="add del mod modGraphic">
-          <ac:chgData name="Andrew Ming Ho Wu" userId="620d876fccae6a25" providerId="LiveId" clId="{70051DB0-1E4A-4F76-B9FF-8FCA6C4B0B08}" dt="2020-10-16T08:13:58.412" v="1603" actId="478"/>
-          <ac:graphicFrameMkLst>
-            <pc:docMk/>
-            <pc:sldMk cId="0" sldId="259"/>
-            <ac:graphicFrameMk id="6" creationId="{F9FF6ED5-1599-4BAE-B1B8-E9E0AA0B54BA}"/>
-          </ac:graphicFrameMkLst>
-        </pc:graphicFrameChg>
-      </pc:sldChg>
-      <pc:sldChg chg="modSp del mod">
-        <pc:chgData name="Andrew Ming Ho Wu" userId="620d876fccae6a25" providerId="LiveId" clId="{70051DB0-1E4A-4F76-B9FF-8FCA6C4B0B08}" dt="2020-10-16T08:14:23.170" v="1624" actId="2696"/>
-        <pc:sldMkLst>
-          <pc:docMk/>
-          <pc:sldMk cId="4141595128" sldId="301"/>
-        </pc:sldMkLst>
-        <pc:spChg chg="mod">
-          <ac:chgData name="Andrew Ming Ho Wu" userId="620d876fccae6a25" providerId="LiveId" clId="{70051DB0-1E4A-4F76-B9FF-8FCA6C4B0B08}" dt="2020-10-14T10:57:15.205" v="832" actId="20577"/>
-          <ac:spMkLst>
-            <pc:docMk/>
-            <pc:sldMk cId="4141595128" sldId="301"/>
-            <ac:spMk id="5" creationId="{00000000-0000-0000-0000-000000000000}"/>
-          </ac:spMkLst>
-        </pc:spChg>
-        <pc:spChg chg="mod">
-          <ac:chgData name="Andrew Ming Ho Wu" userId="620d876fccae6a25" providerId="LiveId" clId="{70051DB0-1E4A-4F76-B9FF-8FCA6C4B0B08}" dt="2020-10-14T10:57:56.133" v="1014" actId="1076"/>
-          <ac:spMkLst>
-            <pc:docMk/>
-            <pc:sldMk cId="4141595128" sldId="301"/>
-            <ac:spMk id="12" creationId="{7E70BACB-1CF0-4DEE-923B-205A7D88BC2B}"/>
-          </ac:spMkLst>
-        </pc:spChg>
-      </pc:sldChg>
-      <pc:sldChg chg="modSp mod">
-        <pc:chgData name="Andrew Ming Ho Wu" userId="620d876fccae6a25" providerId="LiveId" clId="{70051DB0-1E4A-4F76-B9FF-8FCA6C4B0B08}" dt="2020-10-16T08:50:56.802" v="1997" actId="5793"/>
-        <pc:sldMkLst>
-          <pc:docMk/>
-          <pc:sldMk cId="428898620" sldId="329"/>
-        </pc:sldMkLst>
-        <pc:spChg chg="mod">
-          <ac:chgData name="Andrew Ming Ho Wu" userId="620d876fccae6a25" providerId="LiveId" clId="{70051DB0-1E4A-4F76-B9FF-8FCA6C4B0B08}" dt="2020-10-14T10:58:08.788" v="1025" actId="20577"/>
-          <ac:spMkLst>
-            <pc:docMk/>
-            <pc:sldMk cId="428898620" sldId="329"/>
-            <ac:spMk id="5" creationId="{00000000-0000-0000-0000-000000000000}"/>
-          </ac:spMkLst>
-        </pc:spChg>
-        <pc:spChg chg="mod">
-          <ac:chgData name="Andrew Ming Ho Wu" userId="620d876fccae6a25" providerId="LiveId" clId="{70051DB0-1E4A-4F76-B9FF-8FCA6C4B0B08}" dt="2020-10-16T08:50:56.802" v="1997" actId="5793"/>
-          <ac:spMkLst>
-            <pc:docMk/>
-            <pc:sldMk cId="428898620" sldId="329"/>
-            <ac:spMk id="12" creationId="{7E70BACB-1CF0-4DEE-923B-205A7D88BC2B}"/>
-          </ac:spMkLst>
-        </pc:spChg>
-      </pc:sldChg>
-      <pc:sldChg chg="addSp delSp modSp mod">
-        <pc:chgData name="Andrew Ming Ho Wu" userId="620d876fccae6a25" providerId="LiveId" clId="{70051DB0-1E4A-4F76-B9FF-8FCA6C4B0B08}" dt="2020-10-14T11:04:43.468" v="1595" actId="1076"/>
-        <pc:sldMkLst>
-          <pc:docMk/>
-          <pc:sldMk cId="3627176467" sldId="330"/>
-        </pc:sldMkLst>
-        <pc:spChg chg="mod">
-          <ac:chgData name="Andrew Ming Ho Wu" userId="620d876fccae6a25" providerId="LiveId" clId="{70051DB0-1E4A-4F76-B9FF-8FCA6C4B0B08}" dt="2020-10-14T11:04:43.468" v="1595" actId="1076"/>
-          <ac:spMkLst>
-            <pc:docMk/>
-            <pc:sldMk cId="3627176467" sldId="330"/>
-            <ac:spMk id="5" creationId="{00000000-0000-0000-0000-000000000000}"/>
+        <pc:spChg chg="del">
+          <ac:chgData name="Andrew Ming Ho Wu" userId="620d876fccae6a25" providerId="LiveId" clId="{B8CC6B97-FBEB-4E84-A973-1D8D00A51797}" dt="2020-12-07T11:49:40.438" v="428" actId="478"/>
+          <ac:spMkLst>
+            <pc:docMk/>
+            <pc:sldMk cId="2206058006" sldId="333"/>
+            <ac:spMk id="11" creationId="{3E2506E2-B67A-4B0D-BA61-6B13AC56BACF}"/>
           </ac:spMkLst>
         </pc:spChg>
         <pc:spChg chg="add del mod">
-          <ac:chgData name="Andrew Ming Ho Wu" userId="620d876fccae6a25" providerId="LiveId" clId="{70051DB0-1E4A-4F76-B9FF-8FCA6C4B0B08}" dt="2020-10-14T11:02:05.801" v="1498" actId="20577"/>
-          <ac:spMkLst>
-            <pc:docMk/>
-            <pc:sldMk cId="3627176467" sldId="330"/>
-            <ac:spMk id="12" creationId="{7E70BACB-1CF0-4DEE-923B-205A7D88BC2B}"/>
-          </ac:spMkLst>
-        </pc:spChg>
-      </pc:sldChg>
-      <pc:sldChg chg="delSp modSp mod">
-        <pc:chgData name="Andrew Ming Ho Wu" userId="620d876fccae6a25" providerId="LiveId" clId="{70051DB0-1E4A-4F76-B9FF-8FCA6C4B0B08}" dt="2020-10-14T11:02:51.398" v="1506" actId="1076"/>
-        <pc:sldMkLst>
-          <pc:docMk/>
-          <pc:sldMk cId="311588258" sldId="331"/>
-        </pc:sldMkLst>
-        <pc:spChg chg="mod">
-          <ac:chgData name="Andrew Ming Ho Wu" userId="620d876fccae6a25" providerId="LiveId" clId="{70051DB0-1E4A-4F76-B9FF-8FCA6C4B0B08}" dt="2020-10-14T11:02:51.398" v="1506" actId="1076"/>
-          <ac:spMkLst>
-            <pc:docMk/>
-            <pc:sldMk cId="311588258" sldId="331"/>
-            <ac:spMk id="5" creationId="{00000000-0000-0000-0000-000000000000}"/>
-          </ac:spMkLst>
-        </pc:spChg>
-        <pc:spChg chg="del">
-          <ac:chgData name="Andrew Ming Ho Wu" userId="620d876fccae6a25" providerId="LiveId" clId="{70051DB0-1E4A-4F76-B9FF-8FCA6C4B0B08}" dt="2020-10-14T11:02:34.036" v="1502" actId="478"/>
-          <ac:spMkLst>
-            <pc:docMk/>
-            <pc:sldMk cId="311588258" sldId="331"/>
-            <ac:spMk id="12" creationId="{7E70BACB-1CF0-4DEE-923B-205A7D88BC2B}"/>
+          <ac:chgData name="Andrew Ming Ho Wu" userId="620d876fccae6a25" providerId="LiveId" clId="{B8CC6B97-FBEB-4E84-A973-1D8D00A51797}" dt="2020-12-09T20:19:32.434" v="3257" actId="20577"/>
+          <ac:spMkLst>
+            <pc:docMk/>
+            <pc:sldMk cId="2206058006" sldId="333"/>
+            <ac:spMk id="12" creationId="{11F2B6B6-0466-4FF3-9677-694F0F61AE7C}"/>
           </ac:spMkLst>
         </pc:spChg>
         <pc:grpChg chg="mod">
-          <ac:chgData name="Andrew Ming Ho Wu" userId="620d876fccae6a25" providerId="LiveId" clId="{70051DB0-1E4A-4F76-B9FF-8FCA6C4B0B08}" dt="2020-10-14T11:02:46.399" v="1505" actId="1076"/>
+          <ac:chgData name="Andrew Ming Ho Wu" userId="620d876fccae6a25" providerId="LiveId" clId="{B8CC6B97-FBEB-4E84-A973-1D8D00A51797}" dt="2020-12-07T11:50:20.258" v="465" actId="1076"/>
           <ac:grpSpMkLst>
             <pc:docMk/>
-            <pc:sldMk cId="311588258" sldId="331"/>
+            <pc:sldMk cId="2206058006" sldId="333"/>
             <ac:grpSpMk id="2" creationId="{00000000-0000-0000-0000-000000000000}"/>
           </ac:grpSpMkLst>
         </pc:grpChg>
-      </pc:sldChg>
-      <pc:sldChg chg="del">
-        <pc:chgData name="Andrew Ming Ho Wu" userId="620d876fccae6a25" providerId="LiveId" clId="{70051DB0-1E4A-4F76-B9FF-8FCA6C4B0B08}" dt="2020-10-14T11:02:58.709" v="1507" actId="2696"/>
-        <pc:sldMkLst>
-          <pc:docMk/>
-          <pc:sldMk cId="1678336179" sldId="332"/>
-        </pc:sldMkLst>
-      </pc:sldChg>
-      <pc:sldChg chg="modSp mod">
-        <pc:chgData name="Andrew Ming Ho Wu" userId="620d876fccae6a25" providerId="LiveId" clId="{70051DB0-1E4A-4F76-B9FF-8FCA6C4B0B08}" dt="2020-10-16T08:31:21.227" v="1924" actId="20577"/>
-        <pc:sldMkLst>
-          <pc:docMk/>
-          <pc:sldMk cId="2206058006" sldId="333"/>
-        </pc:sldMkLst>
-        <pc:spChg chg="mod">
-          <ac:chgData name="Andrew Ming Ho Wu" userId="620d876fccae6a25" providerId="LiveId" clId="{70051DB0-1E4A-4F76-B9FF-8FCA6C4B0B08}" dt="2020-10-16T08:17:59.360" v="1712" actId="20577"/>
-          <ac:spMkLst>
+        <pc:grpChg chg="mod">
+          <ac:chgData name="Andrew Ming Ho Wu" userId="620d876fccae6a25" providerId="LiveId" clId="{B8CC6B97-FBEB-4E84-A973-1D8D00A51797}" dt="2020-12-07T11:50:22.733" v="466" actId="1076"/>
+          <ac:grpSpMkLst>
             <pc:docMk/>
             <pc:sldMk cId="2206058006" sldId="333"/>
-            <ac:spMk id="5" creationId="{00000000-0000-0000-0000-000000000000}"/>
-          </ac:spMkLst>
-        </pc:spChg>
-        <pc:spChg chg="mod">
-          <ac:chgData name="Andrew Ming Ho Wu" userId="620d876fccae6a25" providerId="LiveId" clId="{70051DB0-1E4A-4F76-B9FF-8FCA6C4B0B08}" dt="2020-10-16T08:31:21.227" v="1924" actId="20577"/>
-          <ac:spMkLst>
-            <pc:docMk/>
-            <pc:sldMk cId="2206058006" sldId="333"/>
-            <ac:spMk id="12" creationId="{7E70BACB-1CF0-4DEE-923B-205A7D88BC2B}"/>
-          </ac:spMkLst>
-        </pc:spChg>
-      </pc:sldChg>
-      <pc:sldChg chg="del">
-        <pc:chgData name="Andrew Ming Ho Wu" userId="620d876fccae6a25" providerId="LiveId" clId="{70051DB0-1E4A-4F76-B9FF-8FCA6C4B0B08}" dt="2020-10-14T10:49:02.566" v="132" actId="2696"/>
-        <pc:sldMkLst>
-          <pc:docMk/>
-          <pc:sldMk cId="1994449026" sldId="335"/>
-        </pc:sldMkLst>
-      </pc:sldChg>
-      <pc:sldChg chg="del">
-        <pc:chgData name="Andrew Ming Ho Wu" userId="620d876fccae6a25" providerId="LiveId" clId="{70051DB0-1E4A-4F76-B9FF-8FCA6C4B0B08}" dt="2020-10-14T11:02:58.709" v="1507" actId="2696"/>
-        <pc:sldMkLst>
-          <pc:docMk/>
-          <pc:sldMk cId="491446009" sldId="336"/>
-        </pc:sldMkLst>
-      </pc:sldChg>
-      <pc:sldChg chg="del">
-        <pc:chgData name="Andrew Ming Ho Wu" userId="620d876fccae6a25" providerId="LiveId" clId="{70051DB0-1E4A-4F76-B9FF-8FCA6C4B0B08}" dt="2020-10-14T11:02:58.709" v="1507" actId="2696"/>
-        <pc:sldMkLst>
-          <pc:docMk/>
-          <pc:sldMk cId="3153837584" sldId="337"/>
-        </pc:sldMkLst>
-      </pc:sldChg>
-      <pc:sldChg chg="del">
-        <pc:chgData name="Andrew Ming Ho Wu" userId="620d876fccae6a25" providerId="LiveId" clId="{70051DB0-1E4A-4F76-B9FF-8FCA6C4B0B08}" dt="2020-10-14T11:02:58.709" v="1507" actId="2696"/>
-        <pc:sldMkLst>
-          <pc:docMk/>
-          <pc:sldMk cId="1064973513" sldId="338"/>
-        </pc:sldMkLst>
-      </pc:sldChg>
-      <pc:sldChg chg="del">
-        <pc:chgData name="Andrew Ming Ho Wu" userId="620d876fccae6a25" providerId="LiveId" clId="{70051DB0-1E4A-4F76-B9FF-8FCA6C4B0B08}" dt="2020-10-14T11:02:58.709" v="1507" actId="2696"/>
-        <pc:sldMkLst>
-          <pc:docMk/>
-          <pc:sldMk cId="3865668538" sldId="339"/>
-        </pc:sldMkLst>
-      </pc:sldChg>
-      <pc:sldChg chg="del">
-        <pc:chgData name="Andrew Ming Ho Wu" userId="620d876fccae6a25" providerId="LiveId" clId="{70051DB0-1E4A-4F76-B9FF-8FCA6C4B0B08}" dt="2020-10-14T11:02:58.709" v="1507" actId="2696"/>
-        <pc:sldMkLst>
-          <pc:docMk/>
-          <pc:sldMk cId="1140042678" sldId="340"/>
-        </pc:sldMkLst>
-      </pc:sldChg>
-      <pc:sldChg chg="del">
-        <pc:chgData name="Andrew Ming Ho Wu" userId="620d876fccae6a25" providerId="LiveId" clId="{70051DB0-1E4A-4F76-B9FF-8FCA6C4B0B08}" dt="2020-10-14T11:02:58.709" v="1507" actId="2696"/>
-        <pc:sldMkLst>
-          <pc:docMk/>
-          <pc:sldMk cId="2792681432" sldId="341"/>
-        </pc:sldMkLst>
-      </pc:sldChg>
-      <pc:sldChg chg="del">
-        <pc:chgData name="Andrew Ming Ho Wu" userId="620d876fccae6a25" providerId="LiveId" clId="{70051DB0-1E4A-4F76-B9FF-8FCA6C4B0B08}" dt="2020-10-14T11:02:58.709" v="1507" actId="2696"/>
-        <pc:sldMkLst>
-          <pc:docMk/>
-          <pc:sldMk cId="3458398597" sldId="342"/>
-        </pc:sldMkLst>
-      </pc:sldChg>
-      <pc:sldChg chg="delSp modSp mod">
-        <pc:chgData name="Andrew Ming Ho Wu" userId="620d876fccae6a25" providerId="LiveId" clId="{70051DB0-1E4A-4F76-B9FF-8FCA6C4B0B08}" dt="2020-10-16T08:17:39.434" v="1697" actId="20577"/>
+            <ac:grpSpMk id="8" creationId="{00000000-0000-0000-0000-000000000000}"/>
+          </ac:grpSpMkLst>
+        </pc:grpChg>
+      </pc:sldChg>
+      <pc:sldChg chg="addSp delSp modSp mod">
+        <pc:chgData name="Andrew Ming Ho Wu" userId="620d876fccae6a25" providerId="LiveId" clId="{B8CC6B97-FBEB-4E84-A973-1D8D00A51797}" dt="2020-12-07T12:17:11.563" v="2385" actId="20577"/>
         <pc:sldMkLst>
           <pc:docMk/>
           <pc:sldMk cId="2818220858" sldId="343"/>
         </pc:sldMkLst>
         <pc:spChg chg="mod">
-          <ac:chgData name="Andrew Ming Ho Wu" userId="620d876fccae6a25" providerId="LiveId" clId="{70051DB0-1E4A-4F76-B9FF-8FCA6C4B0B08}" dt="2020-10-16T08:17:39.434" v="1697" actId="20577"/>
+          <ac:chgData name="Andrew Ming Ho Wu" userId="620d876fccae6a25" providerId="LiveId" clId="{B8CC6B97-FBEB-4E84-A973-1D8D00A51797}" dt="2020-12-07T12:16:53.205" v="2364" actId="1076"/>
           <ac:spMkLst>
             <pc:docMk/>
             <pc:sldMk cId="2818220858" sldId="343"/>
             <ac:spMk id="5" creationId="{81D7F47C-B22C-46A9-BD87-E2FA064EC20F}"/>
           </ac:spMkLst>
         </pc:spChg>
-        <pc:spChg chg="del">
-          <ac:chgData name="Andrew Ming Ho Wu" userId="620d876fccae6a25" providerId="LiveId" clId="{70051DB0-1E4A-4F76-B9FF-8FCA6C4B0B08}" dt="2020-10-14T10:48:34.682" v="129" actId="478"/>
+        <pc:spChg chg="mod">
+          <ac:chgData name="Andrew Ming Ho Wu" userId="620d876fccae6a25" providerId="LiveId" clId="{B8CC6B97-FBEB-4E84-A973-1D8D00A51797}" dt="2020-12-07T12:16:25.853" v="2338" actId="20577"/>
           <ac:spMkLst>
             <pc:docMk/>
             <pc:sldMk cId="2818220858" sldId="343"/>
-            <ac:spMk id="7" creationId="{8F1A7018-DAB3-4DD6-9851-CCE349574926}"/>
-          </ac:spMkLst>
-        </pc:spChg>
-        <pc:spChg chg="mod">
-          <ac:chgData name="Andrew Ming Ho Wu" userId="620d876fccae6a25" providerId="LiveId" clId="{70051DB0-1E4A-4F76-B9FF-8FCA6C4B0B08}" dt="2020-10-16T08:17:36.046" v="1691" actId="20577"/>
+            <ac:spMk id="8" creationId="{9D42ABF8-029E-4F29-B608-8C118D28ABA1}"/>
+          </ac:spMkLst>
+        </pc:spChg>
+        <pc:spChg chg="add del mod">
+          <ac:chgData name="Andrew Ming Ho Wu" userId="620d876fccae6a25" providerId="LiveId" clId="{B8CC6B97-FBEB-4E84-A973-1D8D00A51797}" dt="2020-12-07T12:17:00.094" v="2366"/>
+          <ac:spMkLst>
+            <pc:docMk/>
+            <pc:sldMk cId="2818220858" sldId="343"/>
+            <ac:spMk id="14" creationId="{4008C9F8-7034-4640-926C-69C20356432C}"/>
+          </ac:spMkLst>
+        </pc:spChg>
+        <pc:spChg chg="mod">
+          <ac:chgData name="Andrew Ming Ho Wu" userId="620d876fccae6a25" providerId="LiveId" clId="{B8CC6B97-FBEB-4E84-A973-1D8D00A51797}" dt="2020-12-07T11:47:46.566" v="35" actId="20577"/>
           <ac:spMkLst>
             <pc:docMk/>
             <pc:sldMk cId="2818220858" sldId="343"/>
             <ac:spMk id="15" creationId="{5FC8DCBF-4CCE-4C22-8B9F-CC50B4D8446D}"/>
           </ac:spMkLst>
         </pc:spChg>
-        <pc:spChg chg="del">
-          <ac:chgData name="Andrew Ming Ho Wu" userId="620d876fccae6a25" providerId="LiveId" clId="{70051DB0-1E4A-4F76-B9FF-8FCA6C4B0B08}" dt="2020-10-14T10:48:41.238" v="130" actId="478"/>
+        <pc:spChg chg="add mod">
+          <ac:chgData name="Andrew Ming Ho Wu" userId="620d876fccae6a25" providerId="LiveId" clId="{B8CC6B97-FBEB-4E84-A973-1D8D00A51797}" dt="2020-12-07T12:17:11.563" v="2385" actId="20577"/>
           <ac:spMkLst>
             <pc:docMk/>
             <pc:sldMk cId="2818220858" sldId="343"/>
-            <ac:spMk id="20" creationId="{A6F76399-04DE-46A8-BF2C-99ED8D141BD3}"/>
+            <ac:spMk id="16" creationId="{9776CE46-BCD9-4FBA-A83A-BE5C5D29A965}"/>
           </ac:spMkLst>
         </pc:spChg>
         <pc:grpChg chg="mod">
-          <ac:chgData name="Andrew Ming Ho Wu" userId="620d876fccae6a25" providerId="LiveId" clId="{70051DB0-1E4A-4F76-B9FF-8FCA6C4B0B08}" dt="2020-10-14T11:03:31.434" v="1538" actId="1076"/>
+          <ac:chgData name="Andrew Ming Ho Wu" userId="620d876fccae6a25" providerId="LiveId" clId="{B8CC6B97-FBEB-4E84-A973-1D8D00A51797}" dt="2020-12-07T12:16:48.563" v="2363" actId="1076"/>
           <ac:grpSpMkLst>
             <pc:docMk/>
             <pc:sldMk cId="2818220858" sldId="343"/>
@@ -5042,119 +5037,125 @@
           </ac:grpSpMkLst>
         </pc:grpChg>
       </pc:sldChg>
+      <pc:sldChg chg="modSp mod">
+        <pc:chgData name="Andrew Ming Ho Wu" userId="620d876fccae6a25" providerId="LiveId" clId="{B8CC6B97-FBEB-4E84-A973-1D8D00A51797}" dt="2020-12-07T12:12:01.475" v="2130" actId="20577"/>
+        <pc:sldMkLst>
+          <pc:docMk/>
+          <pc:sldMk cId="1002563172" sldId="387"/>
+        </pc:sldMkLst>
+        <pc:spChg chg="mod">
+          <ac:chgData name="Andrew Ming Ho Wu" userId="620d876fccae6a25" providerId="LiveId" clId="{B8CC6B97-FBEB-4E84-A973-1D8D00A51797}" dt="2020-12-07T12:12:01.475" v="2130" actId="20577"/>
+          <ac:spMkLst>
+            <pc:docMk/>
+            <pc:sldMk cId="1002563172" sldId="387"/>
+            <ac:spMk id="5" creationId="{00000000-0000-0000-0000-000000000000}"/>
+          </ac:spMkLst>
+        </pc:spChg>
+      </pc:sldChg>
+      <pc:sldChg chg="modSp add mod">
+        <pc:chgData name="Andrew Ming Ho Wu" userId="620d876fccae6a25" providerId="LiveId" clId="{B8CC6B97-FBEB-4E84-A973-1D8D00A51797}" dt="2020-12-09T20:21:14.831" v="3322" actId="1076"/>
+        <pc:sldMkLst>
+          <pc:docMk/>
+          <pc:sldMk cId="2049264590" sldId="388"/>
+        </pc:sldMkLst>
+        <pc:spChg chg="mod">
+          <ac:chgData name="Andrew Ming Ho Wu" userId="620d876fccae6a25" providerId="LiveId" clId="{B8CC6B97-FBEB-4E84-A973-1D8D00A51797}" dt="2020-12-09T20:21:14.831" v="3322" actId="1076"/>
+          <ac:spMkLst>
+            <pc:docMk/>
+            <pc:sldMk cId="2049264590" sldId="388"/>
+            <ac:spMk id="12" creationId="{11F2B6B6-0466-4FF3-9677-694F0F61AE7C}"/>
+          </ac:spMkLst>
+        </pc:spChg>
+      </pc:sldChg>
+      <pc:sldChg chg="add">
+        <pc:chgData name="Andrew Ming Ho Wu" userId="620d876fccae6a25" providerId="LiveId" clId="{B8CC6B97-FBEB-4E84-A973-1D8D00A51797}" dt="2020-12-07T12:11:57.600" v="2129" actId="2890"/>
+        <pc:sldMkLst>
+          <pc:docMk/>
+          <pc:sldMk cId="1012779811" sldId="389"/>
+        </pc:sldMkLst>
+      </pc:sldChg>
+      <pc:sldChg chg="modSp add mod">
+        <pc:chgData name="Andrew Ming Ho Wu" userId="620d876fccae6a25" providerId="LiveId" clId="{B8CC6B97-FBEB-4E84-A973-1D8D00A51797}" dt="2020-12-07T12:13:16.646" v="2234" actId="255"/>
+        <pc:sldMkLst>
+          <pc:docMk/>
+          <pc:sldMk cId="2782934202" sldId="390"/>
+        </pc:sldMkLst>
+        <pc:spChg chg="mod">
+          <ac:chgData name="Andrew Ming Ho Wu" userId="620d876fccae6a25" providerId="LiveId" clId="{B8CC6B97-FBEB-4E84-A973-1D8D00A51797}" dt="2020-12-07T12:12:22.476" v="2139" actId="20577"/>
+          <ac:spMkLst>
+            <pc:docMk/>
+            <pc:sldMk cId="2782934202" sldId="390"/>
+            <ac:spMk id="5" creationId="{00000000-0000-0000-0000-000000000000}"/>
+          </ac:spMkLst>
+        </pc:spChg>
+        <pc:spChg chg="mod">
+          <ac:chgData name="Andrew Ming Ho Wu" userId="620d876fccae6a25" providerId="LiveId" clId="{B8CC6B97-FBEB-4E84-A973-1D8D00A51797}" dt="2020-12-07T12:13:16.646" v="2234" actId="255"/>
+          <ac:spMkLst>
+            <pc:docMk/>
+            <pc:sldMk cId="2782934202" sldId="390"/>
+            <ac:spMk id="12" creationId="{11F2B6B6-0466-4FF3-9677-694F0F61AE7C}"/>
+          </ac:spMkLst>
+        </pc:spChg>
+      </pc:sldChg>
+      <pc:sldChg chg="modSp add mod">
+        <pc:chgData name="Andrew Ming Ho Wu" userId="620d876fccae6a25" providerId="LiveId" clId="{B8CC6B97-FBEB-4E84-A973-1D8D00A51797}" dt="2020-12-07T12:14:09.189" v="2268" actId="20577"/>
+        <pc:sldMkLst>
+          <pc:docMk/>
+          <pc:sldMk cId="2582986712" sldId="391"/>
+        </pc:sldMkLst>
+        <pc:spChg chg="mod">
+          <ac:chgData name="Andrew Ming Ho Wu" userId="620d876fccae6a25" providerId="LiveId" clId="{B8CC6B97-FBEB-4E84-A973-1D8D00A51797}" dt="2020-12-07T12:14:09.189" v="2268" actId="20577"/>
+          <ac:spMkLst>
+            <pc:docMk/>
+            <pc:sldMk cId="2582986712" sldId="391"/>
+            <ac:spMk id="12" creationId="{11F2B6B6-0466-4FF3-9677-694F0F61AE7C}"/>
+          </ac:spMkLst>
+        </pc:spChg>
+      </pc:sldChg>
+      <pc:sldChg chg="modSp add mod">
+        <pc:chgData name="Andrew Ming Ho Wu" userId="620d876fccae6a25" providerId="LiveId" clId="{B8CC6B97-FBEB-4E84-A973-1D8D00A51797}" dt="2020-12-07T12:15:51.208" v="2307" actId="255"/>
+        <pc:sldMkLst>
+          <pc:docMk/>
+          <pc:sldMk cId="161672857" sldId="392"/>
+        </pc:sldMkLst>
+        <pc:spChg chg="mod">
+          <ac:chgData name="Andrew Ming Ho Wu" userId="620d876fccae6a25" providerId="LiveId" clId="{B8CC6B97-FBEB-4E84-A973-1D8D00A51797}" dt="2020-12-07T12:15:14.773" v="2298" actId="20577"/>
+          <ac:spMkLst>
+            <pc:docMk/>
+            <pc:sldMk cId="161672857" sldId="392"/>
+            <ac:spMk id="5" creationId="{00000000-0000-0000-0000-000000000000}"/>
+          </ac:spMkLst>
+        </pc:spChg>
+        <pc:spChg chg="mod">
+          <ac:chgData name="Andrew Ming Ho Wu" userId="620d876fccae6a25" providerId="LiveId" clId="{B8CC6B97-FBEB-4E84-A973-1D8D00A51797}" dt="2020-12-07T12:15:51.208" v="2307" actId="255"/>
+          <ac:spMkLst>
+            <pc:docMk/>
+            <pc:sldMk cId="161672857" sldId="392"/>
+            <ac:spMk id="12" creationId="{11F2B6B6-0466-4FF3-9677-694F0F61AE7C}"/>
+          </ac:spMkLst>
+        </pc:spChg>
+      </pc:sldChg>
+      <pc:sldChg chg="modSp add mod">
+        <pc:chgData name="Andrew Ming Ho Wu" userId="620d876fccae6a25" providerId="LiveId" clId="{B8CC6B97-FBEB-4E84-A973-1D8D00A51797}" dt="2020-12-09T20:20:31.079" v="3296" actId="20577"/>
+        <pc:sldMkLst>
+          <pc:docMk/>
+          <pc:sldMk cId="226674003" sldId="393"/>
+        </pc:sldMkLst>
+        <pc:spChg chg="mod">
+          <ac:chgData name="Andrew Ming Ho Wu" userId="620d876fccae6a25" providerId="LiveId" clId="{B8CC6B97-FBEB-4E84-A973-1D8D00A51797}" dt="2020-12-09T20:20:31.079" v="3296" actId="20577"/>
+          <ac:spMkLst>
+            <pc:docMk/>
+            <pc:sldMk cId="226674003" sldId="393"/>
+            <ac:spMk id="12" creationId="{11F2B6B6-0466-4FF3-9677-694F0F61AE7C}"/>
+          </ac:spMkLst>
+        </pc:spChg>
+      </pc:sldChg>
       <pc:sldChg chg="add del">
-        <pc:chgData name="Andrew Ming Ho Wu" userId="620d876fccae6a25" providerId="LiveId" clId="{70051DB0-1E4A-4F76-B9FF-8FCA6C4B0B08}" dt="2020-10-16T08:17:51.506" v="1699" actId="2890"/>
-        <pc:sldMkLst>
-          <pc:docMk/>
-          <pc:sldMk cId="882795893" sldId="344"/>
-        </pc:sldMkLst>
-      </pc:sldChg>
-      <pc:sldChg chg="add">
-        <pc:chgData name="Andrew Ming Ho Wu" userId="620d876fccae6a25" providerId="LiveId" clId="{70051DB0-1E4A-4F76-B9FF-8FCA6C4B0B08}" dt="2020-10-16T08:17:54.089" v="1700" actId="2890"/>
-        <pc:sldMkLst>
-          <pc:docMk/>
-          <pc:sldMk cId="3427335621" sldId="344"/>
-        </pc:sldMkLst>
-      </pc:sldChg>
-    </pc:docChg>
-  </pc:docChgLst>
-  <pc:docChgLst>
-    <pc:chgData name="Andrew Ming Ho Wu" userId="620d876fccae6a25" providerId="LiveId" clId="{301D553B-ED1B-4DD0-8B60-0326FA0FE40D}"/>
-    <pc:docChg chg="undo custSel modSld sldOrd">
-      <pc:chgData name="Andrew Ming Ho Wu" userId="620d876fccae6a25" providerId="LiveId" clId="{301D553B-ED1B-4DD0-8B60-0326FA0FE40D}" dt="2020-12-04T09:57:29.774" v="2192" actId="20577"/>
-      <pc:docMkLst>
-        <pc:docMk/>
-      </pc:docMkLst>
-      <pc:sldChg chg="modSp mod">
-        <pc:chgData name="Andrew Ming Ho Wu" userId="620d876fccae6a25" providerId="LiveId" clId="{301D553B-ED1B-4DD0-8B60-0326FA0FE40D}" dt="2020-12-04T09:23:30.694" v="1648" actId="20577"/>
-        <pc:sldMkLst>
-          <pc:docMk/>
-          <pc:sldMk cId="0" sldId="256"/>
-        </pc:sldMkLst>
-        <pc:spChg chg="mod">
-          <ac:chgData name="Andrew Ming Ho Wu" userId="620d876fccae6a25" providerId="LiveId" clId="{301D553B-ED1B-4DD0-8B60-0326FA0FE40D}" dt="2020-12-04T09:23:30.694" v="1648" actId="20577"/>
-          <ac:spMkLst>
-            <pc:docMk/>
-            <pc:sldMk cId="0" sldId="256"/>
-            <ac:spMk id="12" creationId="{9A5C5996-C506-42D4-8B45-0190C0F5159A}"/>
-          </ac:spMkLst>
-        </pc:spChg>
-      </pc:sldChg>
-      <pc:sldChg chg="modSp mod ord">
-        <pc:chgData name="Andrew Ming Ho Wu" userId="620d876fccae6a25" providerId="LiveId" clId="{301D553B-ED1B-4DD0-8B60-0326FA0FE40D}" dt="2020-12-04T09:37:15.202" v="1818" actId="1076"/>
-        <pc:sldMkLst>
-          <pc:docMk/>
-          <pc:sldMk cId="3627176467" sldId="330"/>
-        </pc:sldMkLst>
-        <pc:spChg chg="mod">
-          <ac:chgData name="Andrew Ming Ho Wu" userId="620d876fccae6a25" providerId="LiveId" clId="{301D553B-ED1B-4DD0-8B60-0326FA0FE40D}" dt="2020-12-04T09:37:15.202" v="1818" actId="1076"/>
-          <ac:spMkLst>
-            <pc:docMk/>
-            <pc:sldMk cId="3627176467" sldId="330"/>
-            <ac:spMk id="11" creationId="{51D20990-98D9-4852-A91C-AEF4EC3755F8}"/>
-          </ac:spMkLst>
-        </pc:spChg>
-      </pc:sldChg>
-      <pc:sldChg chg="addSp delSp modSp mod">
-        <pc:chgData name="Andrew Ming Ho Wu" userId="620d876fccae6a25" providerId="LiveId" clId="{301D553B-ED1B-4DD0-8B60-0326FA0FE40D}" dt="2020-12-04T09:57:29.774" v="2192" actId="20577"/>
-        <pc:sldMkLst>
-          <pc:docMk/>
-          <pc:sldMk cId="2206058006" sldId="333"/>
-        </pc:sldMkLst>
-        <pc:spChg chg="mod">
-          <ac:chgData name="Andrew Ming Ho Wu" userId="620d876fccae6a25" providerId="LiveId" clId="{301D553B-ED1B-4DD0-8B60-0326FA0FE40D}" dt="2020-12-04T09:54:08.146" v="2088" actId="1076"/>
-          <ac:spMkLst>
-            <pc:docMk/>
-            <pc:sldMk cId="2206058006" sldId="333"/>
-            <ac:spMk id="5" creationId="{00000000-0000-0000-0000-000000000000}"/>
-          </ac:spMkLst>
-        </pc:spChg>
-        <pc:spChg chg="add del mod">
-          <ac:chgData name="Andrew Ming Ho Wu" userId="620d876fccae6a25" providerId="LiveId" clId="{301D553B-ED1B-4DD0-8B60-0326FA0FE40D}" dt="2020-12-04T09:57:29.774" v="2192" actId="20577"/>
-          <ac:spMkLst>
-            <pc:docMk/>
-            <pc:sldMk cId="2206058006" sldId="333"/>
-            <ac:spMk id="11" creationId="{3E2506E2-B67A-4B0D-BA61-6B13AC56BACF}"/>
-          </ac:spMkLst>
-        </pc:spChg>
-      </pc:sldChg>
-      <pc:sldChg chg="modSp mod">
-        <pc:chgData name="Andrew Ming Ho Wu" userId="620d876fccae6a25" providerId="LiveId" clId="{301D553B-ED1B-4DD0-8B60-0326FA0FE40D}" dt="2020-12-03T19:29:39.167" v="656" actId="20577"/>
-        <pc:sldMkLst>
-          <pc:docMk/>
-          <pc:sldMk cId="2818220858" sldId="343"/>
-        </pc:sldMkLst>
-        <pc:spChg chg="mod">
-          <ac:chgData name="Andrew Ming Ho Wu" userId="620d876fccae6a25" providerId="LiveId" clId="{301D553B-ED1B-4DD0-8B60-0326FA0FE40D}" dt="2020-12-03T19:29:34.248" v="655" actId="20577"/>
-          <ac:spMkLst>
-            <pc:docMk/>
-            <pc:sldMk cId="2818220858" sldId="343"/>
-            <ac:spMk id="8" creationId="{9D42ABF8-029E-4F29-B608-8C118D28ABA1}"/>
-          </ac:spMkLst>
-        </pc:spChg>
-        <pc:spChg chg="mod">
-          <ac:chgData name="Andrew Ming Ho Wu" userId="620d876fccae6a25" providerId="LiveId" clId="{301D553B-ED1B-4DD0-8B60-0326FA0FE40D}" dt="2020-12-03T19:29:39.167" v="656" actId="20577"/>
-          <ac:spMkLst>
-            <pc:docMk/>
-            <pc:sldMk cId="2818220858" sldId="343"/>
-            <ac:spMk id="15" creationId="{5FC8DCBF-4CCE-4C22-8B9F-CC50B4D8446D}"/>
-          </ac:spMkLst>
-        </pc:spChg>
-      </pc:sldChg>
-      <pc:sldChg chg="addSp delSp modSp mod">
-        <pc:chgData name="Andrew Ming Ho Wu" userId="620d876fccae6a25" providerId="LiveId" clId="{301D553B-ED1B-4DD0-8B60-0326FA0FE40D}" dt="2020-12-03T19:23:50.731" v="4"/>
-        <pc:sldMkLst>
-          <pc:docMk/>
-          <pc:sldMk cId="1002563172" sldId="387"/>
-        </pc:sldMkLst>
-        <pc:spChg chg="add del mod">
-          <ac:chgData name="Andrew Ming Ho Wu" userId="620d876fccae6a25" providerId="LiveId" clId="{301D553B-ED1B-4DD0-8B60-0326FA0FE40D}" dt="2020-12-03T19:23:50.731" v="4"/>
-          <ac:spMkLst>
-            <pc:docMk/>
-            <pc:sldMk cId="1002563172" sldId="387"/>
-            <ac:spMk id="11" creationId="{BA618F6F-1997-4079-B11E-BC24229FBCC5}"/>
-          </ac:spMkLst>
-        </pc:spChg>
+        <pc:chgData name="Andrew Ming Ho Wu" userId="620d876fccae6a25" providerId="LiveId" clId="{B8CC6B97-FBEB-4E84-A973-1D8D00A51797}" dt="2020-12-08T20:51:41.486" v="2393"/>
+        <pc:sldMkLst>
+          <pc:docMk/>
+          <pc:sldMk cId="1879883029" sldId="393"/>
+        </pc:sldMkLst>
       </pc:sldChg>
     </pc:docChg>
   </pc:docChgLst>
@@ -5554,7 +5555,7 @@
           <a:p>
             <a:fld id="{F3B73EDB-C001-4FA3-A8F8-70B0B97F7CFF}" type="datetimeFigureOut">
               <a:rPr lang="en-GB" smtClean="0"/>
-              <a:t>04/01/2021</a:t>
+              <a:t>07/01/2021</a:t>
             </a:fld>
             <a:endParaRPr lang="en-GB"/>
           </a:p>
@@ -6232,7 +6233,7 @@
     </p:spTree>
     <p:extLst>
       <p:ext uri="{BB962C8B-B14F-4D97-AF65-F5344CB8AC3E}">
-        <p14:creationId xmlns:p14="http://schemas.microsoft.com/office/powerpoint/2010/main" val="1781806306"/>
+        <p14:creationId xmlns:p14="http://schemas.microsoft.com/office/powerpoint/2010/main" val="1047719946"/>
       </p:ext>
     </p:extLst>
   </p:cSld>
@@ -6316,7 +6317,7 @@
     </p:spTree>
     <p:extLst>
       <p:ext uri="{BB962C8B-B14F-4D97-AF65-F5344CB8AC3E}">
-        <p14:creationId xmlns:p14="http://schemas.microsoft.com/office/powerpoint/2010/main" val="3224860338"/>
+        <p14:creationId xmlns:p14="http://schemas.microsoft.com/office/powerpoint/2010/main" val="1781806306"/>
       </p:ext>
     </p:extLst>
   </p:cSld>
@@ -6400,7 +6401,7 @@
     </p:spTree>
     <p:extLst>
       <p:ext uri="{BB962C8B-B14F-4D97-AF65-F5344CB8AC3E}">
-        <p14:creationId xmlns:p14="http://schemas.microsoft.com/office/powerpoint/2010/main" val="178408748"/>
+        <p14:creationId xmlns:p14="http://schemas.microsoft.com/office/powerpoint/2010/main" val="3224860338"/>
       </p:ext>
     </p:extLst>
   </p:cSld>
@@ -6476,6 +6477,90 @@
             <a:fld id="{42012BB9-F1C6-4F87-A02A-58E570AE5C98}" type="slidenum">
               <a:rPr lang="en-GB" smtClean="0"/>
               <a:t>8</a:t>
+            </a:fld>
+            <a:endParaRPr lang="en-GB"/>
+          </a:p>
+        </p:txBody>
+      </p:sp>
+    </p:spTree>
+    <p:extLst>
+      <p:ext uri="{BB962C8B-B14F-4D97-AF65-F5344CB8AC3E}">
+        <p14:creationId xmlns:p14="http://schemas.microsoft.com/office/powerpoint/2010/main" val="178408748"/>
+      </p:ext>
+    </p:extLst>
+  </p:cSld>
+  <p:clrMapOvr>
+    <a:masterClrMapping/>
+  </p:clrMapOvr>
+</p:notes>
+</file>
+
+<file path=ppt/notesSlides/notesSlide9.xml><?xml version="1.0" encoding="utf-8"?>
+<p:notes xmlns:a="http://schemas.openxmlformats.org/drawingml/2006/main" xmlns:r="http://schemas.openxmlformats.org/officeDocument/2006/relationships" xmlns:p="http://schemas.openxmlformats.org/presentationml/2006/main">
+  <p:cSld>
+    <p:spTree>
+      <p:nvGrpSpPr>
+        <p:cNvPr id="1" name=""/>
+        <p:cNvGrpSpPr/>
+        <p:nvPr/>
+      </p:nvGrpSpPr>
+      <p:grpSpPr>
+        <a:xfrm>
+          <a:off x="0" y="0"/>
+          <a:ext cx="0" cy="0"/>
+          <a:chOff x="0" y="0"/>
+          <a:chExt cx="0" cy="0"/>
+        </a:xfrm>
+      </p:grpSpPr>
+      <p:sp>
+        <p:nvSpPr>
+          <p:cNvPr id="2" name="Slide Image Placeholder 1"/>
+          <p:cNvSpPr>
+            <a:spLocks noGrp="1" noRot="1" noChangeAspect="1"/>
+          </p:cNvSpPr>
+          <p:nvPr>
+            <p:ph type="sldImg"/>
+          </p:nvPr>
+        </p:nvSpPr>
+        <p:spPr/>
+      </p:sp>
+      <p:sp>
+        <p:nvSpPr>
+          <p:cNvPr id="3" name="Notes Placeholder 2"/>
+          <p:cNvSpPr>
+            <a:spLocks noGrp="1"/>
+          </p:cNvSpPr>
+          <p:nvPr>
+            <p:ph type="body" idx="1"/>
+          </p:nvPr>
+        </p:nvSpPr>
+        <p:spPr/>
+        <p:txBody>
+          <a:bodyPr/>
+          <a:lstStyle/>
+          <a:p>
+            <a:endParaRPr lang="en-GB" dirty="0"/>
+          </a:p>
+        </p:txBody>
+      </p:sp>
+      <p:sp>
+        <p:nvSpPr>
+          <p:cNvPr id="4" name="Slide Number Placeholder 3"/>
+          <p:cNvSpPr>
+            <a:spLocks noGrp="1"/>
+          </p:cNvSpPr>
+          <p:nvPr>
+            <p:ph type="sldNum" sz="quarter" idx="5"/>
+          </p:nvPr>
+        </p:nvSpPr>
+        <p:spPr/>
+        <p:txBody>
+          <a:bodyPr/>
+          <a:lstStyle/>
+          <a:p>
+            <a:fld id="{42012BB9-F1C6-4F87-A02A-58E570AE5C98}" type="slidenum">
+              <a:rPr lang="en-GB" smtClean="0"/>
+              <a:t>9</a:t>
             </a:fld>
             <a:endParaRPr lang="en-GB"/>
           </a:p>
@@ -6633,7 +6718,7 @@
           <a:p>
             <a:fld id="{1D8BD707-D9CF-40AE-B4C6-C98DA3205C09}" type="datetimeFigureOut">
               <a:rPr lang="en-US"/>
-              <a:t>1/4/2021</a:t>
+              <a:t>1/7/2021</a:t>
             </a:fld>
             <a:endParaRPr lang="en-US"/>
           </a:p>
@@ -6808,7 +6893,7 @@
           <a:p>
             <a:fld id="{1D8BD707-D9CF-40AE-B4C6-C98DA3205C09}" type="datetimeFigureOut">
               <a:rPr lang="en-US"/>
-              <a:t>1/4/2021</a:t>
+              <a:t>1/7/2021</a:t>
             </a:fld>
             <a:endParaRPr lang="en-US"/>
           </a:p>
@@ -7022,7 +7107,7 @@
           <a:p>
             <a:fld id="{1D8BD707-D9CF-40AE-B4C6-C98DA3205C09}" type="datetimeFigureOut">
               <a:rPr lang="en-US"/>
-              <a:t>1/4/2021</a:t>
+              <a:t>1/7/2021</a:t>
             </a:fld>
             <a:endParaRPr lang="en-US"/>
           </a:p>
@@ -7170,7 +7255,7 @@
           <a:p>
             <a:fld id="{1D8BD707-D9CF-40AE-B4C6-C98DA3205C09}" type="datetimeFigureOut">
               <a:rPr lang="en-US"/>
-              <a:t>1/4/2021</a:t>
+              <a:t>1/7/2021</a:t>
             </a:fld>
             <a:endParaRPr lang="en-US"/>
           </a:p>
@@ -7289,7 +7374,7 @@
           <a:p>
             <a:fld id="{1D8BD707-D9CF-40AE-B4C6-C98DA3205C09}" type="datetimeFigureOut">
               <a:rPr lang="en-US"/>
-              <a:t>1/4/2021</a:t>
+              <a:t>1/7/2021</a:t>
             </a:fld>
             <a:endParaRPr lang="en-US"/>
           </a:p>
@@ -7512,7 +7597,7 @@
           <a:p>
             <a:fld id="{1D8BD707-D9CF-40AE-B4C6-C98DA3205C09}" type="datetimeFigureOut">
               <a:rPr lang="en-US"/>
-              <a:t>1/4/2021</a:t>
+              <a:t>1/7/2021</a:t>
             </a:fld>
             <a:endParaRPr lang="en-US"/>
           </a:p>
@@ -9404,7 +9489,7 @@
         </p:nvGrpSpPr>
         <p:grpSpPr>
           <a:xfrm>
-            <a:off x="4246274" y="419100"/>
+            <a:off x="4114800" y="190500"/>
             <a:ext cx="10850880" cy="10287000"/>
             <a:chOff x="0" y="0"/>
             <a:chExt cx="10850880" cy="10287000"/>
@@ -10199,8 +10284,8 @@
         </p:nvSpPr>
         <p:spPr>
           <a:xfrm>
-            <a:off x="6868177" y="2949240"/>
-            <a:ext cx="5693036" cy="3308598"/>
+            <a:off x="6871813" y="4000500"/>
+            <a:ext cx="6223215" cy="4398640"/>
           </a:xfrm>
           <a:prstGeom prst="rect">
             <a:avLst/>
@@ -10223,6 +10308,18 @@
             </a:lvl1pPr>
           </a:lstStyle>
           <a:p>
+            <a:pPr marL="527050" indent="-514350">
+              <a:spcBef>
+                <a:spcPts val="100"/>
+              </a:spcBef>
+              <a:buAutoNum type="arabicPeriod"/>
+            </a:pPr>
+            <a:r>
+              <a:rPr lang="en-US" sz="3500" b="0" kern="0" dirty="0"/>
+              <a:t>Check Database Diagram</a:t>
+            </a:r>
+          </a:p>
+          <a:p>
             <a:pPr marL="12700">
               <a:spcBef>
                 <a:spcPts val="100"/>
@@ -10231,15 +10328,41 @@
             <a:endParaRPr lang="en-US" sz="3500" b="0" kern="0" dirty="0"/>
           </a:p>
           <a:p>
-            <a:pPr marL="527050" indent="-514350">
+            <a:pPr marL="12700">
               <a:spcBef>
                 <a:spcPts val="100"/>
               </a:spcBef>
-              <a:buAutoNum type="arabicPeriod"/>
             </a:pPr>
             <a:r>
               <a:rPr lang="en-US" sz="3500" b="0" kern="0" dirty="0"/>
-              <a:t>Current Progress</a:t>
+              <a:t>2. Current Progress</a:t>
+            </a:r>
+          </a:p>
+          <a:p>
+            <a:pPr marL="12700">
+              <a:spcBef>
+                <a:spcPts val="100"/>
+              </a:spcBef>
+            </a:pPr>
+            <a:endParaRPr lang="en-US" sz="3500" b="0" kern="0" dirty="0"/>
+          </a:p>
+          <a:p>
+            <a:pPr marL="12700">
+              <a:spcBef>
+                <a:spcPts val="100"/>
+              </a:spcBef>
+            </a:pPr>
+            <a:r>
+              <a:rPr lang="en-US" sz="3500" b="0" kern="0" dirty="0"/>
+              <a:t>3. Software </a:t>
+            </a:r>
+            <a:r>
+              <a:rPr lang="en-US" sz="3500" b="0" kern="0" dirty="0" err="1"/>
+              <a:t>TechStack</a:t>
+            </a:r>
+            <a:r>
+              <a:rPr lang="en-US" sz="3500" b="0" kern="0" dirty="0"/>
+              <a:t> and Justifications </a:t>
             </a:r>
           </a:p>
           <a:p>
@@ -10252,41 +10375,14 @@
             <a:endParaRPr lang="en-US" sz="3500" b="0" kern="0" dirty="0"/>
           </a:p>
           <a:p>
-            <a:pPr marL="527050" indent="-514350">
+            <a:pPr marL="12700">
               <a:spcBef>
                 <a:spcPts val="100"/>
               </a:spcBef>
-              <a:buAutoNum type="arabicPeriod"/>
             </a:pPr>
             <a:r>
               <a:rPr lang="en-US" sz="3500" b="0" kern="0" dirty="0"/>
-              <a:t>Software </a:t>
-            </a:r>
-            <a:r>
-              <a:rPr lang="en-US" sz="3500" b="0" kern="0" dirty="0" err="1"/>
-              <a:t>TechStack</a:t>
-            </a:r>
-            <a:endParaRPr lang="en-US" sz="3500" b="0" kern="0" dirty="0"/>
-          </a:p>
-          <a:p>
-            <a:pPr marL="527050" indent="-514350">
-              <a:spcBef>
-                <a:spcPts val="100"/>
-              </a:spcBef>
-              <a:buAutoNum type="arabicPeriod"/>
-            </a:pPr>
-            <a:endParaRPr lang="en-US" sz="3500" b="0" kern="0" dirty="0"/>
-          </a:p>
-          <a:p>
-            <a:pPr marL="527050" indent="-514350">
-              <a:spcBef>
-                <a:spcPts val="100"/>
-              </a:spcBef>
-              <a:buAutoNum type="arabicPeriod"/>
-            </a:pPr>
-            <a:r>
-              <a:rPr lang="en-US" sz="3500" b="0" kern="0" dirty="0"/>
-              <a:t>Development Strategy</a:t>
+              <a:t>4. Development Strategy</a:t>
             </a:r>
             <a:endParaRPr lang="en-GB" sz="3500" b="0" kern="0" dirty="0"/>
           </a:p>
@@ -10390,7 +10486,754 @@
         <p:spPr>
           <a:xfrm>
             <a:off x="685800" y="3314700"/>
-            <a:ext cx="6857143" cy="912301"/>
+            <a:ext cx="6857143" cy="645690"/>
+          </a:xfrm>
+          <a:prstGeom prst="rect">
+            <a:avLst/>
+          </a:prstGeom>
+        </p:spPr>
+        <p:txBody>
+          <a:bodyPr vert="horz" wrap="square" lIns="0" tIns="29845" rIns="0" bIns="0" rtlCol="0">
+            <a:spAutoFit/>
+          </a:bodyPr>
+          <a:lstStyle/>
+          <a:p>
+            <a:pPr marL="12700">
+              <a:spcBef>
+                <a:spcPts val="100"/>
+              </a:spcBef>
+            </a:pPr>
+            <a:r>
+              <a:rPr lang="en-US" sz="4000" b="0" kern="0" dirty="0"/>
+              <a:t>Check Database Diagram</a:t>
+            </a:r>
+          </a:p>
+        </p:txBody>
+      </p:sp>
+      <p:grpSp>
+        <p:nvGrpSpPr>
+          <p:cNvPr id="8" name="object 8"/>
+          <p:cNvGrpSpPr/>
+          <p:nvPr/>
+        </p:nvGrpSpPr>
+        <p:grpSpPr>
+          <a:xfrm>
+            <a:off x="0" y="-419100"/>
+            <a:ext cx="7065924" cy="10314669"/>
+            <a:chOff x="0" y="0"/>
+            <a:chExt cx="7413808" cy="10314669"/>
+          </a:xfrm>
+        </p:grpSpPr>
+        <p:pic>
+          <p:nvPicPr>
+            <p:cNvPr id="9" name="object 9"/>
+            <p:cNvPicPr/>
+            <p:nvPr/>
+          </p:nvPicPr>
+          <p:blipFill>
+            <a:blip r:embed="rId5" cstate="print"/>
+            <a:stretch>
+              <a:fillRect/>
+            </a:stretch>
+          </p:blipFill>
+          <p:spPr>
+            <a:xfrm>
+              <a:off x="0" y="0"/>
+              <a:ext cx="2975600" cy="3863365"/>
+            </a:xfrm>
+            <a:prstGeom prst="rect">
+              <a:avLst/>
+            </a:prstGeom>
+          </p:spPr>
+        </p:pic>
+        <p:sp>
+          <p:nvSpPr>
+            <p:cNvPr id="10" name="object 10"/>
+            <p:cNvSpPr/>
+            <p:nvPr/>
+          </p:nvSpPr>
+          <p:spPr>
+            <a:xfrm>
+              <a:off x="5289733" y="9906364"/>
+              <a:ext cx="2124075" cy="408305"/>
+            </a:xfrm>
+            <a:custGeom>
+              <a:avLst/>
+              <a:gdLst/>
+              <a:ahLst/>
+              <a:cxnLst/>
+              <a:rect l="l" t="t" r="r" b="b"/>
+              <a:pathLst>
+                <a:path w="2124075" h="408304">
+                  <a:moveTo>
+                    <a:pt x="692905" y="407848"/>
+                  </a:moveTo>
+                  <a:lnTo>
+                    <a:pt x="576622" y="407848"/>
+                  </a:lnTo>
+                  <a:lnTo>
+                    <a:pt x="589898" y="384507"/>
+                  </a:lnTo>
+                  <a:lnTo>
+                    <a:pt x="615531" y="339895"/>
+                  </a:lnTo>
+                  <a:lnTo>
+                    <a:pt x="641286" y="295407"/>
+                  </a:lnTo>
+                  <a:lnTo>
+                    <a:pt x="680927" y="227336"/>
+                  </a:lnTo>
+                  <a:lnTo>
+                    <a:pt x="707424" y="188522"/>
+                  </a:lnTo>
+                  <a:lnTo>
+                    <a:pt x="765103" y="139707"/>
+                  </a:lnTo>
+                  <a:lnTo>
+                    <a:pt x="804934" y="125738"/>
+                  </a:lnTo>
+                  <a:lnTo>
+                    <a:pt x="843771" y="130150"/>
+                  </a:lnTo>
+                  <a:lnTo>
+                    <a:pt x="881827" y="152376"/>
+                  </a:lnTo>
+                  <a:lnTo>
+                    <a:pt x="919315" y="191849"/>
+                  </a:lnTo>
+                  <a:lnTo>
+                    <a:pt x="938960" y="224009"/>
+                  </a:lnTo>
+                  <a:lnTo>
+                    <a:pt x="940412" y="227336"/>
+                  </a:lnTo>
+                  <a:lnTo>
+                    <a:pt x="854231" y="227336"/>
+                  </a:lnTo>
+                  <a:lnTo>
+                    <a:pt x="817784" y="245957"/>
+                  </a:lnTo>
+                  <a:lnTo>
+                    <a:pt x="765412" y="297616"/>
+                  </a:lnTo>
+                  <a:lnTo>
+                    <a:pt x="726214" y="355397"/>
+                  </a:lnTo>
+                  <a:lnTo>
+                    <a:pt x="708348" y="382775"/>
+                  </a:lnTo>
+                  <a:lnTo>
+                    <a:pt x="692905" y="407848"/>
+                  </a:lnTo>
+                  <a:close/>
+                </a:path>
+                <a:path w="2124075" h="408304">
+                  <a:moveTo>
+                    <a:pt x="996758" y="407848"/>
+                  </a:moveTo>
+                  <a:lnTo>
+                    <a:pt x="900108" y="407848"/>
+                  </a:lnTo>
+                  <a:lnTo>
+                    <a:pt x="891672" y="374475"/>
+                  </a:lnTo>
+                  <a:lnTo>
+                    <a:pt x="879377" y="326403"/>
+                  </a:lnTo>
+                  <a:lnTo>
+                    <a:pt x="873576" y="301982"/>
+                  </a:lnTo>
+                  <a:lnTo>
+                    <a:pt x="867358" y="277424"/>
+                  </a:lnTo>
+                  <a:lnTo>
+                    <a:pt x="860864" y="252588"/>
+                  </a:lnTo>
+                  <a:lnTo>
+                    <a:pt x="854231" y="227336"/>
+                  </a:lnTo>
+                  <a:lnTo>
+                    <a:pt x="940412" y="227336"/>
+                  </a:lnTo>
+                  <a:lnTo>
+                    <a:pt x="954445" y="259496"/>
+                  </a:lnTo>
+                  <a:lnTo>
+                    <a:pt x="967157" y="296646"/>
+                  </a:lnTo>
+                  <a:lnTo>
+                    <a:pt x="978481" y="333796"/>
+                  </a:lnTo>
+                  <a:lnTo>
+                    <a:pt x="990338" y="378385"/>
+                  </a:lnTo>
+                  <a:lnTo>
+                    <a:pt x="996758" y="407848"/>
+                  </a:lnTo>
+                  <a:close/>
+                </a:path>
+                <a:path w="2124075" h="408304">
+                  <a:moveTo>
+                    <a:pt x="115737" y="407848"/>
+                  </a:moveTo>
+                  <a:lnTo>
+                    <a:pt x="0" y="407848"/>
+                  </a:lnTo>
+                  <a:lnTo>
+                    <a:pt x="15167" y="371238"/>
+                  </a:lnTo>
+                  <a:lnTo>
+                    <a:pt x="37730" y="324924"/>
+                  </a:lnTo>
+                  <a:lnTo>
+                    <a:pt x="60462" y="283393"/>
+                  </a:lnTo>
+                  <a:lnTo>
+                    <a:pt x="85040" y="242855"/>
+                  </a:lnTo>
+                  <a:lnTo>
+                    <a:pt x="112600" y="204305"/>
+                  </a:lnTo>
+                  <a:lnTo>
+                    <a:pt x="144278" y="168736"/>
+                  </a:lnTo>
+                  <a:lnTo>
+                    <a:pt x="181210" y="137141"/>
+                  </a:lnTo>
+                  <a:lnTo>
+                    <a:pt x="221517" y="121061"/>
+                  </a:lnTo>
+                  <a:lnTo>
+                    <a:pt x="242364" y="121962"/>
+                  </a:lnTo>
+                  <a:lnTo>
+                    <a:pt x="264043" y="128269"/>
+                  </a:lnTo>
+                  <a:lnTo>
+                    <a:pt x="308696" y="153174"/>
+                  </a:lnTo>
+                  <a:lnTo>
+                    <a:pt x="343918" y="186674"/>
+                  </a:lnTo>
+                  <a:lnTo>
+                    <a:pt x="363634" y="215507"/>
+                  </a:lnTo>
+                  <a:lnTo>
+                    <a:pt x="269960" y="215507"/>
+                  </a:lnTo>
+                  <a:lnTo>
+                    <a:pt x="230508" y="249192"/>
+                  </a:lnTo>
+                  <a:lnTo>
+                    <a:pt x="196186" y="284262"/>
+                  </a:lnTo>
+                  <a:lnTo>
+                    <a:pt x="166580" y="321551"/>
+                  </a:lnTo>
+                  <a:lnTo>
+                    <a:pt x="141272" y="361889"/>
+                  </a:lnTo>
+                  <a:lnTo>
+                    <a:pt x="115737" y="407848"/>
+                  </a:lnTo>
+                  <a:close/>
+                </a:path>
+                <a:path w="2124075" h="408304">
+                  <a:moveTo>
+                    <a:pt x="432814" y="407848"/>
+                  </a:moveTo>
+                  <a:lnTo>
+                    <a:pt x="333919" y="407848"/>
+                  </a:lnTo>
+                  <a:lnTo>
+                    <a:pt x="324065" y="368913"/>
+                  </a:lnTo>
+                  <a:lnTo>
+                    <a:pt x="309897" y="314574"/>
+                  </a:lnTo>
+                  <a:lnTo>
+                    <a:pt x="301993" y="290570"/>
+                  </a:lnTo>
+                  <a:lnTo>
+                    <a:pt x="292147" y="266704"/>
+                  </a:lnTo>
+                  <a:lnTo>
+                    <a:pt x="281192" y="242006"/>
+                  </a:lnTo>
+                  <a:lnTo>
+                    <a:pt x="269960" y="215507"/>
+                  </a:lnTo>
+                  <a:lnTo>
+                    <a:pt x="363634" y="215507"/>
+                  </a:lnTo>
+                  <a:lnTo>
+                    <a:pt x="371375" y="226828"/>
+                  </a:lnTo>
+                  <a:lnTo>
+                    <a:pt x="392731" y="271694"/>
+                  </a:lnTo>
+                  <a:lnTo>
+                    <a:pt x="406552" y="310138"/>
+                  </a:lnTo>
+                  <a:lnTo>
+                    <a:pt x="417877" y="349691"/>
+                  </a:lnTo>
+                  <a:lnTo>
+                    <a:pt x="428092" y="389798"/>
+                  </a:lnTo>
+                  <a:lnTo>
+                    <a:pt x="432814" y="407848"/>
+                  </a:lnTo>
+                  <a:close/>
+                </a:path>
+                <a:path w="2124075" h="408304">
+                  <a:moveTo>
+                    <a:pt x="1217971" y="407848"/>
+                  </a:moveTo>
+                  <a:lnTo>
+                    <a:pt x="1093662" y="407848"/>
+                  </a:lnTo>
+                  <a:lnTo>
+                    <a:pt x="1118124" y="365932"/>
+                  </a:lnTo>
+                  <a:lnTo>
+                    <a:pt x="1147107" y="316607"/>
+                  </a:lnTo>
+                  <a:lnTo>
+                    <a:pt x="1177199" y="268113"/>
+                  </a:lnTo>
+                  <a:lnTo>
+                    <a:pt x="1209232" y="221421"/>
+                  </a:lnTo>
+                  <a:lnTo>
+                    <a:pt x="1259708" y="165234"/>
+                  </a:lnTo>
+                  <a:lnTo>
+                    <a:pt x="1287651" y="139081"/>
+                  </a:lnTo>
+                  <a:lnTo>
+                    <a:pt x="1342565" y="97565"/>
+                  </a:lnTo>
+                  <a:lnTo>
+                    <a:pt x="1369537" y="93706"/>
+                  </a:lnTo>
+                  <a:lnTo>
+                    <a:pt x="1396231" y="101215"/>
+                  </a:lnTo>
+                  <a:lnTo>
+                    <a:pt x="1422232" y="119397"/>
+                  </a:lnTo>
+                  <a:lnTo>
+                    <a:pt x="1448973" y="147445"/>
+                  </a:lnTo>
+                  <a:lnTo>
+                    <a:pt x="1470860" y="178542"/>
+                  </a:lnTo>
+                  <a:lnTo>
+                    <a:pt x="1479829" y="197764"/>
+                  </a:lnTo>
+                  <a:lnTo>
+                    <a:pt x="1385252" y="197764"/>
+                  </a:lnTo>
+                  <a:lnTo>
+                    <a:pt x="1360453" y="221768"/>
+                  </a:lnTo>
+                  <a:lnTo>
+                    <a:pt x="1311410" y="270331"/>
+                  </a:lnTo>
+                  <a:lnTo>
+                    <a:pt x="1261126" y="337246"/>
+                  </a:lnTo>
+                  <a:lnTo>
+                    <a:pt x="1234870" y="378647"/>
+                  </a:lnTo>
+                  <a:lnTo>
+                    <a:pt x="1217971" y="407848"/>
+                  </a:lnTo>
+                  <a:close/>
+                </a:path>
+                <a:path w="2124075" h="408304">
+                  <a:moveTo>
+                    <a:pt x="1518842" y="407848"/>
+                  </a:moveTo>
+                  <a:lnTo>
+                    <a:pt x="1424115" y="407848"/>
+                  </a:lnTo>
+                  <a:lnTo>
+                    <a:pt x="1422833" y="396128"/>
+                  </a:lnTo>
+                  <a:lnTo>
+                    <a:pt x="1412756" y="299557"/>
+                  </a:lnTo>
+                  <a:lnTo>
+                    <a:pt x="1407440" y="250994"/>
+                  </a:lnTo>
+                  <a:lnTo>
+                    <a:pt x="1397086" y="203678"/>
+                  </a:lnTo>
+                  <a:lnTo>
+                    <a:pt x="1392648" y="202199"/>
+                  </a:lnTo>
+                  <a:lnTo>
+                    <a:pt x="1389690" y="199242"/>
+                  </a:lnTo>
+                  <a:lnTo>
+                    <a:pt x="1385252" y="197764"/>
+                  </a:lnTo>
+                  <a:lnTo>
+                    <a:pt x="1479829" y="197764"/>
+                  </a:lnTo>
+                  <a:lnTo>
+                    <a:pt x="1486923" y="212966"/>
+                  </a:lnTo>
+                  <a:lnTo>
+                    <a:pt x="1496190" y="250994"/>
+                  </a:lnTo>
+                  <a:lnTo>
+                    <a:pt x="1503302" y="300829"/>
+                  </a:lnTo>
+                  <a:lnTo>
+                    <a:pt x="1510485" y="350877"/>
+                  </a:lnTo>
+                  <a:lnTo>
+                    <a:pt x="1517810" y="400996"/>
+                  </a:lnTo>
+                  <a:lnTo>
+                    <a:pt x="1518842" y="407848"/>
+                  </a:lnTo>
+                  <a:close/>
+                </a:path>
+                <a:path w="2124075" h="408304">
+                  <a:moveTo>
+                    <a:pt x="1728593" y="407848"/>
+                  </a:moveTo>
+                  <a:lnTo>
+                    <a:pt x="1614219" y="407848"/>
+                  </a:lnTo>
+                  <a:lnTo>
+                    <a:pt x="1636945" y="369282"/>
+                  </a:lnTo>
+                  <a:lnTo>
+                    <a:pt x="1661208" y="328047"/>
+                  </a:lnTo>
+                  <a:lnTo>
+                    <a:pt x="1685550" y="286980"/>
+                  </a:lnTo>
+                  <a:lnTo>
+                    <a:pt x="1710221" y="246027"/>
+                  </a:lnTo>
+                  <a:lnTo>
+                    <a:pt x="1735307" y="205411"/>
+                  </a:lnTo>
+                  <a:lnTo>
+                    <a:pt x="1760962" y="165234"/>
+                  </a:lnTo>
+                  <a:lnTo>
+                    <a:pt x="1786817" y="128529"/>
+                  </a:lnTo>
+                  <a:lnTo>
+                    <a:pt x="1815158" y="93740"/>
+                  </a:lnTo>
+                  <a:lnTo>
+                    <a:pt x="1846694" y="62075"/>
+                  </a:lnTo>
+                  <a:lnTo>
+                    <a:pt x="1882135" y="34738"/>
+                  </a:lnTo>
+                  <a:lnTo>
+                    <a:pt x="1922191" y="12937"/>
+                  </a:lnTo>
+                  <a:lnTo>
+                    <a:pt x="1968068" y="0"/>
+                  </a:lnTo>
+                  <a:lnTo>
+                    <a:pt x="2006319" y="3696"/>
+                  </a:lnTo>
+                  <a:lnTo>
+                    <a:pt x="2037635" y="24581"/>
+                  </a:lnTo>
+                  <a:lnTo>
+                    <a:pt x="2062712" y="63210"/>
+                  </a:lnTo>
+                  <a:lnTo>
+                    <a:pt x="2082010" y="114476"/>
+                  </a:lnTo>
+                  <a:lnTo>
+                    <a:pt x="1982166" y="114476"/>
+                  </a:lnTo>
+                  <a:lnTo>
+                    <a:pt x="1953253" y="126790"/>
+                  </a:lnTo>
+                  <a:lnTo>
+                    <a:pt x="1936474" y="137972"/>
+                  </a:lnTo>
+                  <a:lnTo>
+                    <a:pt x="1921081" y="150818"/>
+                  </a:lnTo>
+                  <a:lnTo>
+                    <a:pt x="1906243" y="164218"/>
+                  </a:lnTo>
+                  <a:lnTo>
+                    <a:pt x="1891128" y="177063"/>
+                  </a:lnTo>
+                  <a:lnTo>
+                    <a:pt x="1856812" y="209663"/>
+                  </a:lnTo>
+                  <a:lnTo>
+                    <a:pt x="1829595" y="247303"/>
+                  </a:lnTo>
+                  <a:lnTo>
+                    <a:pt x="1782261" y="328047"/>
+                  </a:lnTo>
+                  <a:lnTo>
+                    <a:pt x="1755045" y="366325"/>
+                  </a:lnTo>
+                  <a:lnTo>
+                    <a:pt x="1731124" y="402459"/>
+                  </a:lnTo>
+                  <a:lnTo>
+                    <a:pt x="1728593" y="407848"/>
+                  </a:lnTo>
+                  <a:close/>
+                </a:path>
+                <a:path w="2124075" h="408304">
+                  <a:moveTo>
+                    <a:pt x="2123898" y="407848"/>
+                  </a:moveTo>
+                  <a:lnTo>
+                    <a:pt x="2042951" y="407848"/>
+                  </a:lnTo>
+                  <a:lnTo>
+                    <a:pt x="2037751" y="369282"/>
+                  </a:lnTo>
+                  <a:lnTo>
+                    <a:pt x="2032686" y="320644"/>
+                  </a:lnTo>
+                  <a:lnTo>
+                    <a:pt x="2028437" y="271833"/>
+                  </a:lnTo>
+                  <a:lnTo>
+                    <a:pt x="2024360" y="222952"/>
+                  </a:lnTo>
+                  <a:lnTo>
+                    <a:pt x="2019816" y="174106"/>
+                  </a:lnTo>
+                  <a:lnTo>
+                    <a:pt x="2019816" y="163756"/>
+                  </a:lnTo>
+                  <a:lnTo>
+                    <a:pt x="2013368" y="131989"/>
+                  </a:lnTo>
+                  <a:lnTo>
+                    <a:pt x="2001511" y="115886"/>
+                  </a:lnTo>
+                  <a:lnTo>
+                    <a:pt x="1982166" y="114476"/>
+                  </a:lnTo>
+                  <a:lnTo>
+                    <a:pt x="2082010" y="114476"/>
+                  </a:lnTo>
+                  <a:lnTo>
+                    <a:pt x="2096733" y="168376"/>
+                  </a:lnTo>
+                  <a:lnTo>
+                    <a:pt x="2106810" y="223108"/>
+                  </a:lnTo>
+                  <a:lnTo>
+                    <a:pt x="2113004" y="279087"/>
+                  </a:lnTo>
+                  <a:lnTo>
+                    <a:pt x="2116799" y="328502"/>
+                  </a:lnTo>
+                  <a:lnTo>
+                    <a:pt x="2120904" y="377839"/>
+                  </a:lnTo>
+                  <a:lnTo>
+                    <a:pt x="2123898" y="407848"/>
+                  </a:lnTo>
+                  <a:close/>
+                </a:path>
+              </a:pathLst>
+            </a:custGeom>
+            <a:solidFill>
+              <a:srgbClr val="040707"/>
+            </a:solidFill>
+          </p:spPr>
+          <p:txBody>
+            <a:bodyPr wrap="square" lIns="0" tIns="0" rIns="0" bIns="0" rtlCol="0"/>
+            <a:lstStyle/>
+            <a:p>
+              <a:endParaRPr dirty="0"/>
+            </a:p>
+          </p:txBody>
+        </p:sp>
+      </p:grpSp>
+      <p:sp>
+        <p:nvSpPr>
+          <p:cNvPr id="12" name="object 5">
+            <a:extLst>
+              <a:ext uri="{FF2B5EF4-FFF2-40B4-BE49-F238E27FC236}">
+                <a16:creationId xmlns:a16="http://schemas.microsoft.com/office/drawing/2014/main" id="{11F2B6B6-0466-4FF3-9677-694F0F61AE7C}"/>
+              </a:ext>
+            </a:extLst>
+          </p:cNvPr>
+          <p:cNvSpPr txBox="1"/>
+          <p:nvPr/>
+        </p:nvSpPr>
+        <p:spPr>
+          <a:xfrm>
+            <a:off x="11506200" y="4686300"/>
+            <a:ext cx="9448800" cy="1466427"/>
+          </a:xfrm>
+          <a:prstGeom prst="rect">
+            <a:avLst/>
+          </a:prstGeom>
+        </p:spPr>
+        <p:txBody>
+          <a:bodyPr vert="horz" wrap="square" lIns="0" tIns="29845" rIns="0" bIns="0" rtlCol="0">
+            <a:spAutoFit/>
+          </a:bodyPr>
+          <a:lstStyle/>
+          <a:p>
+            <a:pPr marL="12700" marR="5080">
+              <a:spcBef>
+                <a:spcPts val="235"/>
+              </a:spcBef>
+            </a:pPr>
+            <a:r>
+              <a:rPr lang="en-US" sz="3000" kern="0" dirty="0">
+                <a:latin typeface="Raleway" panose="020B0503030101060003" pitchFamily="34" charset="0"/>
+                <a:ea typeface="Roboto" panose="02000000000000000000" pitchFamily="2" charset="0"/>
+                <a:cs typeface="Roboto" panose="02000000000000000000" pitchFamily="2" charset="0"/>
+              </a:rPr>
+              <a:t>GO GitLab</a:t>
+            </a:r>
+          </a:p>
+          <a:p>
+            <a:pPr marL="12700" marR="5080">
+              <a:spcBef>
+                <a:spcPts val="235"/>
+              </a:spcBef>
+            </a:pPr>
+            <a:endParaRPr lang="en-US" sz="3000" kern="0" dirty="0">
+              <a:latin typeface="Raleway" panose="020B0503030101060003" pitchFamily="34" charset="0"/>
+              <a:ea typeface="Roboto" panose="02000000000000000000" pitchFamily="2" charset="0"/>
+              <a:cs typeface="Roboto" panose="02000000000000000000" pitchFamily="2" charset="0"/>
+            </a:endParaRPr>
+          </a:p>
+          <a:p>
+            <a:pPr marL="12700" marR="5080">
+              <a:spcBef>
+                <a:spcPts val="235"/>
+              </a:spcBef>
+            </a:pPr>
+            <a:endParaRPr lang="en-US" sz="3000" kern="0" dirty="0">
+              <a:latin typeface="Raleway" panose="020B0503030101060003" pitchFamily="34" charset="0"/>
+              <a:ea typeface="Roboto" panose="02000000000000000000" pitchFamily="2" charset="0"/>
+              <a:cs typeface="Roboto" panose="02000000000000000000" pitchFamily="2" charset="0"/>
+            </a:endParaRPr>
+          </a:p>
+        </p:txBody>
+      </p:sp>
+    </p:spTree>
+    <p:extLst>
+      <p:ext uri="{BB962C8B-B14F-4D97-AF65-F5344CB8AC3E}">
+        <p14:creationId xmlns:p14="http://schemas.microsoft.com/office/powerpoint/2010/main" val="1602353451"/>
+      </p:ext>
+    </p:extLst>
+  </p:cSld>
+  <p:clrMapOvr>
+    <a:masterClrMapping/>
+  </p:clrMapOvr>
+</p:sld>
+</file>
+
+<file path=ppt/slides/slide5.xml><?xml version="1.0" encoding="utf-8"?>
+<p:sld xmlns:a="http://schemas.openxmlformats.org/drawingml/2006/main" xmlns:r="http://schemas.openxmlformats.org/officeDocument/2006/relationships" xmlns:p="http://schemas.openxmlformats.org/presentationml/2006/main">
+  <p:cSld>
+    <p:spTree>
+      <p:nvGrpSpPr>
+        <p:cNvPr id="1" name=""/>
+        <p:cNvGrpSpPr/>
+        <p:nvPr/>
+      </p:nvGrpSpPr>
+      <p:grpSpPr>
+        <a:xfrm>
+          <a:off x="0" y="0"/>
+          <a:ext cx="0" cy="0"/>
+          <a:chOff x="0" y="0"/>
+          <a:chExt cx="0" cy="0"/>
+        </a:xfrm>
+      </p:grpSpPr>
+      <p:grpSp>
+        <p:nvGrpSpPr>
+          <p:cNvPr id="2" name="object 2"/>
+          <p:cNvGrpSpPr/>
+          <p:nvPr/>
+        </p:nvGrpSpPr>
+        <p:grpSpPr>
+          <a:xfrm>
+            <a:off x="228600" y="-190500"/>
+            <a:ext cx="7314343" cy="10287000"/>
+            <a:chOff x="0" y="0"/>
+            <a:chExt cx="8759190" cy="10287000"/>
+          </a:xfrm>
+        </p:grpSpPr>
+        <p:pic>
+          <p:nvPicPr>
+            <p:cNvPr id="3" name="object 3"/>
+            <p:cNvPicPr/>
+            <p:nvPr/>
+          </p:nvPicPr>
+          <p:blipFill>
+            <a:blip r:embed="rId3" cstate="print"/>
+            <a:stretch>
+              <a:fillRect/>
+            </a:stretch>
+          </p:blipFill>
+          <p:spPr>
+            <a:xfrm>
+              <a:off x="0" y="0"/>
+              <a:ext cx="7490455" cy="8250979"/>
+            </a:xfrm>
+            <a:prstGeom prst="rect">
+              <a:avLst/>
+            </a:prstGeom>
+          </p:spPr>
+        </p:pic>
+        <p:pic>
+          <p:nvPicPr>
+            <p:cNvPr id="4" name="object 4"/>
+            <p:cNvPicPr/>
+            <p:nvPr/>
+          </p:nvPicPr>
+          <p:blipFill>
+            <a:blip r:embed="rId4" cstate="print"/>
+            <a:stretch>
+              <a:fillRect/>
+            </a:stretch>
+          </p:blipFill>
+          <p:spPr>
+            <a:xfrm>
+              <a:off x="0" y="1670110"/>
+              <a:ext cx="8758806" cy="8616889"/>
+            </a:xfrm>
+            <a:prstGeom prst="rect">
+              <a:avLst/>
+            </a:prstGeom>
+          </p:spPr>
+        </p:pic>
+      </p:grpSp>
+      <p:sp>
+        <p:nvSpPr>
+          <p:cNvPr id="5" name="object 5"/>
+          <p:cNvSpPr txBox="1"/>
+          <p:nvPr/>
+        </p:nvSpPr>
+        <p:spPr>
+          <a:xfrm>
+            <a:off x="685800" y="3314700"/>
+            <a:ext cx="6857143" cy="2947666"/>
           </a:xfrm>
           <a:prstGeom prst="rect">
             <a:avLst/>
@@ -10415,6 +11258,42 @@
                 <a:latin typeface="Consolas" panose="020B0609020204030204" pitchFamily="49" charset="0"/>
               </a:rPr>
               <a:t>Current Progress</a:t>
+            </a:r>
+          </a:p>
+          <a:p>
+            <a:pPr marL="584200" marR="5080" indent="-571500">
+              <a:lnSpc>
+                <a:spcPts val="7759"/>
+              </a:lnSpc>
+              <a:spcBef>
+                <a:spcPts val="235"/>
+              </a:spcBef>
+              <a:buFontTx/>
+              <a:buChar char="-"/>
+            </a:pPr>
+            <a:r>
+              <a:rPr lang="en-US" sz="2800" b="1" kern="0" dirty="0">
+                <a:latin typeface="Consolas" panose="020B0609020204030204" pitchFamily="49" charset="0"/>
+              </a:rPr>
+              <a:t>Finish the template project</a:t>
+            </a:r>
+          </a:p>
+          <a:p>
+            <a:pPr marL="584200" marR="5080" indent="-571500">
+              <a:lnSpc>
+                <a:spcPts val="7759"/>
+              </a:lnSpc>
+              <a:spcBef>
+                <a:spcPts val="235"/>
+              </a:spcBef>
+              <a:buFontTx/>
+              <a:buChar char="-"/>
+            </a:pPr>
+            <a:r>
+              <a:rPr lang="en-US" sz="2800" b="1" kern="0" dirty="0">
+                <a:latin typeface="Consolas" panose="020B0609020204030204" pitchFamily="49" charset="0"/>
+              </a:rPr>
+              <a:t>Doing the actual project</a:t>
             </a:r>
           </a:p>
         </p:txBody>
@@ -11244,7 +12123,7 @@
     </p:spTree>
     <p:extLst>
       <p:ext uri="{BB962C8B-B14F-4D97-AF65-F5344CB8AC3E}">
-        <p14:creationId xmlns:p14="http://schemas.microsoft.com/office/powerpoint/2010/main" val="1602353451"/>
+        <p14:creationId xmlns:p14="http://schemas.microsoft.com/office/powerpoint/2010/main" val="3706164622"/>
       </p:ext>
     </p:extLst>
   </p:cSld>
@@ -11254,7 +12133,7 @@
 </p:sld>
 </file>
 
-<file path=ppt/slides/slide5.xml><?xml version="1.0" encoding="utf-8"?>
+<file path=ppt/slides/slide6.xml><?xml version="1.0" encoding="utf-8"?>
 <p:sld xmlns:a="http://schemas.openxmlformats.org/drawingml/2006/main" xmlns:r="http://schemas.openxmlformats.org/officeDocument/2006/relationships" xmlns:p="http://schemas.openxmlformats.org/presentationml/2006/main">
   <p:cSld>
     <p:spTree>
@@ -11339,7 +12218,7 @@
         <p:spPr>
           <a:xfrm>
             <a:off x="685800" y="3314700"/>
-            <a:ext cx="6857143" cy="912301"/>
+            <a:ext cx="6857143" cy="1912575"/>
           </a:xfrm>
           <a:prstGeom prst="rect">
             <a:avLst/>
@@ -11371,922 +12250,11 @@
               </a:rPr>
               <a:t>TechStack</a:t>
             </a:r>
-            <a:endParaRPr lang="en-US" sz="4000" b="1" kern="0" dirty="0">
-              <a:latin typeface="Consolas" panose="020B0609020204030204" pitchFamily="49" charset="0"/>
-            </a:endParaRPr>
-          </a:p>
-        </p:txBody>
-      </p:sp>
-      <p:grpSp>
-        <p:nvGrpSpPr>
-          <p:cNvPr id="8" name="object 8"/>
-          <p:cNvGrpSpPr/>
-          <p:nvPr/>
-        </p:nvGrpSpPr>
-        <p:grpSpPr>
-          <a:xfrm>
-            <a:off x="0" y="-419100"/>
-            <a:ext cx="7065924" cy="10314669"/>
-            <a:chOff x="0" y="0"/>
-            <a:chExt cx="7413808" cy="10314669"/>
-          </a:xfrm>
-        </p:grpSpPr>
-        <p:pic>
-          <p:nvPicPr>
-            <p:cNvPr id="9" name="object 9"/>
-            <p:cNvPicPr/>
-            <p:nvPr/>
-          </p:nvPicPr>
-          <p:blipFill>
-            <a:blip r:embed="rId5" cstate="print"/>
-            <a:stretch>
-              <a:fillRect/>
-            </a:stretch>
-          </p:blipFill>
-          <p:spPr>
-            <a:xfrm>
-              <a:off x="0" y="0"/>
-              <a:ext cx="2975600" cy="3863365"/>
-            </a:xfrm>
-            <a:prstGeom prst="rect">
-              <a:avLst/>
-            </a:prstGeom>
-          </p:spPr>
-        </p:pic>
-        <p:sp>
-          <p:nvSpPr>
-            <p:cNvPr id="10" name="object 10"/>
-            <p:cNvSpPr/>
-            <p:nvPr/>
-          </p:nvSpPr>
-          <p:spPr>
-            <a:xfrm>
-              <a:off x="5289733" y="9906364"/>
-              <a:ext cx="2124075" cy="408305"/>
-            </a:xfrm>
-            <a:custGeom>
-              <a:avLst/>
-              <a:gdLst/>
-              <a:ahLst/>
-              <a:cxnLst/>
-              <a:rect l="l" t="t" r="r" b="b"/>
-              <a:pathLst>
-                <a:path w="2124075" h="408304">
-                  <a:moveTo>
-                    <a:pt x="692905" y="407848"/>
-                  </a:moveTo>
-                  <a:lnTo>
-                    <a:pt x="576622" y="407848"/>
-                  </a:lnTo>
-                  <a:lnTo>
-                    <a:pt x="589898" y="384507"/>
-                  </a:lnTo>
-                  <a:lnTo>
-                    <a:pt x="615531" y="339895"/>
-                  </a:lnTo>
-                  <a:lnTo>
-                    <a:pt x="641286" y="295407"/>
-                  </a:lnTo>
-                  <a:lnTo>
-                    <a:pt x="680927" y="227336"/>
-                  </a:lnTo>
-                  <a:lnTo>
-                    <a:pt x="707424" y="188522"/>
-                  </a:lnTo>
-                  <a:lnTo>
-                    <a:pt x="765103" y="139707"/>
-                  </a:lnTo>
-                  <a:lnTo>
-                    <a:pt x="804934" y="125738"/>
-                  </a:lnTo>
-                  <a:lnTo>
-                    <a:pt x="843771" y="130150"/>
-                  </a:lnTo>
-                  <a:lnTo>
-                    <a:pt x="881827" y="152376"/>
-                  </a:lnTo>
-                  <a:lnTo>
-                    <a:pt x="919315" y="191849"/>
-                  </a:lnTo>
-                  <a:lnTo>
-                    <a:pt x="938960" y="224009"/>
-                  </a:lnTo>
-                  <a:lnTo>
-                    <a:pt x="940412" y="227336"/>
-                  </a:lnTo>
-                  <a:lnTo>
-                    <a:pt x="854231" y="227336"/>
-                  </a:lnTo>
-                  <a:lnTo>
-                    <a:pt x="817784" y="245957"/>
-                  </a:lnTo>
-                  <a:lnTo>
-                    <a:pt x="765412" y="297616"/>
-                  </a:lnTo>
-                  <a:lnTo>
-                    <a:pt x="726214" y="355397"/>
-                  </a:lnTo>
-                  <a:lnTo>
-                    <a:pt x="708348" y="382775"/>
-                  </a:lnTo>
-                  <a:lnTo>
-                    <a:pt x="692905" y="407848"/>
-                  </a:lnTo>
-                  <a:close/>
-                </a:path>
-                <a:path w="2124075" h="408304">
-                  <a:moveTo>
-                    <a:pt x="996758" y="407848"/>
-                  </a:moveTo>
-                  <a:lnTo>
-                    <a:pt x="900108" y="407848"/>
-                  </a:lnTo>
-                  <a:lnTo>
-                    <a:pt x="891672" y="374475"/>
-                  </a:lnTo>
-                  <a:lnTo>
-                    <a:pt x="879377" y="326403"/>
-                  </a:lnTo>
-                  <a:lnTo>
-                    <a:pt x="873576" y="301982"/>
-                  </a:lnTo>
-                  <a:lnTo>
-                    <a:pt x="867358" y="277424"/>
-                  </a:lnTo>
-                  <a:lnTo>
-                    <a:pt x="860864" y="252588"/>
-                  </a:lnTo>
-                  <a:lnTo>
-                    <a:pt x="854231" y="227336"/>
-                  </a:lnTo>
-                  <a:lnTo>
-                    <a:pt x="940412" y="227336"/>
-                  </a:lnTo>
-                  <a:lnTo>
-                    <a:pt x="954445" y="259496"/>
-                  </a:lnTo>
-                  <a:lnTo>
-                    <a:pt x="967157" y="296646"/>
-                  </a:lnTo>
-                  <a:lnTo>
-                    <a:pt x="978481" y="333796"/>
-                  </a:lnTo>
-                  <a:lnTo>
-                    <a:pt x="990338" y="378385"/>
-                  </a:lnTo>
-                  <a:lnTo>
-                    <a:pt x="996758" y="407848"/>
-                  </a:lnTo>
-                  <a:close/>
-                </a:path>
-                <a:path w="2124075" h="408304">
-                  <a:moveTo>
-                    <a:pt x="115737" y="407848"/>
-                  </a:moveTo>
-                  <a:lnTo>
-                    <a:pt x="0" y="407848"/>
-                  </a:lnTo>
-                  <a:lnTo>
-                    <a:pt x="15167" y="371238"/>
-                  </a:lnTo>
-                  <a:lnTo>
-                    <a:pt x="37730" y="324924"/>
-                  </a:lnTo>
-                  <a:lnTo>
-                    <a:pt x="60462" y="283393"/>
-                  </a:lnTo>
-                  <a:lnTo>
-                    <a:pt x="85040" y="242855"/>
-                  </a:lnTo>
-                  <a:lnTo>
-                    <a:pt x="112600" y="204305"/>
-                  </a:lnTo>
-                  <a:lnTo>
-                    <a:pt x="144278" y="168736"/>
-                  </a:lnTo>
-                  <a:lnTo>
-                    <a:pt x="181210" y="137141"/>
-                  </a:lnTo>
-                  <a:lnTo>
-                    <a:pt x="221517" y="121061"/>
-                  </a:lnTo>
-                  <a:lnTo>
-                    <a:pt x="242364" y="121962"/>
-                  </a:lnTo>
-                  <a:lnTo>
-                    <a:pt x="264043" y="128269"/>
-                  </a:lnTo>
-                  <a:lnTo>
-                    <a:pt x="308696" y="153174"/>
-                  </a:lnTo>
-                  <a:lnTo>
-                    <a:pt x="343918" y="186674"/>
-                  </a:lnTo>
-                  <a:lnTo>
-                    <a:pt x="363634" y="215507"/>
-                  </a:lnTo>
-                  <a:lnTo>
-                    <a:pt x="269960" y="215507"/>
-                  </a:lnTo>
-                  <a:lnTo>
-                    <a:pt x="230508" y="249192"/>
-                  </a:lnTo>
-                  <a:lnTo>
-                    <a:pt x="196186" y="284262"/>
-                  </a:lnTo>
-                  <a:lnTo>
-                    <a:pt x="166580" y="321551"/>
-                  </a:lnTo>
-                  <a:lnTo>
-                    <a:pt x="141272" y="361889"/>
-                  </a:lnTo>
-                  <a:lnTo>
-                    <a:pt x="115737" y="407848"/>
-                  </a:lnTo>
-                  <a:close/>
-                </a:path>
-                <a:path w="2124075" h="408304">
-                  <a:moveTo>
-                    <a:pt x="432814" y="407848"/>
-                  </a:moveTo>
-                  <a:lnTo>
-                    <a:pt x="333919" y="407848"/>
-                  </a:lnTo>
-                  <a:lnTo>
-                    <a:pt x="324065" y="368913"/>
-                  </a:lnTo>
-                  <a:lnTo>
-                    <a:pt x="309897" y="314574"/>
-                  </a:lnTo>
-                  <a:lnTo>
-                    <a:pt x="301993" y="290570"/>
-                  </a:lnTo>
-                  <a:lnTo>
-                    <a:pt x="292147" y="266704"/>
-                  </a:lnTo>
-                  <a:lnTo>
-                    <a:pt x="281192" y="242006"/>
-                  </a:lnTo>
-                  <a:lnTo>
-                    <a:pt x="269960" y="215507"/>
-                  </a:lnTo>
-                  <a:lnTo>
-                    <a:pt x="363634" y="215507"/>
-                  </a:lnTo>
-                  <a:lnTo>
-                    <a:pt x="371375" y="226828"/>
-                  </a:lnTo>
-                  <a:lnTo>
-                    <a:pt x="392731" y="271694"/>
-                  </a:lnTo>
-                  <a:lnTo>
-                    <a:pt x="406552" y="310138"/>
-                  </a:lnTo>
-                  <a:lnTo>
-                    <a:pt x="417877" y="349691"/>
-                  </a:lnTo>
-                  <a:lnTo>
-                    <a:pt x="428092" y="389798"/>
-                  </a:lnTo>
-                  <a:lnTo>
-                    <a:pt x="432814" y="407848"/>
-                  </a:lnTo>
-                  <a:close/>
-                </a:path>
-                <a:path w="2124075" h="408304">
-                  <a:moveTo>
-                    <a:pt x="1217971" y="407848"/>
-                  </a:moveTo>
-                  <a:lnTo>
-                    <a:pt x="1093662" y="407848"/>
-                  </a:lnTo>
-                  <a:lnTo>
-                    <a:pt x="1118124" y="365932"/>
-                  </a:lnTo>
-                  <a:lnTo>
-                    <a:pt x="1147107" y="316607"/>
-                  </a:lnTo>
-                  <a:lnTo>
-                    <a:pt x="1177199" y="268113"/>
-                  </a:lnTo>
-                  <a:lnTo>
-                    <a:pt x="1209232" y="221421"/>
-                  </a:lnTo>
-                  <a:lnTo>
-                    <a:pt x="1259708" y="165234"/>
-                  </a:lnTo>
-                  <a:lnTo>
-                    <a:pt x="1287651" y="139081"/>
-                  </a:lnTo>
-                  <a:lnTo>
-                    <a:pt x="1342565" y="97565"/>
-                  </a:lnTo>
-                  <a:lnTo>
-                    <a:pt x="1369537" y="93706"/>
-                  </a:lnTo>
-                  <a:lnTo>
-                    <a:pt x="1396231" y="101215"/>
-                  </a:lnTo>
-                  <a:lnTo>
-                    <a:pt x="1422232" y="119397"/>
-                  </a:lnTo>
-                  <a:lnTo>
-                    <a:pt x="1448973" y="147445"/>
-                  </a:lnTo>
-                  <a:lnTo>
-                    <a:pt x="1470860" y="178542"/>
-                  </a:lnTo>
-                  <a:lnTo>
-                    <a:pt x="1479829" y="197764"/>
-                  </a:lnTo>
-                  <a:lnTo>
-                    <a:pt x="1385252" y="197764"/>
-                  </a:lnTo>
-                  <a:lnTo>
-                    <a:pt x="1360453" y="221768"/>
-                  </a:lnTo>
-                  <a:lnTo>
-                    <a:pt x="1311410" y="270331"/>
-                  </a:lnTo>
-                  <a:lnTo>
-                    <a:pt x="1261126" y="337246"/>
-                  </a:lnTo>
-                  <a:lnTo>
-                    <a:pt x="1234870" y="378647"/>
-                  </a:lnTo>
-                  <a:lnTo>
-                    <a:pt x="1217971" y="407848"/>
-                  </a:lnTo>
-                  <a:close/>
-                </a:path>
-                <a:path w="2124075" h="408304">
-                  <a:moveTo>
-                    <a:pt x="1518842" y="407848"/>
-                  </a:moveTo>
-                  <a:lnTo>
-                    <a:pt x="1424115" y="407848"/>
-                  </a:lnTo>
-                  <a:lnTo>
-                    <a:pt x="1422833" y="396128"/>
-                  </a:lnTo>
-                  <a:lnTo>
-                    <a:pt x="1412756" y="299557"/>
-                  </a:lnTo>
-                  <a:lnTo>
-                    <a:pt x="1407440" y="250994"/>
-                  </a:lnTo>
-                  <a:lnTo>
-                    <a:pt x="1397086" y="203678"/>
-                  </a:lnTo>
-                  <a:lnTo>
-                    <a:pt x="1392648" y="202199"/>
-                  </a:lnTo>
-                  <a:lnTo>
-                    <a:pt x="1389690" y="199242"/>
-                  </a:lnTo>
-                  <a:lnTo>
-                    <a:pt x="1385252" y="197764"/>
-                  </a:lnTo>
-                  <a:lnTo>
-                    <a:pt x="1479829" y="197764"/>
-                  </a:lnTo>
-                  <a:lnTo>
-                    <a:pt x="1486923" y="212966"/>
-                  </a:lnTo>
-                  <a:lnTo>
-                    <a:pt x="1496190" y="250994"/>
-                  </a:lnTo>
-                  <a:lnTo>
-                    <a:pt x="1503302" y="300829"/>
-                  </a:lnTo>
-                  <a:lnTo>
-                    <a:pt x="1510485" y="350877"/>
-                  </a:lnTo>
-                  <a:lnTo>
-                    <a:pt x="1517810" y="400996"/>
-                  </a:lnTo>
-                  <a:lnTo>
-                    <a:pt x="1518842" y="407848"/>
-                  </a:lnTo>
-                  <a:close/>
-                </a:path>
-                <a:path w="2124075" h="408304">
-                  <a:moveTo>
-                    <a:pt x="1728593" y="407848"/>
-                  </a:moveTo>
-                  <a:lnTo>
-                    <a:pt x="1614219" y="407848"/>
-                  </a:lnTo>
-                  <a:lnTo>
-                    <a:pt x="1636945" y="369282"/>
-                  </a:lnTo>
-                  <a:lnTo>
-                    <a:pt x="1661208" y="328047"/>
-                  </a:lnTo>
-                  <a:lnTo>
-                    <a:pt x="1685550" y="286980"/>
-                  </a:lnTo>
-                  <a:lnTo>
-                    <a:pt x="1710221" y="246027"/>
-                  </a:lnTo>
-                  <a:lnTo>
-                    <a:pt x="1735307" y="205411"/>
-                  </a:lnTo>
-                  <a:lnTo>
-                    <a:pt x="1760962" y="165234"/>
-                  </a:lnTo>
-                  <a:lnTo>
-                    <a:pt x="1786817" y="128529"/>
-                  </a:lnTo>
-                  <a:lnTo>
-                    <a:pt x="1815158" y="93740"/>
-                  </a:lnTo>
-                  <a:lnTo>
-                    <a:pt x="1846694" y="62075"/>
-                  </a:lnTo>
-                  <a:lnTo>
-                    <a:pt x="1882135" y="34738"/>
-                  </a:lnTo>
-                  <a:lnTo>
-                    <a:pt x="1922191" y="12937"/>
-                  </a:lnTo>
-                  <a:lnTo>
-                    <a:pt x="1968068" y="0"/>
-                  </a:lnTo>
-                  <a:lnTo>
-                    <a:pt x="2006319" y="3696"/>
-                  </a:lnTo>
-                  <a:lnTo>
-                    <a:pt x="2037635" y="24581"/>
-                  </a:lnTo>
-                  <a:lnTo>
-                    <a:pt x="2062712" y="63210"/>
-                  </a:lnTo>
-                  <a:lnTo>
-                    <a:pt x="2082010" y="114476"/>
-                  </a:lnTo>
-                  <a:lnTo>
-                    <a:pt x="1982166" y="114476"/>
-                  </a:lnTo>
-                  <a:lnTo>
-                    <a:pt x="1953253" y="126790"/>
-                  </a:lnTo>
-                  <a:lnTo>
-                    <a:pt x="1936474" y="137972"/>
-                  </a:lnTo>
-                  <a:lnTo>
-                    <a:pt x="1921081" y="150818"/>
-                  </a:lnTo>
-                  <a:lnTo>
-                    <a:pt x="1906243" y="164218"/>
-                  </a:lnTo>
-                  <a:lnTo>
-                    <a:pt x="1891128" y="177063"/>
-                  </a:lnTo>
-                  <a:lnTo>
-                    <a:pt x="1856812" y="209663"/>
-                  </a:lnTo>
-                  <a:lnTo>
-                    <a:pt x="1829595" y="247303"/>
-                  </a:lnTo>
-                  <a:lnTo>
-                    <a:pt x="1782261" y="328047"/>
-                  </a:lnTo>
-                  <a:lnTo>
-                    <a:pt x="1755045" y="366325"/>
-                  </a:lnTo>
-                  <a:lnTo>
-                    <a:pt x="1731124" y="402459"/>
-                  </a:lnTo>
-                  <a:lnTo>
-                    <a:pt x="1728593" y="407848"/>
-                  </a:lnTo>
-                  <a:close/>
-                </a:path>
-                <a:path w="2124075" h="408304">
-                  <a:moveTo>
-                    <a:pt x="2123898" y="407848"/>
-                  </a:moveTo>
-                  <a:lnTo>
-                    <a:pt x="2042951" y="407848"/>
-                  </a:lnTo>
-                  <a:lnTo>
-                    <a:pt x="2037751" y="369282"/>
-                  </a:lnTo>
-                  <a:lnTo>
-                    <a:pt x="2032686" y="320644"/>
-                  </a:lnTo>
-                  <a:lnTo>
-                    <a:pt x="2028437" y="271833"/>
-                  </a:lnTo>
-                  <a:lnTo>
-                    <a:pt x="2024360" y="222952"/>
-                  </a:lnTo>
-                  <a:lnTo>
-                    <a:pt x="2019816" y="174106"/>
-                  </a:lnTo>
-                  <a:lnTo>
-                    <a:pt x="2019816" y="163756"/>
-                  </a:lnTo>
-                  <a:lnTo>
-                    <a:pt x="2013368" y="131989"/>
-                  </a:lnTo>
-                  <a:lnTo>
-                    <a:pt x="2001511" y="115886"/>
-                  </a:lnTo>
-                  <a:lnTo>
-                    <a:pt x="1982166" y="114476"/>
-                  </a:lnTo>
-                  <a:lnTo>
-                    <a:pt x="2082010" y="114476"/>
-                  </a:lnTo>
-                  <a:lnTo>
-                    <a:pt x="2096733" y="168376"/>
-                  </a:lnTo>
-                  <a:lnTo>
-                    <a:pt x="2106810" y="223108"/>
-                  </a:lnTo>
-                  <a:lnTo>
-                    <a:pt x="2113004" y="279087"/>
-                  </a:lnTo>
-                  <a:lnTo>
-                    <a:pt x="2116799" y="328502"/>
-                  </a:lnTo>
-                  <a:lnTo>
-                    <a:pt x="2120904" y="377839"/>
-                  </a:lnTo>
-                  <a:lnTo>
-                    <a:pt x="2123898" y="407848"/>
-                  </a:lnTo>
-                  <a:close/>
-                </a:path>
-              </a:pathLst>
-            </a:custGeom>
-            <a:solidFill>
-              <a:srgbClr val="040707"/>
-            </a:solidFill>
-          </p:spPr>
-          <p:txBody>
-            <a:bodyPr wrap="square" lIns="0" tIns="0" rIns="0" bIns="0" rtlCol="0"/>
-            <a:lstStyle/>
-            <a:p>
-              <a:endParaRPr dirty="0"/>
-            </a:p>
-          </p:txBody>
-        </p:sp>
-      </p:grpSp>
-      <p:sp>
-        <p:nvSpPr>
-          <p:cNvPr id="12" name="object 5">
-            <a:extLst>
-              <a:ext uri="{FF2B5EF4-FFF2-40B4-BE49-F238E27FC236}">
-                <a16:creationId xmlns:a16="http://schemas.microsoft.com/office/drawing/2014/main" id="{11F2B6B6-0466-4FF3-9677-694F0F61AE7C}"/>
-              </a:ext>
-            </a:extLst>
-          </p:cNvPr>
-          <p:cNvSpPr txBox="1"/>
-          <p:nvPr/>
-        </p:nvSpPr>
-        <p:spPr>
-          <a:xfrm>
-            <a:off x="8214029" y="3162300"/>
-            <a:ext cx="8839200" cy="5826595"/>
-          </a:xfrm>
-          <a:prstGeom prst="rect">
-            <a:avLst/>
-          </a:prstGeom>
-        </p:spPr>
-        <p:txBody>
-          <a:bodyPr vert="horz" wrap="square" lIns="0" tIns="29845" rIns="0" bIns="0" rtlCol="0">
-            <a:spAutoFit/>
-          </a:bodyPr>
-          <a:lstStyle/>
-          <a:p>
-            <a:pPr marL="12700" marR="5080">
-              <a:spcBef>
-                <a:spcPts val="235"/>
-              </a:spcBef>
-            </a:pPr>
-            <a:endParaRPr lang="en-US" sz="3000" kern="0" dirty="0">
-              <a:latin typeface="Raleway" panose="020B0503030101060003" pitchFamily="34" charset="0"/>
-              <a:ea typeface="Roboto" panose="02000000000000000000" pitchFamily="2" charset="0"/>
-              <a:cs typeface="Roboto" panose="02000000000000000000" pitchFamily="2" charset="0"/>
-            </a:endParaRPr>
-          </a:p>
-          <a:p>
-            <a:pPr marL="12700" marR="5080">
-              <a:spcBef>
-                <a:spcPts val="235"/>
-              </a:spcBef>
-            </a:pPr>
-            <a:r>
-              <a:rPr lang="en-US" sz="3000" kern="0" dirty="0">
-                <a:latin typeface="Raleway" panose="020B0503030101060003" pitchFamily="34" charset="0"/>
-                <a:ea typeface="Roboto" panose="02000000000000000000" pitchFamily="2" charset="0"/>
-                <a:cs typeface="Roboto" panose="02000000000000000000" pitchFamily="2" charset="0"/>
-              </a:rPr>
-              <a:t>-   General: Django </a:t>
-            </a:r>
-          </a:p>
-          <a:p>
-            <a:pPr marL="469900" marR="5080" indent="-457200">
-              <a:spcBef>
-                <a:spcPts val="235"/>
-              </a:spcBef>
-              <a:buFontTx/>
-              <a:buChar char="-"/>
-            </a:pPr>
-            <a:r>
-              <a:rPr lang="en-US" sz="3000" kern="0" dirty="0">
-                <a:latin typeface="Raleway" panose="020B0503030101060003" pitchFamily="34" charset="0"/>
-                <a:ea typeface="Roboto" panose="02000000000000000000" pitchFamily="2" charset="0"/>
-                <a:cs typeface="Roboto" panose="02000000000000000000" pitchFamily="2" charset="0"/>
-              </a:rPr>
-              <a:t>Database: PostgreSQL, Django Rest Framework API</a:t>
-            </a:r>
-          </a:p>
-          <a:p>
-            <a:pPr marL="469900" marR="5080" indent="-457200">
-              <a:spcBef>
-                <a:spcPts val="235"/>
-              </a:spcBef>
-              <a:buFontTx/>
-              <a:buChar char="-"/>
-            </a:pPr>
-            <a:r>
-              <a:rPr lang="en-US" sz="3000" kern="0" dirty="0">
-                <a:latin typeface="Raleway" panose="020B0503030101060003" pitchFamily="34" charset="0"/>
-                <a:ea typeface="Roboto" panose="02000000000000000000" pitchFamily="2" charset="0"/>
-                <a:cs typeface="Roboto" panose="02000000000000000000" pitchFamily="2" charset="0"/>
-              </a:rPr>
-              <a:t>Front-End: React.JS, Anima </a:t>
-            </a:r>
-          </a:p>
-          <a:p>
-            <a:pPr marL="469900" marR="5080" indent="-457200">
-              <a:spcBef>
-                <a:spcPts val="235"/>
-              </a:spcBef>
-              <a:buFontTx/>
-              <a:buChar char="-"/>
-            </a:pPr>
-            <a:r>
-              <a:rPr lang="en-US" sz="3000" kern="0" dirty="0">
-                <a:latin typeface="Raleway" panose="020B0503030101060003" pitchFamily="34" charset="0"/>
-                <a:ea typeface="Roboto" panose="02000000000000000000" pitchFamily="2" charset="0"/>
-                <a:cs typeface="Roboto" panose="02000000000000000000" pitchFamily="2" charset="0"/>
-              </a:rPr>
-              <a:t>Design: Adobe XD</a:t>
-            </a:r>
-          </a:p>
-          <a:p>
-            <a:pPr marL="469900" marR="5080" indent="-457200">
-              <a:spcBef>
-                <a:spcPts val="235"/>
-              </a:spcBef>
-              <a:buFontTx/>
-              <a:buChar char="-"/>
-            </a:pPr>
-            <a:r>
-              <a:rPr lang="en-US" sz="3000" kern="0" dirty="0">
-                <a:latin typeface="Raleway" panose="020B0503030101060003" pitchFamily="34" charset="0"/>
-                <a:ea typeface="Roboto" panose="02000000000000000000" pitchFamily="2" charset="0"/>
-                <a:cs typeface="Roboto" panose="02000000000000000000" pitchFamily="2" charset="0"/>
-              </a:rPr>
-              <a:t>Testing: Postman</a:t>
-            </a:r>
-          </a:p>
-          <a:p>
-            <a:pPr marL="469900" marR="5080" indent="-457200">
-              <a:spcBef>
-                <a:spcPts val="235"/>
-              </a:spcBef>
-              <a:buFontTx/>
-              <a:buChar char="-"/>
-            </a:pPr>
-            <a:r>
-              <a:rPr lang="en-US" sz="3000" kern="0" dirty="0">
-                <a:latin typeface="Raleway" panose="020B0503030101060003" pitchFamily="34" charset="0"/>
-                <a:ea typeface="Roboto" panose="02000000000000000000" pitchFamily="2" charset="0"/>
-                <a:cs typeface="Roboto" panose="02000000000000000000" pitchFamily="2" charset="0"/>
-              </a:rPr>
-              <a:t>Email Automation: Gmail</a:t>
-            </a:r>
-          </a:p>
-          <a:p>
-            <a:pPr marL="469900" marR="5080" indent="-457200">
-              <a:spcBef>
-                <a:spcPts val="235"/>
-              </a:spcBef>
-              <a:buFontTx/>
-              <a:buChar char="-"/>
-            </a:pPr>
-            <a:r>
-              <a:rPr lang="en-US" sz="3000" kern="0" dirty="0">
-                <a:latin typeface="Raleway" panose="020B0503030101060003" pitchFamily="34" charset="0"/>
-                <a:ea typeface="Roboto" panose="02000000000000000000" pitchFamily="2" charset="0"/>
-                <a:cs typeface="Roboto" panose="02000000000000000000" pitchFamily="2" charset="0"/>
-              </a:rPr>
-              <a:t>Hosting: x</a:t>
-            </a:r>
-          </a:p>
-          <a:p>
-            <a:pPr marL="469900" marR="5080" indent="-457200">
-              <a:spcBef>
-                <a:spcPts val="235"/>
-              </a:spcBef>
-              <a:buFontTx/>
-              <a:buChar char="-"/>
-            </a:pPr>
-            <a:endParaRPr lang="en-US" sz="3000" kern="0" dirty="0">
-              <a:latin typeface="Raleway" panose="020B0503030101060003" pitchFamily="34" charset="0"/>
-              <a:ea typeface="Roboto" panose="02000000000000000000" pitchFamily="2" charset="0"/>
-              <a:cs typeface="Roboto" panose="02000000000000000000" pitchFamily="2" charset="0"/>
-            </a:endParaRPr>
-          </a:p>
-          <a:p>
-            <a:pPr marL="469900" marR="5080" indent="-457200">
-              <a:spcBef>
-                <a:spcPts val="235"/>
-              </a:spcBef>
-              <a:buFontTx/>
-              <a:buChar char="-"/>
-            </a:pPr>
-            <a:endParaRPr lang="en-US" sz="3000" kern="0" dirty="0">
-              <a:latin typeface="Raleway" panose="020B0503030101060003" pitchFamily="34" charset="0"/>
-              <a:ea typeface="Roboto" panose="02000000000000000000" pitchFamily="2" charset="0"/>
-              <a:cs typeface="Roboto" panose="02000000000000000000" pitchFamily="2" charset="0"/>
-            </a:endParaRPr>
-          </a:p>
-          <a:p>
-            <a:pPr marL="12700" marR="5080">
-              <a:spcBef>
-                <a:spcPts val="235"/>
-              </a:spcBef>
-            </a:pPr>
-            <a:r>
-              <a:rPr lang="en-US" sz="3000" kern="0" dirty="0">
-                <a:latin typeface="Raleway" panose="020B0503030101060003" pitchFamily="34" charset="0"/>
-                <a:ea typeface="Roboto" panose="02000000000000000000" pitchFamily="2" charset="0"/>
-                <a:cs typeface="Roboto" panose="02000000000000000000" pitchFamily="2" charset="0"/>
-              </a:rPr>
-              <a:t>Based on Instagram </a:t>
-            </a:r>
-            <a:r>
-              <a:rPr lang="en-US" sz="3000" kern="0" dirty="0" err="1">
-                <a:latin typeface="Raleway" panose="020B0503030101060003" pitchFamily="34" charset="0"/>
-                <a:ea typeface="Roboto" panose="02000000000000000000" pitchFamily="2" charset="0"/>
-                <a:cs typeface="Roboto" panose="02000000000000000000" pitchFamily="2" charset="0"/>
-              </a:rPr>
-              <a:t>TechStack</a:t>
-            </a:r>
-            <a:endParaRPr lang="en-US" sz="3000" kern="0" dirty="0">
-              <a:latin typeface="Raleway" panose="020B0503030101060003" pitchFamily="34" charset="0"/>
-              <a:ea typeface="Roboto" panose="02000000000000000000" pitchFamily="2" charset="0"/>
-              <a:cs typeface="Roboto" panose="02000000000000000000" pitchFamily="2" charset="0"/>
-            </a:endParaRPr>
-          </a:p>
-        </p:txBody>
-      </p:sp>
-    </p:spTree>
-    <p:extLst>
-      <p:ext uri="{BB962C8B-B14F-4D97-AF65-F5344CB8AC3E}">
-        <p14:creationId xmlns:p14="http://schemas.microsoft.com/office/powerpoint/2010/main" val="4281965062"/>
-      </p:ext>
-    </p:extLst>
-  </p:cSld>
-  <p:clrMapOvr>
-    <a:masterClrMapping/>
-  </p:clrMapOvr>
-</p:sld>
-</file>
-
-<file path=ppt/slides/slide6.xml><?xml version="1.0" encoding="utf-8"?>
-<p:sld xmlns:a="http://schemas.openxmlformats.org/drawingml/2006/main" xmlns:r="http://schemas.openxmlformats.org/officeDocument/2006/relationships" xmlns:p="http://schemas.openxmlformats.org/presentationml/2006/main">
-  <p:cSld>
-    <p:spTree>
-      <p:nvGrpSpPr>
-        <p:cNvPr id="1" name=""/>
-        <p:cNvGrpSpPr/>
-        <p:nvPr/>
-      </p:nvGrpSpPr>
-      <p:grpSpPr>
-        <a:xfrm>
-          <a:off x="0" y="0"/>
-          <a:ext cx="0" cy="0"/>
-          <a:chOff x="0" y="0"/>
-          <a:chExt cx="0" cy="0"/>
-        </a:xfrm>
-      </p:grpSpPr>
-      <p:grpSp>
-        <p:nvGrpSpPr>
-          <p:cNvPr id="2" name="object 2"/>
-          <p:cNvGrpSpPr/>
-          <p:nvPr/>
-        </p:nvGrpSpPr>
-        <p:grpSpPr>
-          <a:xfrm>
-            <a:off x="228600" y="-190500"/>
-            <a:ext cx="7528559" cy="10287000"/>
-            <a:chOff x="0" y="0"/>
-            <a:chExt cx="8759190" cy="10287000"/>
-          </a:xfrm>
-        </p:grpSpPr>
-        <p:pic>
-          <p:nvPicPr>
-            <p:cNvPr id="3" name="object 3"/>
-            <p:cNvPicPr/>
-            <p:nvPr/>
-          </p:nvPicPr>
-          <p:blipFill>
-            <a:blip r:embed="rId3" cstate="print"/>
-            <a:stretch>
-              <a:fillRect/>
-            </a:stretch>
-          </p:blipFill>
-          <p:spPr>
-            <a:xfrm>
-              <a:off x="0" y="0"/>
-              <a:ext cx="7490455" cy="8250979"/>
-            </a:xfrm>
-            <a:prstGeom prst="rect">
-              <a:avLst/>
-            </a:prstGeom>
-          </p:spPr>
-        </p:pic>
-        <p:pic>
-          <p:nvPicPr>
-            <p:cNvPr id="4" name="object 4"/>
-            <p:cNvPicPr/>
-            <p:nvPr/>
-          </p:nvPicPr>
-          <p:blipFill>
-            <a:blip r:embed="rId4" cstate="print"/>
-            <a:stretch>
-              <a:fillRect/>
-            </a:stretch>
-          </p:blipFill>
-          <p:spPr>
-            <a:xfrm>
-              <a:off x="0" y="1670110"/>
-              <a:ext cx="8758806" cy="8616889"/>
-            </a:xfrm>
-            <a:prstGeom prst="rect">
-              <a:avLst/>
-            </a:prstGeom>
-          </p:spPr>
-        </p:pic>
-      </p:grpSp>
-      <p:sp>
-        <p:nvSpPr>
-          <p:cNvPr id="5" name="object 5"/>
-          <p:cNvSpPr txBox="1"/>
-          <p:nvPr/>
-        </p:nvSpPr>
-        <p:spPr>
-          <a:xfrm>
-            <a:off x="685800" y="3314700"/>
-            <a:ext cx="6857143" cy="1938223"/>
-          </a:xfrm>
-          <a:prstGeom prst="rect">
-            <a:avLst/>
-          </a:prstGeom>
-        </p:spPr>
-        <p:txBody>
-          <a:bodyPr vert="horz" wrap="square" lIns="0" tIns="29845" rIns="0" bIns="0" rtlCol="0">
-            <a:spAutoFit/>
-          </a:bodyPr>
-          <a:lstStyle/>
-          <a:p>
-            <a:pPr marL="12700" marR="5080">
-              <a:lnSpc>
-                <a:spcPts val="7759"/>
-              </a:lnSpc>
-              <a:spcBef>
-                <a:spcPts val="235"/>
-              </a:spcBef>
-            </a:pPr>
             <a:r>
               <a:rPr lang="en-US" sz="4000" b="1" kern="0" dirty="0">
                 <a:latin typeface="Consolas" panose="020B0609020204030204" pitchFamily="49" charset="0"/>
               </a:rPr>
-              <a:t>Development Strategy</a:t>
-            </a:r>
-          </a:p>
-          <a:p>
-            <a:pPr marL="12700" marR="5080">
-              <a:lnSpc>
-                <a:spcPts val="7759"/>
-              </a:lnSpc>
-              <a:spcBef>
-                <a:spcPts val="235"/>
-              </a:spcBef>
-            </a:pPr>
-            <a:r>
-              <a:rPr lang="en-US" sz="4000" b="1" kern="0" dirty="0">
-                <a:latin typeface="Consolas" panose="020B0609020204030204" pitchFamily="49" charset="0"/>
-              </a:rPr>
-              <a:t> </a:t>
+              <a:t> and Justifications </a:t>
             </a:r>
           </a:p>
         </p:txBody>
@@ -12863,8 +12831,8 @@
         </p:nvSpPr>
         <p:spPr>
           <a:xfrm>
-            <a:off x="7530911" y="1018670"/>
-            <a:ext cx="10059257" cy="7888698"/>
+            <a:off x="9601200" y="4164386"/>
+            <a:ext cx="8839200" cy="979114"/>
           </a:xfrm>
           <a:prstGeom prst="rect">
             <a:avLst/>
@@ -12881,41 +12849,7 @@
                 <a:spcPts val="235"/>
               </a:spcBef>
             </a:pPr>
-            <a:r>
-              <a:rPr lang="en-US" sz="2800" kern="0" dirty="0">
-                <a:latin typeface="Raleway" panose="020B0503030101060003" pitchFamily="34" charset="0"/>
-                <a:ea typeface="Roboto" panose="02000000000000000000" pitchFamily="2" charset="0"/>
-                <a:cs typeface="Roboto" panose="02000000000000000000" pitchFamily="2" charset="0"/>
-              </a:rPr>
-              <a:t>1. Find a collection of relevant programming tutorial videos </a:t>
-            </a:r>
-          </a:p>
-          <a:p>
-            <a:pPr marL="469900" marR="5080" indent="-457200">
-              <a:spcBef>
-                <a:spcPts val="235"/>
-              </a:spcBef>
-              <a:buFontTx/>
-              <a:buChar char="-"/>
-            </a:pPr>
-            <a:r>
-              <a:rPr lang="en-US" sz="2800" kern="0" dirty="0">
-                <a:latin typeface="Raleway" panose="020B0503030101060003" pitchFamily="34" charset="0"/>
-                <a:ea typeface="Roboto" panose="02000000000000000000" pitchFamily="2" charset="0"/>
-                <a:cs typeface="Roboto" panose="02000000000000000000" pitchFamily="2" charset="0"/>
-              </a:rPr>
-              <a:t>First look at the final product and see if (in this order) it is coded in React.JS and Django. Whether it has the login/logout/ register features, and data rendering based on the database (ideally with various database). Finally, look in the code base and see if it is coded nicely. (Not on LinkedIn because the final products are too basic)</a:t>
-            </a:r>
-          </a:p>
-          <a:p>
-            <a:pPr marL="469900" marR="5080" indent="-457200">
-              <a:spcBef>
-                <a:spcPts val="235"/>
-              </a:spcBef>
-              <a:buFontTx/>
-              <a:buChar char="-"/>
-            </a:pPr>
-            <a:endParaRPr lang="en-US" sz="2800" kern="0" dirty="0">
+            <a:endParaRPr lang="en-US" sz="3000" kern="0" dirty="0">
               <a:latin typeface="Raleway" panose="020B0503030101060003" pitchFamily="34" charset="0"/>
               <a:ea typeface="Roboto" panose="02000000000000000000" pitchFamily="2" charset="0"/>
               <a:cs typeface="Roboto" panose="02000000000000000000" pitchFamily="2" charset="0"/>
@@ -12928,29 +12862,12 @@
               </a:spcBef>
             </a:pPr>
             <a:r>
-              <a:rPr lang="en-US" sz="2800" kern="0" dirty="0">
+              <a:rPr lang="en-US" sz="3000" kern="0" dirty="0">
                 <a:latin typeface="Raleway" panose="020B0503030101060003" pitchFamily="34" charset="0"/>
                 <a:ea typeface="Roboto" panose="02000000000000000000" pitchFamily="2" charset="0"/>
                 <a:cs typeface="Roboto" panose="02000000000000000000" pitchFamily="2" charset="0"/>
               </a:rPr>
-              <a:t>2. Once you gathered over 5-10 example website codes, priorities the videos and codebase that are closest to your product and start watching the videos to learn the different aspects of the website.</a:t>
-            </a:r>
-          </a:p>
-          <a:p>
-            <a:pPr marL="469900" marR="5080" indent="-457200">
-              <a:spcBef>
-                <a:spcPts val="235"/>
-              </a:spcBef>
-              <a:buFontTx/>
-              <a:buChar char="-"/>
-            </a:pPr>
-            <a:r>
-              <a:rPr lang="en-US" sz="2800" kern="0" dirty="0">
-                <a:latin typeface="Raleway" panose="020B0503030101060003" pitchFamily="34" charset="0"/>
-                <a:ea typeface="Roboto" panose="02000000000000000000" pitchFamily="2" charset="0"/>
-                <a:cs typeface="Roboto" panose="02000000000000000000" pitchFamily="2" charset="0"/>
-              </a:rPr>
-              <a:t>You must follow the 5 hours videos because you can’t clone a template project from other people and make it your own. It keeps having the submodular problem where your code doesn’t show in GitLab. The video host may introduce new package installations in the middle of the app.</a:t>
+              <a:t>Go ASEP report document </a:t>
             </a:r>
           </a:p>
         </p:txBody>
@@ -12958,7 +12875,7 @@
     </p:spTree>
     <p:extLst>
       <p:ext uri="{BB962C8B-B14F-4D97-AF65-F5344CB8AC3E}">
-        <p14:creationId xmlns:p14="http://schemas.microsoft.com/office/powerpoint/2010/main" val="4125960274"/>
+        <p14:creationId xmlns:p14="http://schemas.microsoft.com/office/powerpoint/2010/main" val="4281965062"/>
       </p:ext>
     </p:extLst>
   </p:cSld>
@@ -13670,8 +13587,831 @@
         </p:nvSpPr>
         <p:spPr>
           <a:xfrm>
+            <a:off x="7016888" y="546530"/>
+            <a:ext cx="10817576" cy="9181360"/>
+          </a:xfrm>
+          <a:prstGeom prst="rect">
+            <a:avLst/>
+          </a:prstGeom>
+        </p:spPr>
+        <p:txBody>
+          <a:bodyPr vert="horz" wrap="square" lIns="0" tIns="29845" rIns="0" bIns="0" rtlCol="0">
+            <a:spAutoFit/>
+          </a:bodyPr>
+          <a:lstStyle/>
+          <a:p>
+            <a:pPr marL="12700" marR="5080">
+              <a:spcBef>
+                <a:spcPts val="235"/>
+              </a:spcBef>
+            </a:pPr>
+            <a:r>
+              <a:rPr lang="en-US" sz="2800" kern="0" dirty="0">
+                <a:latin typeface="Raleway" panose="020B0503030101060003" pitchFamily="34" charset="0"/>
+                <a:ea typeface="Roboto" panose="02000000000000000000" pitchFamily="2" charset="0"/>
+                <a:cs typeface="Roboto" panose="02000000000000000000" pitchFamily="2" charset="0"/>
+              </a:rPr>
+              <a:t>1. Find a collection of relevant programming tutorial videos </a:t>
+            </a:r>
+          </a:p>
+          <a:p>
+            <a:pPr marL="469900" marR="5080" indent="-457200">
+              <a:spcBef>
+                <a:spcPts val="235"/>
+              </a:spcBef>
+              <a:buFontTx/>
+              <a:buChar char="-"/>
+            </a:pPr>
+            <a:r>
+              <a:rPr lang="en-US" sz="2800" kern="0" dirty="0">
+                <a:latin typeface="Raleway" panose="020B0503030101060003" pitchFamily="34" charset="0"/>
+                <a:ea typeface="Roboto" panose="02000000000000000000" pitchFamily="2" charset="0"/>
+                <a:cs typeface="Roboto" panose="02000000000000000000" pitchFamily="2" charset="0"/>
+              </a:rPr>
+              <a:t>First look at the final product and see if (in this order) it is coded in React.JS and Django. Whether it has the login/logout/ register features, and data rendering based on the database (ideally with various database). Finally, look in the code base and see if it is coded nicely. (Not on LinkedIn because the final products are too basic). Platforms that have good resources are YouTube and </a:t>
+            </a:r>
+            <a:r>
+              <a:rPr lang="en-US" sz="2800" kern="0" dirty="0" err="1">
+                <a:latin typeface="Raleway" panose="020B0503030101060003" pitchFamily="34" charset="0"/>
+                <a:ea typeface="Roboto" panose="02000000000000000000" pitchFamily="2" charset="0"/>
+                <a:cs typeface="Roboto" panose="02000000000000000000" pitchFamily="2" charset="0"/>
+              </a:rPr>
+              <a:t>Github</a:t>
+            </a:r>
+            <a:r>
+              <a:rPr lang="en-US" sz="2800" kern="0" dirty="0">
+                <a:latin typeface="Raleway" panose="020B0503030101060003" pitchFamily="34" charset="0"/>
+                <a:ea typeface="Roboto" panose="02000000000000000000" pitchFamily="2" charset="0"/>
+                <a:cs typeface="Roboto" panose="02000000000000000000" pitchFamily="2" charset="0"/>
+              </a:rPr>
+              <a:t>. You can see step-by-step how the final product is made so you will not miss a step. By going to GitHub first, you can determine whether the solutions are satisfactory before watching the videos. </a:t>
+            </a:r>
+          </a:p>
+          <a:p>
+            <a:pPr marL="469900" marR="5080" indent="-457200">
+              <a:spcBef>
+                <a:spcPts val="235"/>
+              </a:spcBef>
+              <a:buFontTx/>
+              <a:buChar char="-"/>
+            </a:pPr>
+            <a:endParaRPr lang="en-US" sz="2800" kern="0" dirty="0">
+              <a:latin typeface="Raleway" panose="020B0503030101060003" pitchFamily="34" charset="0"/>
+              <a:ea typeface="Roboto" panose="02000000000000000000" pitchFamily="2" charset="0"/>
+              <a:cs typeface="Roboto" panose="02000000000000000000" pitchFamily="2" charset="0"/>
+            </a:endParaRPr>
+          </a:p>
+          <a:p>
+            <a:pPr marL="12700" marR="5080">
+              <a:spcBef>
+                <a:spcPts val="235"/>
+              </a:spcBef>
+            </a:pPr>
+            <a:r>
+              <a:rPr lang="en-US" sz="2800" kern="0" dirty="0">
+                <a:latin typeface="Raleway" panose="020B0503030101060003" pitchFamily="34" charset="0"/>
+                <a:ea typeface="Roboto" panose="02000000000000000000" pitchFamily="2" charset="0"/>
+                <a:cs typeface="Roboto" panose="02000000000000000000" pitchFamily="2" charset="0"/>
+              </a:rPr>
+              <a:t>2. Once you gathered over 5-10 example website codes, priorities the videos and codebase that are closest to your product and start watching the videos to learn the different aspects of the website.</a:t>
+            </a:r>
+          </a:p>
+          <a:p>
+            <a:pPr marL="469900" marR="5080" indent="-457200">
+              <a:spcBef>
+                <a:spcPts val="235"/>
+              </a:spcBef>
+              <a:buFontTx/>
+              <a:buChar char="-"/>
+            </a:pPr>
+            <a:r>
+              <a:rPr lang="en-US" sz="2800" kern="0" dirty="0">
+                <a:latin typeface="Raleway" panose="020B0503030101060003" pitchFamily="34" charset="0"/>
+                <a:ea typeface="Roboto" panose="02000000000000000000" pitchFamily="2" charset="0"/>
+                <a:cs typeface="Roboto" panose="02000000000000000000" pitchFamily="2" charset="0"/>
+              </a:rPr>
+              <a:t>You must follow the 5 hours videos because you can’t clone a template project from other people and make it your own. It keeps having the submodular problem where your code doesn’t show in GitLab. The video host may introduce new package installations in the middle of the app.</a:t>
+            </a:r>
+          </a:p>
+        </p:txBody>
+      </p:sp>
+    </p:spTree>
+    <p:extLst>
+      <p:ext uri="{BB962C8B-B14F-4D97-AF65-F5344CB8AC3E}">
+        <p14:creationId xmlns:p14="http://schemas.microsoft.com/office/powerpoint/2010/main" val="4125960274"/>
+      </p:ext>
+    </p:extLst>
+  </p:cSld>
+  <p:clrMapOvr>
+    <a:masterClrMapping/>
+  </p:clrMapOvr>
+</p:sld>
+</file>
+
+<file path=ppt/slides/slide8.xml><?xml version="1.0" encoding="utf-8"?>
+<p:sld xmlns:a="http://schemas.openxmlformats.org/drawingml/2006/main" xmlns:r="http://schemas.openxmlformats.org/officeDocument/2006/relationships" xmlns:p="http://schemas.openxmlformats.org/presentationml/2006/main">
+  <p:cSld>
+    <p:spTree>
+      <p:nvGrpSpPr>
+        <p:cNvPr id="1" name=""/>
+        <p:cNvGrpSpPr/>
+        <p:nvPr/>
+      </p:nvGrpSpPr>
+      <p:grpSpPr>
+        <a:xfrm>
+          <a:off x="0" y="0"/>
+          <a:ext cx="0" cy="0"/>
+          <a:chOff x="0" y="0"/>
+          <a:chExt cx="0" cy="0"/>
+        </a:xfrm>
+      </p:grpSpPr>
+      <p:grpSp>
+        <p:nvGrpSpPr>
+          <p:cNvPr id="2" name="object 2"/>
+          <p:cNvGrpSpPr/>
+          <p:nvPr/>
+        </p:nvGrpSpPr>
+        <p:grpSpPr>
+          <a:xfrm>
+            <a:off x="228600" y="-190500"/>
+            <a:ext cx="7528559" cy="10287000"/>
+            <a:chOff x="0" y="0"/>
+            <a:chExt cx="8759190" cy="10287000"/>
+          </a:xfrm>
+        </p:grpSpPr>
+        <p:pic>
+          <p:nvPicPr>
+            <p:cNvPr id="3" name="object 3"/>
+            <p:cNvPicPr/>
+            <p:nvPr/>
+          </p:nvPicPr>
+          <p:blipFill>
+            <a:blip r:embed="rId3" cstate="print"/>
+            <a:stretch>
+              <a:fillRect/>
+            </a:stretch>
+          </p:blipFill>
+          <p:spPr>
+            <a:xfrm>
+              <a:off x="0" y="0"/>
+              <a:ext cx="7490455" cy="8250979"/>
+            </a:xfrm>
+            <a:prstGeom prst="rect">
+              <a:avLst/>
+            </a:prstGeom>
+          </p:spPr>
+        </p:pic>
+        <p:pic>
+          <p:nvPicPr>
+            <p:cNvPr id="4" name="object 4"/>
+            <p:cNvPicPr/>
+            <p:nvPr/>
+          </p:nvPicPr>
+          <p:blipFill>
+            <a:blip r:embed="rId4" cstate="print"/>
+            <a:stretch>
+              <a:fillRect/>
+            </a:stretch>
+          </p:blipFill>
+          <p:spPr>
+            <a:xfrm>
+              <a:off x="0" y="1670110"/>
+              <a:ext cx="8758806" cy="8616889"/>
+            </a:xfrm>
+            <a:prstGeom prst="rect">
+              <a:avLst/>
+            </a:prstGeom>
+          </p:spPr>
+        </p:pic>
+      </p:grpSp>
+      <p:sp>
+        <p:nvSpPr>
+          <p:cNvPr id="5" name="object 5"/>
+          <p:cNvSpPr txBox="1"/>
+          <p:nvPr/>
+        </p:nvSpPr>
+        <p:spPr>
+          <a:xfrm>
+            <a:off x="685800" y="3314700"/>
+            <a:ext cx="6857143" cy="1938223"/>
+          </a:xfrm>
+          <a:prstGeom prst="rect">
+            <a:avLst/>
+          </a:prstGeom>
+        </p:spPr>
+        <p:txBody>
+          <a:bodyPr vert="horz" wrap="square" lIns="0" tIns="29845" rIns="0" bIns="0" rtlCol="0">
+            <a:spAutoFit/>
+          </a:bodyPr>
+          <a:lstStyle/>
+          <a:p>
+            <a:pPr marL="12700" marR="5080">
+              <a:lnSpc>
+                <a:spcPts val="7759"/>
+              </a:lnSpc>
+              <a:spcBef>
+                <a:spcPts val="235"/>
+              </a:spcBef>
+            </a:pPr>
+            <a:r>
+              <a:rPr lang="en-US" sz="4000" b="1" kern="0" dirty="0">
+                <a:latin typeface="Consolas" panose="020B0609020204030204" pitchFamily="49" charset="0"/>
+              </a:rPr>
+              <a:t>Development Strategy</a:t>
+            </a:r>
+          </a:p>
+          <a:p>
+            <a:pPr marL="12700" marR="5080">
+              <a:lnSpc>
+                <a:spcPts val="7759"/>
+              </a:lnSpc>
+              <a:spcBef>
+                <a:spcPts val="235"/>
+              </a:spcBef>
+            </a:pPr>
+            <a:r>
+              <a:rPr lang="en-US" sz="4000" b="1" kern="0" dirty="0">
+                <a:latin typeface="Consolas" panose="020B0609020204030204" pitchFamily="49" charset="0"/>
+              </a:rPr>
+              <a:t> </a:t>
+            </a:r>
+          </a:p>
+        </p:txBody>
+      </p:sp>
+      <p:grpSp>
+        <p:nvGrpSpPr>
+          <p:cNvPr id="8" name="object 8"/>
+          <p:cNvGrpSpPr/>
+          <p:nvPr/>
+        </p:nvGrpSpPr>
+        <p:grpSpPr>
+          <a:xfrm>
+            <a:off x="0" y="-419100"/>
+            <a:ext cx="7065924" cy="10314669"/>
+            <a:chOff x="0" y="0"/>
+            <a:chExt cx="7413808" cy="10314669"/>
+          </a:xfrm>
+        </p:grpSpPr>
+        <p:pic>
+          <p:nvPicPr>
+            <p:cNvPr id="9" name="object 9"/>
+            <p:cNvPicPr/>
+            <p:nvPr/>
+          </p:nvPicPr>
+          <p:blipFill>
+            <a:blip r:embed="rId5" cstate="print"/>
+            <a:stretch>
+              <a:fillRect/>
+            </a:stretch>
+          </p:blipFill>
+          <p:spPr>
+            <a:xfrm>
+              <a:off x="0" y="0"/>
+              <a:ext cx="2975600" cy="3863365"/>
+            </a:xfrm>
+            <a:prstGeom prst="rect">
+              <a:avLst/>
+            </a:prstGeom>
+          </p:spPr>
+        </p:pic>
+        <p:sp>
+          <p:nvSpPr>
+            <p:cNvPr id="10" name="object 10"/>
+            <p:cNvSpPr/>
+            <p:nvPr/>
+          </p:nvSpPr>
+          <p:spPr>
+            <a:xfrm>
+              <a:off x="5289733" y="9906364"/>
+              <a:ext cx="2124075" cy="408305"/>
+            </a:xfrm>
+            <a:custGeom>
+              <a:avLst/>
+              <a:gdLst/>
+              <a:ahLst/>
+              <a:cxnLst/>
+              <a:rect l="l" t="t" r="r" b="b"/>
+              <a:pathLst>
+                <a:path w="2124075" h="408304">
+                  <a:moveTo>
+                    <a:pt x="692905" y="407848"/>
+                  </a:moveTo>
+                  <a:lnTo>
+                    <a:pt x="576622" y="407848"/>
+                  </a:lnTo>
+                  <a:lnTo>
+                    <a:pt x="589898" y="384507"/>
+                  </a:lnTo>
+                  <a:lnTo>
+                    <a:pt x="615531" y="339895"/>
+                  </a:lnTo>
+                  <a:lnTo>
+                    <a:pt x="641286" y="295407"/>
+                  </a:lnTo>
+                  <a:lnTo>
+                    <a:pt x="680927" y="227336"/>
+                  </a:lnTo>
+                  <a:lnTo>
+                    <a:pt x="707424" y="188522"/>
+                  </a:lnTo>
+                  <a:lnTo>
+                    <a:pt x="765103" y="139707"/>
+                  </a:lnTo>
+                  <a:lnTo>
+                    <a:pt x="804934" y="125738"/>
+                  </a:lnTo>
+                  <a:lnTo>
+                    <a:pt x="843771" y="130150"/>
+                  </a:lnTo>
+                  <a:lnTo>
+                    <a:pt x="881827" y="152376"/>
+                  </a:lnTo>
+                  <a:lnTo>
+                    <a:pt x="919315" y="191849"/>
+                  </a:lnTo>
+                  <a:lnTo>
+                    <a:pt x="938960" y="224009"/>
+                  </a:lnTo>
+                  <a:lnTo>
+                    <a:pt x="940412" y="227336"/>
+                  </a:lnTo>
+                  <a:lnTo>
+                    <a:pt x="854231" y="227336"/>
+                  </a:lnTo>
+                  <a:lnTo>
+                    <a:pt x="817784" y="245957"/>
+                  </a:lnTo>
+                  <a:lnTo>
+                    <a:pt x="765412" y="297616"/>
+                  </a:lnTo>
+                  <a:lnTo>
+                    <a:pt x="726214" y="355397"/>
+                  </a:lnTo>
+                  <a:lnTo>
+                    <a:pt x="708348" y="382775"/>
+                  </a:lnTo>
+                  <a:lnTo>
+                    <a:pt x="692905" y="407848"/>
+                  </a:lnTo>
+                  <a:close/>
+                </a:path>
+                <a:path w="2124075" h="408304">
+                  <a:moveTo>
+                    <a:pt x="996758" y="407848"/>
+                  </a:moveTo>
+                  <a:lnTo>
+                    <a:pt x="900108" y="407848"/>
+                  </a:lnTo>
+                  <a:lnTo>
+                    <a:pt x="891672" y="374475"/>
+                  </a:lnTo>
+                  <a:lnTo>
+                    <a:pt x="879377" y="326403"/>
+                  </a:lnTo>
+                  <a:lnTo>
+                    <a:pt x="873576" y="301982"/>
+                  </a:lnTo>
+                  <a:lnTo>
+                    <a:pt x="867358" y="277424"/>
+                  </a:lnTo>
+                  <a:lnTo>
+                    <a:pt x="860864" y="252588"/>
+                  </a:lnTo>
+                  <a:lnTo>
+                    <a:pt x="854231" y="227336"/>
+                  </a:lnTo>
+                  <a:lnTo>
+                    <a:pt x="940412" y="227336"/>
+                  </a:lnTo>
+                  <a:lnTo>
+                    <a:pt x="954445" y="259496"/>
+                  </a:lnTo>
+                  <a:lnTo>
+                    <a:pt x="967157" y="296646"/>
+                  </a:lnTo>
+                  <a:lnTo>
+                    <a:pt x="978481" y="333796"/>
+                  </a:lnTo>
+                  <a:lnTo>
+                    <a:pt x="990338" y="378385"/>
+                  </a:lnTo>
+                  <a:lnTo>
+                    <a:pt x="996758" y="407848"/>
+                  </a:lnTo>
+                  <a:close/>
+                </a:path>
+                <a:path w="2124075" h="408304">
+                  <a:moveTo>
+                    <a:pt x="115737" y="407848"/>
+                  </a:moveTo>
+                  <a:lnTo>
+                    <a:pt x="0" y="407848"/>
+                  </a:lnTo>
+                  <a:lnTo>
+                    <a:pt x="15167" y="371238"/>
+                  </a:lnTo>
+                  <a:lnTo>
+                    <a:pt x="37730" y="324924"/>
+                  </a:lnTo>
+                  <a:lnTo>
+                    <a:pt x="60462" y="283393"/>
+                  </a:lnTo>
+                  <a:lnTo>
+                    <a:pt x="85040" y="242855"/>
+                  </a:lnTo>
+                  <a:lnTo>
+                    <a:pt x="112600" y="204305"/>
+                  </a:lnTo>
+                  <a:lnTo>
+                    <a:pt x="144278" y="168736"/>
+                  </a:lnTo>
+                  <a:lnTo>
+                    <a:pt x="181210" y="137141"/>
+                  </a:lnTo>
+                  <a:lnTo>
+                    <a:pt x="221517" y="121061"/>
+                  </a:lnTo>
+                  <a:lnTo>
+                    <a:pt x="242364" y="121962"/>
+                  </a:lnTo>
+                  <a:lnTo>
+                    <a:pt x="264043" y="128269"/>
+                  </a:lnTo>
+                  <a:lnTo>
+                    <a:pt x="308696" y="153174"/>
+                  </a:lnTo>
+                  <a:lnTo>
+                    <a:pt x="343918" y="186674"/>
+                  </a:lnTo>
+                  <a:lnTo>
+                    <a:pt x="363634" y="215507"/>
+                  </a:lnTo>
+                  <a:lnTo>
+                    <a:pt x="269960" y="215507"/>
+                  </a:lnTo>
+                  <a:lnTo>
+                    <a:pt x="230508" y="249192"/>
+                  </a:lnTo>
+                  <a:lnTo>
+                    <a:pt x="196186" y="284262"/>
+                  </a:lnTo>
+                  <a:lnTo>
+                    <a:pt x="166580" y="321551"/>
+                  </a:lnTo>
+                  <a:lnTo>
+                    <a:pt x="141272" y="361889"/>
+                  </a:lnTo>
+                  <a:lnTo>
+                    <a:pt x="115737" y="407848"/>
+                  </a:lnTo>
+                  <a:close/>
+                </a:path>
+                <a:path w="2124075" h="408304">
+                  <a:moveTo>
+                    <a:pt x="432814" y="407848"/>
+                  </a:moveTo>
+                  <a:lnTo>
+                    <a:pt x="333919" y="407848"/>
+                  </a:lnTo>
+                  <a:lnTo>
+                    <a:pt x="324065" y="368913"/>
+                  </a:lnTo>
+                  <a:lnTo>
+                    <a:pt x="309897" y="314574"/>
+                  </a:lnTo>
+                  <a:lnTo>
+                    <a:pt x="301993" y="290570"/>
+                  </a:lnTo>
+                  <a:lnTo>
+                    <a:pt x="292147" y="266704"/>
+                  </a:lnTo>
+                  <a:lnTo>
+                    <a:pt x="281192" y="242006"/>
+                  </a:lnTo>
+                  <a:lnTo>
+                    <a:pt x="269960" y="215507"/>
+                  </a:lnTo>
+                  <a:lnTo>
+                    <a:pt x="363634" y="215507"/>
+                  </a:lnTo>
+                  <a:lnTo>
+                    <a:pt x="371375" y="226828"/>
+                  </a:lnTo>
+                  <a:lnTo>
+                    <a:pt x="392731" y="271694"/>
+                  </a:lnTo>
+                  <a:lnTo>
+                    <a:pt x="406552" y="310138"/>
+                  </a:lnTo>
+                  <a:lnTo>
+                    <a:pt x="417877" y="349691"/>
+                  </a:lnTo>
+                  <a:lnTo>
+                    <a:pt x="428092" y="389798"/>
+                  </a:lnTo>
+                  <a:lnTo>
+                    <a:pt x="432814" y="407848"/>
+                  </a:lnTo>
+                  <a:close/>
+                </a:path>
+                <a:path w="2124075" h="408304">
+                  <a:moveTo>
+                    <a:pt x="1217971" y="407848"/>
+                  </a:moveTo>
+                  <a:lnTo>
+                    <a:pt x="1093662" y="407848"/>
+                  </a:lnTo>
+                  <a:lnTo>
+                    <a:pt x="1118124" y="365932"/>
+                  </a:lnTo>
+                  <a:lnTo>
+                    <a:pt x="1147107" y="316607"/>
+                  </a:lnTo>
+                  <a:lnTo>
+                    <a:pt x="1177199" y="268113"/>
+                  </a:lnTo>
+                  <a:lnTo>
+                    <a:pt x="1209232" y="221421"/>
+                  </a:lnTo>
+                  <a:lnTo>
+                    <a:pt x="1259708" y="165234"/>
+                  </a:lnTo>
+                  <a:lnTo>
+                    <a:pt x="1287651" y="139081"/>
+                  </a:lnTo>
+                  <a:lnTo>
+                    <a:pt x="1342565" y="97565"/>
+                  </a:lnTo>
+                  <a:lnTo>
+                    <a:pt x="1369537" y="93706"/>
+                  </a:lnTo>
+                  <a:lnTo>
+                    <a:pt x="1396231" y="101215"/>
+                  </a:lnTo>
+                  <a:lnTo>
+                    <a:pt x="1422232" y="119397"/>
+                  </a:lnTo>
+                  <a:lnTo>
+                    <a:pt x="1448973" y="147445"/>
+                  </a:lnTo>
+                  <a:lnTo>
+                    <a:pt x="1470860" y="178542"/>
+                  </a:lnTo>
+                  <a:lnTo>
+                    <a:pt x="1479829" y="197764"/>
+                  </a:lnTo>
+                  <a:lnTo>
+                    <a:pt x="1385252" y="197764"/>
+                  </a:lnTo>
+                  <a:lnTo>
+                    <a:pt x="1360453" y="221768"/>
+                  </a:lnTo>
+                  <a:lnTo>
+                    <a:pt x="1311410" y="270331"/>
+                  </a:lnTo>
+                  <a:lnTo>
+                    <a:pt x="1261126" y="337246"/>
+                  </a:lnTo>
+                  <a:lnTo>
+                    <a:pt x="1234870" y="378647"/>
+                  </a:lnTo>
+                  <a:lnTo>
+                    <a:pt x="1217971" y="407848"/>
+                  </a:lnTo>
+                  <a:close/>
+                </a:path>
+                <a:path w="2124075" h="408304">
+                  <a:moveTo>
+                    <a:pt x="1518842" y="407848"/>
+                  </a:moveTo>
+                  <a:lnTo>
+                    <a:pt x="1424115" y="407848"/>
+                  </a:lnTo>
+                  <a:lnTo>
+                    <a:pt x="1422833" y="396128"/>
+                  </a:lnTo>
+                  <a:lnTo>
+                    <a:pt x="1412756" y="299557"/>
+                  </a:lnTo>
+                  <a:lnTo>
+                    <a:pt x="1407440" y="250994"/>
+                  </a:lnTo>
+                  <a:lnTo>
+                    <a:pt x="1397086" y="203678"/>
+                  </a:lnTo>
+                  <a:lnTo>
+                    <a:pt x="1392648" y="202199"/>
+                  </a:lnTo>
+                  <a:lnTo>
+                    <a:pt x="1389690" y="199242"/>
+                  </a:lnTo>
+                  <a:lnTo>
+                    <a:pt x="1385252" y="197764"/>
+                  </a:lnTo>
+                  <a:lnTo>
+                    <a:pt x="1479829" y="197764"/>
+                  </a:lnTo>
+                  <a:lnTo>
+                    <a:pt x="1486923" y="212966"/>
+                  </a:lnTo>
+                  <a:lnTo>
+                    <a:pt x="1496190" y="250994"/>
+                  </a:lnTo>
+                  <a:lnTo>
+                    <a:pt x="1503302" y="300829"/>
+                  </a:lnTo>
+                  <a:lnTo>
+                    <a:pt x="1510485" y="350877"/>
+                  </a:lnTo>
+                  <a:lnTo>
+                    <a:pt x="1517810" y="400996"/>
+                  </a:lnTo>
+                  <a:lnTo>
+                    <a:pt x="1518842" y="407848"/>
+                  </a:lnTo>
+                  <a:close/>
+                </a:path>
+                <a:path w="2124075" h="408304">
+                  <a:moveTo>
+                    <a:pt x="1728593" y="407848"/>
+                  </a:moveTo>
+                  <a:lnTo>
+                    <a:pt x="1614219" y="407848"/>
+                  </a:lnTo>
+                  <a:lnTo>
+                    <a:pt x="1636945" y="369282"/>
+                  </a:lnTo>
+                  <a:lnTo>
+                    <a:pt x="1661208" y="328047"/>
+                  </a:lnTo>
+                  <a:lnTo>
+                    <a:pt x="1685550" y="286980"/>
+                  </a:lnTo>
+                  <a:lnTo>
+                    <a:pt x="1710221" y="246027"/>
+                  </a:lnTo>
+                  <a:lnTo>
+                    <a:pt x="1735307" y="205411"/>
+                  </a:lnTo>
+                  <a:lnTo>
+                    <a:pt x="1760962" y="165234"/>
+                  </a:lnTo>
+                  <a:lnTo>
+                    <a:pt x="1786817" y="128529"/>
+                  </a:lnTo>
+                  <a:lnTo>
+                    <a:pt x="1815158" y="93740"/>
+                  </a:lnTo>
+                  <a:lnTo>
+                    <a:pt x="1846694" y="62075"/>
+                  </a:lnTo>
+                  <a:lnTo>
+                    <a:pt x="1882135" y="34738"/>
+                  </a:lnTo>
+                  <a:lnTo>
+                    <a:pt x="1922191" y="12937"/>
+                  </a:lnTo>
+                  <a:lnTo>
+                    <a:pt x="1968068" y="0"/>
+                  </a:lnTo>
+                  <a:lnTo>
+                    <a:pt x="2006319" y="3696"/>
+                  </a:lnTo>
+                  <a:lnTo>
+                    <a:pt x="2037635" y="24581"/>
+                  </a:lnTo>
+                  <a:lnTo>
+                    <a:pt x="2062712" y="63210"/>
+                  </a:lnTo>
+                  <a:lnTo>
+                    <a:pt x="2082010" y="114476"/>
+                  </a:lnTo>
+                  <a:lnTo>
+                    <a:pt x="1982166" y="114476"/>
+                  </a:lnTo>
+                  <a:lnTo>
+                    <a:pt x="1953253" y="126790"/>
+                  </a:lnTo>
+                  <a:lnTo>
+                    <a:pt x="1936474" y="137972"/>
+                  </a:lnTo>
+                  <a:lnTo>
+                    <a:pt x="1921081" y="150818"/>
+                  </a:lnTo>
+                  <a:lnTo>
+                    <a:pt x="1906243" y="164218"/>
+                  </a:lnTo>
+                  <a:lnTo>
+                    <a:pt x="1891128" y="177063"/>
+                  </a:lnTo>
+                  <a:lnTo>
+                    <a:pt x="1856812" y="209663"/>
+                  </a:lnTo>
+                  <a:lnTo>
+                    <a:pt x="1829595" y="247303"/>
+                  </a:lnTo>
+                  <a:lnTo>
+                    <a:pt x="1782261" y="328047"/>
+                  </a:lnTo>
+                  <a:lnTo>
+                    <a:pt x="1755045" y="366325"/>
+                  </a:lnTo>
+                  <a:lnTo>
+                    <a:pt x="1731124" y="402459"/>
+                  </a:lnTo>
+                  <a:lnTo>
+                    <a:pt x="1728593" y="407848"/>
+                  </a:lnTo>
+                  <a:close/>
+                </a:path>
+                <a:path w="2124075" h="408304">
+                  <a:moveTo>
+                    <a:pt x="2123898" y="407848"/>
+                  </a:moveTo>
+                  <a:lnTo>
+                    <a:pt x="2042951" y="407848"/>
+                  </a:lnTo>
+                  <a:lnTo>
+                    <a:pt x="2037751" y="369282"/>
+                  </a:lnTo>
+                  <a:lnTo>
+                    <a:pt x="2032686" y="320644"/>
+                  </a:lnTo>
+                  <a:lnTo>
+                    <a:pt x="2028437" y="271833"/>
+                  </a:lnTo>
+                  <a:lnTo>
+                    <a:pt x="2024360" y="222952"/>
+                  </a:lnTo>
+                  <a:lnTo>
+                    <a:pt x="2019816" y="174106"/>
+                  </a:lnTo>
+                  <a:lnTo>
+                    <a:pt x="2019816" y="163756"/>
+                  </a:lnTo>
+                  <a:lnTo>
+                    <a:pt x="2013368" y="131989"/>
+                  </a:lnTo>
+                  <a:lnTo>
+                    <a:pt x="2001511" y="115886"/>
+                  </a:lnTo>
+                  <a:lnTo>
+                    <a:pt x="1982166" y="114476"/>
+                  </a:lnTo>
+                  <a:lnTo>
+                    <a:pt x="2082010" y="114476"/>
+                  </a:lnTo>
+                  <a:lnTo>
+                    <a:pt x="2096733" y="168376"/>
+                  </a:lnTo>
+                  <a:lnTo>
+                    <a:pt x="2106810" y="223108"/>
+                  </a:lnTo>
+                  <a:lnTo>
+                    <a:pt x="2113004" y="279087"/>
+                  </a:lnTo>
+                  <a:lnTo>
+                    <a:pt x="2116799" y="328502"/>
+                  </a:lnTo>
+                  <a:lnTo>
+                    <a:pt x="2120904" y="377839"/>
+                  </a:lnTo>
+                  <a:lnTo>
+                    <a:pt x="2123898" y="407848"/>
+                  </a:lnTo>
+                  <a:close/>
+                </a:path>
+              </a:pathLst>
+            </a:custGeom>
+            <a:solidFill>
+              <a:srgbClr val="040707"/>
+            </a:solidFill>
+          </p:spPr>
+          <p:txBody>
+            <a:bodyPr wrap="square" lIns="0" tIns="0" rIns="0" bIns="0" rtlCol="0"/>
+            <a:lstStyle/>
+            <a:p>
+              <a:endParaRPr dirty="0"/>
+            </a:p>
+          </p:txBody>
+        </p:sp>
+      </p:grpSp>
+      <p:sp>
+        <p:nvSpPr>
+          <p:cNvPr id="12" name="object 5">
+            <a:extLst>
+              <a:ext uri="{FF2B5EF4-FFF2-40B4-BE49-F238E27FC236}">
+                <a16:creationId xmlns:a16="http://schemas.microsoft.com/office/drawing/2014/main" id="{11F2B6B6-0466-4FF3-9677-694F0F61AE7C}"/>
+              </a:ext>
+            </a:extLst>
+          </p:cNvPr>
+          <p:cNvSpPr txBox="1"/>
+          <p:nvPr/>
+        </p:nvSpPr>
+        <p:spPr>
+          <a:xfrm>
             <a:off x="7542943" y="2120375"/>
-            <a:ext cx="10059257" cy="4846840"/>
+            <a:ext cx="10059257" cy="5759910"/>
           </a:xfrm>
           <a:prstGeom prst="rect">
             <a:avLst/>
@@ -13738,6 +14478,33 @@
               <a:t>4, Once you have watched the video and coded a working product, start a new project, watch each video again while developing your own version of product. Before moving onto the next video, make sure that your own product covers all the aspects taught in the current tutorials, so you don’t need to look back the video for reference. </a:t>
             </a:r>
           </a:p>
+          <a:p>
+            <a:pPr marL="12700" marR="5080">
+              <a:spcBef>
+                <a:spcPts val="235"/>
+              </a:spcBef>
+            </a:pPr>
+            <a:endParaRPr lang="en-US" sz="2800" kern="0" dirty="0">
+              <a:latin typeface="Raleway" panose="020B0503030101060003" pitchFamily="34" charset="0"/>
+              <a:ea typeface="Roboto" panose="02000000000000000000" pitchFamily="2" charset="0"/>
+              <a:cs typeface="Roboto" panose="02000000000000000000" pitchFamily="2" charset="0"/>
+            </a:endParaRPr>
+          </a:p>
+          <a:p>
+            <a:pPr marL="12700" marR="5080">
+              <a:spcBef>
+                <a:spcPts val="235"/>
+              </a:spcBef>
+            </a:pPr>
+            <a:r>
+              <a:rPr lang="en-US" sz="2800" kern="0" dirty="0">
+                <a:latin typeface="Raleway" panose="020B0503030101060003" pitchFamily="34" charset="0"/>
+                <a:ea typeface="Roboto" panose="02000000000000000000" pitchFamily="2" charset="0"/>
+                <a:cs typeface="Roboto" panose="02000000000000000000" pitchFamily="2" charset="0"/>
+              </a:rPr>
+              <a:t>5. Write acceptance criteria while working on the project </a:t>
+            </a:r>
+          </a:p>
         </p:txBody>
       </p:sp>
     </p:spTree>
@@ -13753,7 +14520,7 @@
 </p:sld>
 </file>
 
-<file path=ppt/slides/slide8.xml><?xml version="1.0" encoding="utf-8"?>
+<file path=ppt/slides/slide9.xml><?xml version="1.0" encoding="utf-8"?>
 <p:sld xmlns:a="http://schemas.openxmlformats.org/drawingml/2006/main" xmlns:r="http://schemas.openxmlformats.org/officeDocument/2006/relationships" xmlns:p="http://schemas.openxmlformats.org/presentationml/2006/main">
   <p:cSld>
     <p:spTree>

</xml_diff>